<commit_message>
neuer Ordner, Vortrag Update, latex Links fixed
</commit_message>
<xml_diff>
--- a/Vortrag/Vortrag.pptx
+++ b/Vortrag/Vortrag.pptx
@@ -10,28 +10,30 @@
     <p:sldMasterId id="2147483697" r:id="rId6"/>
   </p:sldMasterIdLst>
   <p:notesMasterIdLst>
-    <p:notesMasterId r:id="rId23"/>
+    <p:notesMasterId r:id="rId25"/>
   </p:notesMasterIdLst>
   <p:handoutMasterIdLst>
-    <p:handoutMasterId r:id="rId24"/>
+    <p:handoutMasterId r:id="rId26"/>
   </p:handoutMasterIdLst>
   <p:sldIdLst>
     <p:sldId id="355" r:id="rId7"/>
     <p:sldId id="357" r:id="rId8"/>
     <p:sldId id="356" r:id="rId9"/>
-    <p:sldId id="401" r:id="rId10"/>
-    <p:sldId id="396" r:id="rId11"/>
-    <p:sldId id="402" r:id="rId12"/>
-    <p:sldId id="397" r:id="rId13"/>
-    <p:sldId id="403" r:id="rId14"/>
-    <p:sldId id="405" r:id="rId15"/>
-    <p:sldId id="398" r:id="rId16"/>
-    <p:sldId id="406" r:id="rId17"/>
-    <p:sldId id="407" r:id="rId18"/>
-    <p:sldId id="379" r:id="rId19"/>
-    <p:sldId id="395" r:id="rId20"/>
-    <p:sldId id="380" r:id="rId21"/>
-    <p:sldId id="381" r:id="rId22"/>
+    <p:sldId id="409" r:id="rId10"/>
+    <p:sldId id="410" r:id="rId11"/>
+    <p:sldId id="396" r:id="rId12"/>
+    <p:sldId id="411" r:id="rId13"/>
+    <p:sldId id="397" r:id="rId14"/>
+    <p:sldId id="414" r:id="rId15"/>
+    <p:sldId id="415" r:id="rId16"/>
+    <p:sldId id="398" r:id="rId17"/>
+    <p:sldId id="413" r:id="rId18"/>
+    <p:sldId id="412" r:id="rId19"/>
+    <p:sldId id="407" r:id="rId20"/>
+    <p:sldId id="379" r:id="rId21"/>
+    <p:sldId id="395" r:id="rId22"/>
+    <p:sldId id="380" r:id="rId23"/>
+    <p:sldId id="381" r:id="rId24"/>
   </p:sldIdLst>
   <p:sldSz cx="9144000" cy="5143500" type="screen16x9"/>
   <p:notesSz cx="9925050" cy="6665913"/>
@@ -1104,7 +1106,7 @@
               <a:pPr>
                 <a:defRPr/>
               </a:pPr>
-              <a:t>12/07/2023</a:t>
+              <a:t>13/07/2023</a:t>
             </a:fld>
             <a:endParaRPr lang="en-GB" dirty="0"/>
           </a:p>
@@ -1323,7 +1325,7 @@
               <a:pPr>
                 <a:defRPr/>
               </a:pPr>
-              <a:t>12/07/2023</a:t>
+              <a:t>13/07/2023</a:t>
             </a:fld>
             <a:endParaRPr lang="en-GB"/>
           </a:p>
@@ -1795,6 +1797,96 @@
         </p:nvSpPr>
         <p:spPr/>
         <p:txBody>
+          <a:bodyPr/>
+          <a:lstStyle/>
+          <a:p>
+            <a:endParaRPr lang="de-DE" dirty="0"/>
+          </a:p>
+        </p:txBody>
+      </p:sp>
+      <p:sp>
+        <p:nvSpPr>
+          <p:cNvPr id="4" name="Foliennummernplatzhalter 3"/>
+          <p:cNvSpPr>
+            <a:spLocks noGrp="1"/>
+          </p:cNvSpPr>
+          <p:nvPr>
+            <p:ph type="sldNum" sz="quarter" idx="5"/>
+          </p:nvPr>
+        </p:nvSpPr>
+        <p:spPr/>
+        <p:txBody>
+          <a:bodyPr/>
+          <a:lstStyle/>
+          <a:p>
+            <a:pPr>
+              <a:defRPr/>
+            </a:pPr>
+            <a:fld id="{00AFC6D0-44D5-4EB7-828F-6F464F83D79A}" type="slidenum">
+              <a:rPr lang="en-GB" smtClean="0"/>
+              <a:pPr>
+                <a:defRPr/>
+              </a:pPr>
+              <a:t>3</a:t>
+            </a:fld>
+            <a:endParaRPr lang="en-GB"/>
+          </a:p>
+        </p:txBody>
+      </p:sp>
+    </p:spTree>
+    <p:extLst>
+      <p:ext uri="{BB962C8B-B14F-4D97-AF65-F5344CB8AC3E}">
+        <p14:creationId xmlns:p14="http://schemas.microsoft.com/office/powerpoint/2010/main" val="759270255"/>
+      </p:ext>
+    </p:extLst>
+  </p:cSld>
+  <p:clrMapOvr>
+    <a:masterClrMapping/>
+  </p:clrMapOvr>
+</p:notes>
+</file>
+
+<file path=ppt/notesSlides/notesSlide3.xml><?xml version="1.0" encoding="utf-8"?>
+<p:notes xmlns:a="http://schemas.openxmlformats.org/drawingml/2006/main" xmlns:r="http://schemas.openxmlformats.org/officeDocument/2006/relationships" xmlns:p="http://schemas.openxmlformats.org/presentationml/2006/main">
+  <p:cSld>
+    <p:spTree>
+      <p:nvGrpSpPr>
+        <p:cNvPr id="1" name=""/>
+        <p:cNvGrpSpPr/>
+        <p:nvPr/>
+      </p:nvGrpSpPr>
+      <p:grpSpPr>
+        <a:xfrm>
+          <a:off x="0" y="0"/>
+          <a:ext cx="0" cy="0"/>
+          <a:chOff x="0" y="0"/>
+          <a:chExt cx="0" cy="0"/>
+        </a:xfrm>
+      </p:grpSpPr>
+      <p:sp>
+        <p:nvSpPr>
+          <p:cNvPr id="2" name="Folienbildplatzhalter 1"/>
+          <p:cNvSpPr>
+            <a:spLocks noGrp="1" noRot="1" noChangeAspect="1"/>
+          </p:cNvSpPr>
+          <p:nvPr>
+            <p:ph type="sldImg"/>
+          </p:nvPr>
+        </p:nvSpPr>
+        <p:spPr/>
+      </p:sp>
+      <p:sp>
+        <p:nvSpPr>
+          <p:cNvPr id="3" name="Notizenplatzhalter 2"/>
+          <p:cNvSpPr>
+            <a:spLocks noGrp="1"/>
+          </p:cNvSpPr>
+          <p:nvPr>
+            <p:ph type="body" idx="1"/>
+          </p:nvPr>
+        </p:nvSpPr>
+        <p:spPr/>
+        <p:txBody>
           <a:bodyPr>
             <a:normAutofit/>
           </a:bodyPr>
@@ -1827,7 +1919,7 @@
               <a:pPr>
                 <a:defRPr/>
               </a:pPr>
-              <a:t>16</a:t>
+              <a:t>18</a:t>
             </a:fld>
             <a:endParaRPr lang="en-GB"/>
           </a:p>
@@ -2149,7 +2241,7 @@
         </p:nvSpPr>
         <p:spPr>
           <a:xfrm>
-            <a:off x="319090" y="972000"/>
+            <a:off x="319090" y="283507"/>
             <a:ext cx="8508999" cy="410369"/>
           </a:xfrm>
           <a:prstGeom prst="rect">
@@ -2359,7 +2451,7 @@
         </p:nvSpPr>
         <p:spPr>
           <a:xfrm>
-            <a:off x="319090" y="972000"/>
+            <a:off x="319090" y="283507"/>
             <a:ext cx="8508999" cy="410369"/>
           </a:xfrm>
           <a:prstGeom prst="rect">
@@ -3265,7 +3357,7 @@
         </p:nvSpPr>
         <p:spPr>
           <a:xfrm>
-            <a:off x="319090" y="972000"/>
+            <a:off x="319090" y="280240"/>
             <a:ext cx="8508999" cy="410369"/>
           </a:xfrm>
           <a:prstGeom prst="rect">
@@ -3586,7 +3678,7 @@
         </p:nvSpPr>
         <p:spPr>
           <a:xfrm>
-            <a:off x="319090" y="972000"/>
+            <a:off x="319090" y="280240"/>
             <a:ext cx="8508999" cy="410369"/>
           </a:xfrm>
           <a:prstGeom prst="rect">
@@ -3772,7 +3864,7 @@
           </a:p>
         </p:txBody>
       </p:sp>
-      <p:sp useBgFill="1">
+      <p:sp>
         <p:nvSpPr>
           <p:cNvPr id="10" name="Titel 1"/>
           <p:cNvSpPr>
@@ -3784,12 +3876,13 @@
         </p:nvSpPr>
         <p:spPr>
           <a:xfrm>
-            <a:off x="319090" y="972000"/>
+            <a:off x="319090" y="284912"/>
             <a:ext cx="8508999" cy="410369"/>
           </a:xfrm>
           <a:prstGeom prst="rect">
             <a:avLst/>
           </a:prstGeom>
+          <a:noFill/>
           <a:ln w="9525">
             <a:noFill/>
             <a:miter lim="800000"/>
@@ -4102,7 +4195,7 @@
         </p:nvSpPr>
         <p:spPr>
           <a:xfrm>
-            <a:off x="319090" y="972000"/>
+            <a:off x="319090" y="283507"/>
             <a:ext cx="8508999" cy="410369"/>
           </a:xfrm>
           <a:prstGeom prst="rect">
@@ -4278,7 +4371,7 @@
         </p:nvSpPr>
         <p:spPr>
           <a:xfrm>
-            <a:off x="319090" y="972000"/>
+            <a:off x="319090" y="283505"/>
             <a:ext cx="8508999" cy="410369"/>
           </a:xfrm>
           <a:prstGeom prst="rect">
@@ -4544,7 +4637,7 @@
         </p:nvSpPr>
         <p:spPr>
           <a:xfrm>
-            <a:off x="319090" y="972000"/>
+            <a:off x="319090" y="283505"/>
             <a:ext cx="8508999" cy="410369"/>
           </a:xfrm>
           <a:prstGeom prst="rect">
@@ -8472,7 +8565,73 @@
       </p:grpSpPr>
       <p:sp>
         <p:nvSpPr>
-          <p:cNvPr id="10" name="Titel 9"/>
+          <p:cNvPr id="2" name="Inhaltsplatzhalter 1">
+            <a:extLst>
+              <a:ext uri="{FF2B5EF4-FFF2-40B4-BE49-F238E27FC236}">
+                <a16:creationId xmlns:a16="http://schemas.microsoft.com/office/drawing/2014/main" id="{8D7E9E3F-D8C9-136F-056C-F90511BEAF66}"/>
+              </a:ext>
+            </a:extLst>
+          </p:cNvPr>
+          <p:cNvSpPr>
+            <a:spLocks noGrp="1"/>
+          </p:cNvSpPr>
+          <p:nvPr>
+            <p:ph idx="14"/>
+          </p:nvPr>
+        </p:nvSpPr>
+        <p:spPr>
+          <a:xfrm>
+            <a:off x="319091" y="985520"/>
+            <a:ext cx="4180910" cy="3712106"/>
+          </a:xfrm>
+        </p:spPr>
+        <p:txBody>
+          <a:bodyPr/>
+          <a:lstStyle/>
+          <a:p>
+            <a:endParaRPr lang="de-DE"/>
+          </a:p>
+        </p:txBody>
+      </p:sp>
+      <p:sp>
+        <p:nvSpPr>
+          <p:cNvPr id="3" name="Inhaltsplatzhalter 2">
+            <a:extLst>
+              <a:ext uri="{FF2B5EF4-FFF2-40B4-BE49-F238E27FC236}">
+                <a16:creationId xmlns:a16="http://schemas.microsoft.com/office/drawing/2014/main" id="{881088A2-3C17-BDCC-D633-FDB02CEFF581}"/>
+              </a:ext>
+            </a:extLst>
+          </p:cNvPr>
+          <p:cNvSpPr>
+            <a:spLocks noGrp="1"/>
+          </p:cNvSpPr>
+          <p:nvPr>
+            <p:ph idx="15"/>
+          </p:nvPr>
+        </p:nvSpPr>
+        <p:spPr>
+          <a:xfrm>
+            <a:off x="4647179" y="985520"/>
+            <a:ext cx="4180910" cy="3712106"/>
+          </a:xfrm>
+        </p:spPr>
+        <p:txBody>
+          <a:bodyPr/>
+          <a:lstStyle/>
+          <a:p>
+            <a:endParaRPr lang="de-DE"/>
+          </a:p>
+        </p:txBody>
+      </p:sp>
+      <p:sp>
+        <p:nvSpPr>
+          <p:cNvPr id="4" name="Titel 3">
+            <a:extLst>
+              <a:ext uri="{FF2B5EF4-FFF2-40B4-BE49-F238E27FC236}">
+                <a16:creationId xmlns:a16="http://schemas.microsoft.com/office/drawing/2014/main" id="{67F787CB-3960-0C01-F817-40FF3B97CB9D}"/>
+              </a:ext>
+            </a:extLst>
+          </p:cNvPr>
           <p:cNvSpPr>
             <a:spLocks noGrp="1"/>
           </p:cNvSpPr>
@@ -8480,26 +8639,37 @@
             <p:ph type="title"/>
           </p:nvPr>
         </p:nvSpPr>
-        <p:spPr/>
+        <p:spPr>
+          <a:xfrm>
+            <a:off x="319090" y="283507"/>
+            <a:ext cx="8508999" cy="380745"/>
+          </a:xfrm>
+        </p:spPr>
         <p:txBody>
           <a:bodyPr/>
           <a:lstStyle/>
           <a:p>
             <a:r>
               <a:rPr lang="de-DE" dirty="0"/>
-              <a:t>(4) Einordnung der gesamten Ausarbeitung</a:t>
+              <a:t>Performanz</a:t>
             </a:r>
           </a:p>
         </p:txBody>
       </p:sp>
       <p:sp>
         <p:nvSpPr>
-          <p:cNvPr id="3" name="Inhaltsplatzhalter 2"/>
+          <p:cNvPr id="5" name="Foliennummernplatzhalter 4">
+            <a:extLst>
+              <a:ext uri="{FF2B5EF4-FFF2-40B4-BE49-F238E27FC236}">
+                <a16:creationId xmlns:a16="http://schemas.microsoft.com/office/drawing/2014/main" id="{C54877B7-CC28-BAC6-022A-50E4859EA347}"/>
+              </a:ext>
+            </a:extLst>
+          </p:cNvPr>
           <p:cNvSpPr>
             <a:spLocks noGrp="1"/>
           </p:cNvSpPr>
           <p:nvPr>
-            <p:ph idx="10"/>
+            <p:ph type="sldNum" sz="quarter" idx="16"/>
           </p:nvPr>
         </p:nvSpPr>
         <p:spPr/>
@@ -8507,28 +8677,48 @@
           <a:bodyPr/>
           <a:lstStyle/>
           <a:p>
-            <a:r>
-              <a:rPr lang="de-DE" dirty="0"/>
-              <a:t>Ludwig Gröber,  Julian Pins,  Daniel </a:t>
-            </a:r>
-            <a:r>
-              <a:rPr lang="de-DE" dirty="0" err="1"/>
-              <a:t>Safyan</a:t>
-            </a:r>
+            <a:fld id="{CE58CB1E-F828-4F11-99E0-327109AF9DA4}" type="slidenum">
+              <a:rPr lang="de-DE" smtClean="0"/>
+              <a:pPr/>
+              <a:t>10</a:t>
+            </a:fld>
             <a:endParaRPr lang="de-DE" dirty="0"/>
           </a:p>
-          <a:p>
-            <a:r>
-              <a:rPr lang="de-DE" dirty="0"/>
-              <a:t>München, 21. August 2023</a:t>
-            </a:r>
+        </p:txBody>
+      </p:sp>
+      <p:sp>
+        <p:nvSpPr>
+          <p:cNvPr id="6" name="Fußzeilenplatzhalter 5">
+            <a:extLst>
+              <a:ext uri="{FF2B5EF4-FFF2-40B4-BE49-F238E27FC236}">
+                <a16:creationId xmlns:a16="http://schemas.microsoft.com/office/drawing/2014/main" id="{618F1D88-FB99-B288-A3D7-D98A68247902}"/>
+              </a:ext>
+            </a:extLst>
+          </p:cNvPr>
+          <p:cNvSpPr>
+            <a:spLocks noGrp="1"/>
+          </p:cNvSpPr>
+          <p:nvPr>
+            <p:ph type="ftr" sz="quarter" idx="17"/>
+          </p:nvPr>
+        </p:nvSpPr>
+        <p:spPr/>
+        <p:txBody>
+          <a:bodyPr/>
+          <a:lstStyle/>
+          <a:p>
+            <a:r>
+              <a:rPr lang="de-DE"/>
+              <a:t>Praktikum GRA | Gruppe 233 | Vortrag zu Aufgabe A316</a:t>
+            </a:r>
+            <a:endParaRPr lang="en-US" dirty="0"/>
           </a:p>
         </p:txBody>
       </p:sp>
     </p:spTree>
     <p:extLst>
       <p:ext uri="{BB962C8B-B14F-4D97-AF65-F5344CB8AC3E}">
-        <p14:creationId xmlns:p14="http://schemas.microsoft.com/office/powerpoint/2010/main" val="850646671"/>
+        <p14:creationId xmlns:p14="http://schemas.microsoft.com/office/powerpoint/2010/main" val="180808"/>
       </p:ext>
     </p:extLst>
   </p:cSld>
@@ -8557,10 +8747,159 @@
       </p:grpSpPr>
       <p:sp>
         <p:nvSpPr>
+          <p:cNvPr id="10" name="Titel 9"/>
+          <p:cNvSpPr>
+            <a:spLocks noGrp="1"/>
+          </p:cNvSpPr>
+          <p:nvPr>
+            <p:ph type="title"/>
+          </p:nvPr>
+        </p:nvSpPr>
+        <p:spPr/>
+        <p:txBody>
+          <a:bodyPr/>
+          <a:lstStyle/>
+          <a:p>
+            <a:r>
+              <a:rPr lang="de-DE" dirty="0"/>
+              <a:t>(4) Einordnung der gesamten Ausarbeitung</a:t>
+            </a:r>
+          </a:p>
+        </p:txBody>
+      </p:sp>
+      <p:sp>
+        <p:nvSpPr>
+          <p:cNvPr id="3" name="Inhaltsplatzhalter 2"/>
+          <p:cNvSpPr>
+            <a:spLocks noGrp="1"/>
+          </p:cNvSpPr>
+          <p:nvPr>
+            <p:ph idx="10"/>
+          </p:nvPr>
+        </p:nvSpPr>
+        <p:spPr/>
+        <p:txBody>
+          <a:bodyPr/>
+          <a:lstStyle/>
+          <a:p>
+            <a:r>
+              <a:rPr lang="de-DE" dirty="0"/>
+              <a:t>Ludwig Gröber,  Julian Pins,  Daniel </a:t>
+            </a:r>
+            <a:r>
+              <a:rPr lang="de-DE" dirty="0" err="1"/>
+              <a:t>Safyan</a:t>
+            </a:r>
+            <a:endParaRPr lang="de-DE" dirty="0"/>
+          </a:p>
+          <a:p>
+            <a:r>
+              <a:rPr lang="de-DE" dirty="0"/>
+              <a:t>München, 21. August 2023</a:t>
+            </a:r>
+          </a:p>
+        </p:txBody>
+      </p:sp>
+      <p:sp>
+        <p:nvSpPr>
+          <p:cNvPr id="2" name="Rechteck 1">
+            <a:extLst>
+              <a:ext uri="{FF2B5EF4-FFF2-40B4-BE49-F238E27FC236}">
+                <a16:creationId xmlns:a16="http://schemas.microsoft.com/office/drawing/2014/main" id="{7DACC672-A168-E756-7D17-E2D7CEF256B1}"/>
+              </a:ext>
+            </a:extLst>
+          </p:cNvPr>
+          <p:cNvSpPr/>
+          <p:nvPr/>
+        </p:nvSpPr>
+        <p:spPr>
+          <a:xfrm>
+            <a:off x="711200" y="3169920"/>
+            <a:ext cx="2611120" cy="589280"/>
+          </a:xfrm>
+          <a:prstGeom prst="rect">
+            <a:avLst/>
+          </a:prstGeom>
+          <a:solidFill>
+            <a:schemeClr val="accent6"/>
+          </a:solidFill>
+          <a:ln>
+            <a:noFill/>
+          </a:ln>
+        </p:spPr>
+        <p:style>
+          <a:lnRef idx="2">
+            <a:schemeClr val="accent1">
+              <a:shade val="50000"/>
+            </a:schemeClr>
+          </a:lnRef>
+          <a:fillRef idx="1">
+            <a:schemeClr val="accent1"/>
+          </a:fillRef>
+          <a:effectRef idx="0">
+            <a:schemeClr val="accent1"/>
+          </a:effectRef>
+          <a:fontRef idx="minor">
+            <a:schemeClr val="lt1"/>
+          </a:fontRef>
+        </p:style>
+        <p:txBody>
+          <a:bodyPr rot="0" spcFirstLastPara="0" vertOverflow="overflow" horzOverflow="overflow" vert="horz" wrap="square" lIns="91440" tIns="45720" rIns="91440" bIns="45720" numCol="1" spcCol="0" rtlCol="0" fromWordArt="0" anchor="t" anchorCtr="0" forceAA="0" compatLnSpc="1">
+            <a:prstTxWarp prst="textNoShape">
+              <a:avLst/>
+            </a:prstTxWarp>
+            <a:noAutofit/>
+          </a:bodyPr>
+          <a:lstStyle/>
+          <a:p>
+            <a:pPr algn="ctr">
+              <a:lnSpc>
+                <a:spcPct val="114000"/>
+              </a:lnSpc>
+            </a:pPr>
+            <a:r>
+              <a:rPr lang="de-DE" sz="2800" b="1" dirty="0"/>
+              <a:t>Alle</a:t>
+            </a:r>
+          </a:p>
+        </p:txBody>
+      </p:sp>
+    </p:spTree>
+    <p:extLst>
+      <p:ext uri="{BB962C8B-B14F-4D97-AF65-F5344CB8AC3E}">
+        <p14:creationId xmlns:p14="http://schemas.microsoft.com/office/powerpoint/2010/main" val="850646671"/>
+      </p:ext>
+    </p:extLst>
+  </p:cSld>
+  <p:clrMapOvr>
+    <a:masterClrMapping/>
+  </p:clrMapOvr>
+</p:sld>
+</file>
+
+<file path=ppt/slides/slide12.xml><?xml version="1.0" encoding="utf-8"?>
+<p:sld xmlns:a="http://schemas.openxmlformats.org/drawingml/2006/main" xmlns:r="http://schemas.openxmlformats.org/officeDocument/2006/relationships" xmlns:p="http://schemas.openxmlformats.org/presentationml/2006/main">
+  <p:cSld>
+    <p:spTree>
+      <p:nvGrpSpPr>
+        <p:cNvPr id="1" name=""/>
+        <p:cNvGrpSpPr/>
+        <p:nvPr/>
+      </p:nvGrpSpPr>
+      <p:grpSpPr>
+        <a:xfrm>
+          <a:off x="0" y="0"/>
+          <a:ext cx="0" cy="0"/>
+          <a:chOff x="0" y="0"/>
+          <a:chExt cx="0" cy="0"/>
+        </a:xfrm>
+      </p:grpSpPr>
+      <p:sp>
+        <p:nvSpPr>
           <p:cNvPr id="2" name="Inhaltsplatzhalter 1">
             <a:extLst>
               <a:ext uri="{FF2B5EF4-FFF2-40B4-BE49-F238E27FC236}">
-                <a16:creationId xmlns:a16="http://schemas.microsoft.com/office/drawing/2014/main" id="{98AEEBF2-EB4F-334F-716D-CAF674A3E2E5}"/>
+                <a16:creationId xmlns:a16="http://schemas.microsoft.com/office/drawing/2014/main" id="{8004E12C-AA10-78FB-4A71-FB52FBF91EBC}"/>
               </a:ext>
             </a:extLst>
           </p:cNvPr>
@@ -8568,32 +8907,26 @@
             <a:spLocks noGrp="1"/>
           </p:cNvSpPr>
           <p:nvPr>
-            <p:ph idx="1"/>
+            <p:ph idx="14"/>
           </p:nvPr>
         </p:nvSpPr>
-        <p:spPr/>
+        <p:spPr>
+          <a:xfrm>
+            <a:off x="319091" y="1016000"/>
+            <a:ext cx="4180910" cy="3681626"/>
+          </a:xfrm>
+        </p:spPr>
         <p:txBody>
           <a:bodyPr/>
           <a:lstStyle/>
           <a:p>
-            <a:pPr marL="342900" indent="-342900">
-              <a:buFont typeface="+mj-lt"/>
-              <a:buAutoNum type="arabicPeriod"/>
-            </a:pPr>
             <a:r>
               <a:rPr lang="de-DE" b="0" i="0" dirty="0">
                 <a:effectLst/>
                 <a:latin typeface="Arial" panose="020B0604020202020204" pitchFamily="34" charset="0"/>
               </a:rPr>
-              <a:t>Trade-off zwischen Performance, Genauigkeit und Speicherverbrauch für die Implementierungen sehr unterschiedlich.</a:t>
-            </a:r>
-          </a:p>
-          <a:p>
-            <a:pPr marL="342900" indent="-342900">
-              <a:buFont typeface="+mj-lt"/>
-              <a:buAutoNum type="arabicPeriod"/>
-            </a:pPr>
-            <a:endParaRPr lang="de-DE" dirty="0"/>
+              <a:t>1. Trade-off zwischen Performance, Genauigkeit und Speicherverbrauch für die Implementierungen sehr unterschiedlich.</a:t>
+            </a:r>
           </a:p>
           <a:p>
             <a:endParaRPr lang="de-DE" dirty="0"/>
@@ -8602,10 +8935,40 @@
       </p:sp>
       <p:sp>
         <p:nvSpPr>
-          <p:cNvPr id="3" name="Titel 2">
+          <p:cNvPr id="3" name="Inhaltsplatzhalter 2">
             <a:extLst>
               <a:ext uri="{FF2B5EF4-FFF2-40B4-BE49-F238E27FC236}">
-                <a16:creationId xmlns:a16="http://schemas.microsoft.com/office/drawing/2014/main" id="{A4868E33-C8EE-14AD-5322-717F1BBDC88E}"/>
+                <a16:creationId xmlns:a16="http://schemas.microsoft.com/office/drawing/2014/main" id="{33F12F86-A6C7-614D-1D4F-5F1AF79CF801}"/>
+              </a:ext>
+            </a:extLst>
+          </p:cNvPr>
+          <p:cNvSpPr>
+            <a:spLocks noGrp="1"/>
+          </p:cNvSpPr>
+          <p:nvPr>
+            <p:ph idx="15"/>
+          </p:nvPr>
+        </p:nvSpPr>
+        <p:spPr>
+          <a:xfrm>
+            <a:off x="4647179" y="1016000"/>
+            <a:ext cx="4180910" cy="3681626"/>
+          </a:xfrm>
+        </p:spPr>
+        <p:txBody>
+          <a:bodyPr/>
+          <a:lstStyle/>
+          <a:p>
+            <a:endParaRPr lang="de-DE"/>
+          </a:p>
+        </p:txBody>
+      </p:sp>
+      <p:sp>
+        <p:nvSpPr>
+          <p:cNvPr id="4" name="Titel 3">
+            <a:extLst>
+              <a:ext uri="{FF2B5EF4-FFF2-40B4-BE49-F238E27FC236}">
+                <a16:creationId xmlns:a16="http://schemas.microsoft.com/office/drawing/2014/main" id="{5E387CAB-35D4-00D1-722C-9F3E80EBC966}"/>
               </a:ext>
             </a:extLst>
           </p:cNvPr>
@@ -8618,7 +8981,7 @@
         </p:nvSpPr>
         <p:spPr>
           <a:xfrm>
-            <a:off x="319090" y="972000"/>
+            <a:off x="319090" y="283507"/>
             <a:ext cx="8508999" cy="380745"/>
           </a:xfrm>
         </p:spPr>
@@ -8635,10 +8998,10 @@
       </p:sp>
       <p:sp>
         <p:nvSpPr>
-          <p:cNvPr id="4" name="Foliennummernplatzhalter 3">
+          <p:cNvPr id="5" name="Foliennummernplatzhalter 4">
             <a:extLst>
               <a:ext uri="{FF2B5EF4-FFF2-40B4-BE49-F238E27FC236}">
-                <a16:creationId xmlns:a16="http://schemas.microsoft.com/office/drawing/2014/main" id="{8E895C9B-CD68-00B6-16D0-4D6D88D5FBF5}"/>
+                <a16:creationId xmlns:a16="http://schemas.microsoft.com/office/drawing/2014/main" id="{895166A6-C8D1-81BA-8138-2C84C35AE5F4}"/>
               </a:ext>
             </a:extLst>
           </p:cNvPr>
@@ -8646,7 +9009,7 @@
             <a:spLocks noGrp="1"/>
           </p:cNvSpPr>
           <p:nvPr>
-            <p:ph type="sldNum" sz="quarter" idx="11"/>
+            <p:ph type="sldNum" sz="quarter" idx="16"/>
           </p:nvPr>
         </p:nvSpPr>
         <p:spPr/>
@@ -8657,7 +9020,7 @@
             <a:fld id="{CE58CB1E-F828-4F11-99E0-327109AF9DA4}" type="slidenum">
               <a:rPr lang="de-DE" smtClean="0"/>
               <a:pPr/>
-              <a:t>11</a:t>
+              <a:t>12</a:t>
             </a:fld>
             <a:endParaRPr lang="de-DE" dirty="0"/>
           </a:p>
@@ -8665,10 +9028,10 @@
       </p:sp>
       <p:sp>
         <p:nvSpPr>
-          <p:cNvPr id="5" name="Fußzeilenplatzhalter 4">
+          <p:cNvPr id="6" name="Fußzeilenplatzhalter 5">
             <a:extLst>
               <a:ext uri="{FF2B5EF4-FFF2-40B4-BE49-F238E27FC236}">
-                <a16:creationId xmlns:a16="http://schemas.microsoft.com/office/drawing/2014/main" id="{0AC2B35B-038C-CB53-F9E6-8D5C53C83457}"/>
+                <a16:creationId xmlns:a16="http://schemas.microsoft.com/office/drawing/2014/main" id="{1B7822FE-7378-E7B7-4CF4-7F21FF497D3E}"/>
               </a:ext>
             </a:extLst>
           </p:cNvPr>
@@ -8676,7 +9039,7 @@
             <a:spLocks noGrp="1"/>
           </p:cNvSpPr>
           <p:nvPr>
-            <p:ph type="ftr" sz="quarter" idx="12"/>
+            <p:ph type="ftr" sz="quarter" idx="17"/>
           </p:nvPr>
         </p:nvSpPr>
         <p:spPr/>
@@ -8695,7 +9058,7 @@
     </p:spTree>
     <p:extLst>
       <p:ext uri="{BB962C8B-B14F-4D97-AF65-F5344CB8AC3E}">
-        <p14:creationId xmlns:p14="http://schemas.microsoft.com/office/powerpoint/2010/main" val="145210015"/>
+        <p14:creationId xmlns:p14="http://schemas.microsoft.com/office/powerpoint/2010/main" val="3375857549"/>
       </p:ext>
     </p:extLst>
   </p:cSld>
@@ -8705,8 +9068,96 @@
 </p:sld>
 </file>
 
-<file path=ppt/slides/slide12.xml><?xml version="1.0" encoding="utf-8"?>
+<file path=ppt/slides/slide13.xml><?xml version="1.0" encoding="utf-8"?>
 <p:sld xmlns:a="http://schemas.openxmlformats.org/drawingml/2006/main" xmlns:r="http://schemas.openxmlformats.org/officeDocument/2006/relationships" xmlns:p="http://schemas.openxmlformats.org/presentationml/2006/main">
+  <p:cSld>
+    <p:spTree>
+      <p:nvGrpSpPr>
+        <p:cNvPr id="1" name=""/>
+        <p:cNvGrpSpPr/>
+        <p:nvPr/>
+      </p:nvGrpSpPr>
+      <p:grpSpPr>
+        <a:xfrm>
+          <a:off x="0" y="0"/>
+          <a:ext cx="0" cy="0"/>
+          <a:chOff x="0" y="0"/>
+          <a:chExt cx="0" cy="0"/>
+        </a:xfrm>
+      </p:grpSpPr>
+      <p:sp>
+        <p:nvSpPr>
+          <p:cNvPr id="2" name="Titel 1">
+            <a:extLst>
+              <a:ext uri="{FF2B5EF4-FFF2-40B4-BE49-F238E27FC236}">
+                <a16:creationId xmlns:a16="http://schemas.microsoft.com/office/drawing/2014/main" id="{2E38B16B-7FC0-9C08-9E9A-F0744D18EBFA}"/>
+              </a:ext>
+            </a:extLst>
+          </p:cNvPr>
+          <p:cNvSpPr>
+            <a:spLocks noGrp="1"/>
+          </p:cNvSpPr>
+          <p:nvPr>
+            <p:ph type="title"/>
+          </p:nvPr>
+        </p:nvSpPr>
+        <p:spPr/>
+        <p:txBody>
+          <a:bodyPr/>
+          <a:lstStyle/>
+          <a:p>
+            <a:r>
+              <a:rPr lang="de-DE" dirty="0"/>
+              <a:t>Danke für die Aufmerksamkeit &amp; Zeit für Fragen</a:t>
+            </a:r>
+          </a:p>
+        </p:txBody>
+      </p:sp>
+      <p:pic>
+        <p:nvPicPr>
+          <p:cNvPr id="4" name="Grafik 3">
+            <a:extLst>
+              <a:ext uri="{FF2B5EF4-FFF2-40B4-BE49-F238E27FC236}">
+                <a16:creationId xmlns:a16="http://schemas.microsoft.com/office/drawing/2014/main" id="{5F8066BA-0D3D-5C38-F4AA-F75F823D494B}"/>
+              </a:ext>
+            </a:extLst>
+          </p:cNvPr>
+          <p:cNvPicPr>
+            <a:picLocks noChangeAspect="1"/>
+          </p:cNvPicPr>
+          <p:nvPr/>
+        </p:nvPicPr>
+        <p:blipFill>
+          <a:blip r:embed="rId2"/>
+          <a:stretch>
+            <a:fillRect/>
+          </a:stretch>
+        </p:blipFill>
+        <p:spPr>
+          <a:xfrm>
+            <a:off x="861031" y="2150617"/>
+            <a:ext cx="7421938" cy="2020883"/>
+          </a:xfrm>
+          <a:prstGeom prst="rect">
+            <a:avLst/>
+          </a:prstGeom>
+        </p:spPr>
+      </p:pic>
+    </p:spTree>
+    <p:extLst>
+      <p:ext uri="{BB962C8B-B14F-4D97-AF65-F5344CB8AC3E}">
+        <p14:creationId xmlns:p14="http://schemas.microsoft.com/office/powerpoint/2010/main" val="4126326688"/>
+      </p:ext>
+    </p:extLst>
+  </p:cSld>
+  <p:clrMapOvr>
+    <a:masterClrMapping/>
+  </p:clrMapOvr>
+</p:sld>
+</file>
+
+<file path=ppt/slides/slide14.xml><?xml version="1.0" encoding="utf-8"?>
+<p:sld xmlns:a="http://schemas.openxmlformats.org/drawingml/2006/main" xmlns:r="http://schemas.openxmlformats.org/officeDocument/2006/relationships" xmlns:p="http://schemas.openxmlformats.org/presentationml/2006/main" show="0">
   <p:cSld>
     <p:spTree>
       <p:nvGrpSpPr>
@@ -8779,7 +9230,7 @@
             <a:fld id="{CE58CB1E-F828-4F11-99E0-327109AF9DA4}" type="slidenum">
               <a:rPr lang="de-DE" smtClean="0"/>
               <a:pPr/>
-              <a:t>12</a:t>
+              <a:t>14</a:t>
             </a:fld>
             <a:endParaRPr lang="de-DE" dirty="0"/>
           </a:p>
@@ -8807,7 +9258,7 @@
           <a:lstStyle/>
           <a:p>
             <a:r>
-              <a:rPr lang="de-DE"/>
+              <a:rPr lang="de-DE" dirty="0"/>
               <a:t>Praktikum GRA | Gruppe 233 | Vortrag zu Aufgabe A316</a:t>
             </a:r>
             <a:endParaRPr lang="en-US" dirty="0"/>
@@ -8830,8 +9281,8 @@
         </p:nvSpPr>
         <p:spPr>
           <a:xfrm>
-            <a:off x="319088" y="1484039"/>
-            <a:ext cx="8508999" cy="2826703"/>
+            <a:off x="319088" y="3619728"/>
+            <a:ext cx="8508999" cy="1056774"/>
           </a:xfrm>
           <a:prstGeom prst="rect">
             <a:avLst/>
@@ -9057,8 +9508,8 @@
 </p:sld>
 </file>
 
-<file path=ppt/slides/slide13.xml><?xml version="1.0" encoding="utf-8"?>
-<p:sld xmlns:a="http://schemas.openxmlformats.org/drawingml/2006/main" xmlns:r="http://schemas.openxmlformats.org/officeDocument/2006/relationships" xmlns:p="http://schemas.openxmlformats.org/presentationml/2006/main">
+<file path=ppt/slides/slide15.xml><?xml version="1.0" encoding="utf-8"?>
+<p:sld xmlns:a="http://schemas.openxmlformats.org/drawingml/2006/main" xmlns:r="http://schemas.openxmlformats.org/officeDocument/2006/relationships" xmlns:p="http://schemas.openxmlformats.org/presentationml/2006/main" show="0">
   <p:cSld>
     <p:spTree>
       <p:nvGrpSpPr>
@@ -9730,7 +10181,7 @@
             <a:fld id="{CE58CB1E-F828-4F11-99E0-327109AF9DA4}" type="slidenum">
               <a:rPr lang="de-DE" smtClean="0"/>
               <a:pPr/>
-              <a:t>13</a:t>
+              <a:t>15</a:t>
             </a:fld>
             <a:endParaRPr lang="de-DE" dirty="0"/>
           </a:p>
@@ -9796,8 +10247,8 @@
 </p:sld>
 </file>
 
-<file path=ppt/slides/slide14.xml><?xml version="1.0" encoding="utf-8"?>
-<p:sld xmlns:a="http://schemas.openxmlformats.org/drawingml/2006/main" xmlns:r="http://schemas.openxmlformats.org/officeDocument/2006/relationships" xmlns:p="http://schemas.openxmlformats.org/presentationml/2006/main">
+<file path=ppt/slides/slide16.xml><?xml version="1.0" encoding="utf-8"?>
+<p:sld xmlns:a="http://schemas.openxmlformats.org/drawingml/2006/main" xmlns:r="http://schemas.openxmlformats.org/officeDocument/2006/relationships" xmlns:p="http://schemas.openxmlformats.org/presentationml/2006/main" show="0">
   <p:cSld>
     <p:spTree>
       <p:nvGrpSpPr>
@@ -10259,7 +10710,7 @@
             <a:fld id="{CE58CB1E-F828-4F11-99E0-327109AF9DA4}" type="slidenum">
               <a:rPr lang="de-DE" smtClean="0"/>
               <a:pPr/>
-              <a:t>14</a:t>
+              <a:t>16</a:t>
             </a:fld>
             <a:endParaRPr lang="de-DE" dirty="0"/>
           </a:p>
@@ -10326,8 +10777,8 @@
 </p:sld>
 </file>
 
-<file path=ppt/slides/slide15.xml><?xml version="1.0" encoding="utf-8"?>
-<p:sld xmlns:a="http://schemas.openxmlformats.org/drawingml/2006/main" xmlns:r="http://schemas.openxmlformats.org/officeDocument/2006/relationships" xmlns:p="http://schemas.openxmlformats.org/presentationml/2006/main">
+<file path=ppt/slides/slide17.xml><?xml version="1.0" encoding="utf-8"?>
+<p:sld xmlns:a="http://schemas.openxmlformats.org/drawingml/2006/main" xmlns:r="http://schemas.openxmlformats.org/officeDocument/2006/relationships" xmlns:p="http://schemas.openxmlformats.org/presentationml/2006/main" show="0">
   <p:cSld>
     <p:spTree>
       <p:nvGrpSpPr>
@@ -10384,7 +10835,7 @@
             <a:fld id="{CE58CB1E-F828-4F11-99E0-327109AF9DA4}" type="slidenum">
               <a:rPr lang="de-DE" smtClean="0"/>
               <a:pPr/>
-              <a:t>15</a:t>
+              <a:t>17</a:t>
             </a:fld>
             <a:endParaRPr lang="de-DE" dirty="0"/>
           </a:p>
@@ -10478,8 +10929,8 @@
 </p:sld>
 </file>
 
-<file path=ppt/slides/slide16.xml><?xml version="1.0" encoding="utf-8"?>
-<p:sld xmlns:a="http://schemas.openxmlformats.org/drawingml/2006/main" xmlns:r="http://schemas.openxmlformats.org/officeDocument/2006/relationships" xmlns:p="http://schemas.openxmlformats.org/presentationml/2006/main">
+<file path=ppt/slides/slide18.xml><?xml version="1.0" encoding="utf-8"?>
+<p:sld xmlns:a="http://schemas.openxmlformats.org/drawingml/2006/main" xmlns:r="http://schemas.openxmlformats.org/officeDocument/2006/relationships" xmlns:p="http://schemas.openxmlformats.org/presentationml/2006/main" show="0">
   <p:cSld>
     <p:spTree>
       <p:nvGrpSpPr>
@@ -10561,7 +11012,7 @@
             <a:fld id="{CE58CB1E-F828-4F11-99E0-327109AF9DA4}" type="slidenum">
               <a:rPr lang="de-DE" smtClean="0"/>
               <a:pPr/>
-              <a:t>16</a:t>
+              <a:t>18</a:t>
             </a:fld>
             <a:endParaRPr lang="de-DE" dirty="0"/>
           </a:p>
@@ -10629,8 +11080,8 @@
             </p:nvSpPr>
             <p:spPr>
               <a:xfrm>
-                <a:off x="319090" y="1297312"/>
-                <a:ext cx="8508999" cy="1226077"/>
+                <a:off x="319090" y="1103343"/>
+                <a:ext cx="8508999" cy="955594"/>
               </a:xfrm>
             </p:spPr>
             <p:txBody>
@@ -10639,7 +11090,7 @@
               <a:p>
                 <a:pPr algn="ctr"/>
                 <a:r>
-                  <a:rPr lang="de-DE" b="0" i="0" dirty="0">
+                  <a:rPr lang="de-DE" sz="2000" b="0" i="0" dirty="0">
                     <a:effectLst/>
                     <a:latin typeface="Arial" panose="020B0604020202020204" pitchFamily="34" charset="0"/>
                   </a:rPr>
@@ -10648,56 +11099,56 @@
                 <a14:m>
                   <m:oMath xmlns:m="http://schemas.openxmlformats.org/officeDocument/2006/math">
                     <m:r>
-                      <a:rPr lang="de-DE" b="0" i="1" dirty="0" smtClean="0">
+                      <a:rPr lang="de-DE" sz="2000" b="0" i="1" dirty="0" smtClean="0">
                         <a:effectLst/>
                         <a:latin typeface="Cambria Math" panose="02040503050406030204" pitchFamily="18" charset="0"/>
                       </a:rPr>
                       <m:t>𝑓</m:t>
                     </m:r>
                     <m:r>
-                      <a:rPr lang="de-DE" b="0" i="1" dirty="0" smtClean="0">
+                      <a:rPr lang="de-DE" sz="2000" b="0" i="1" dirty="0" smtClean="0">
                         <a:effectLst/>
                         <a:latin typeface="Cambria Math" panose="02040503050406030204" pitchFamily="18" charset="0"/>
                       </a:rPr>
                       <m:t>(</m:t>
                     </m:r>
                     <m:r>
-                      <a:rPr lang="de-DE" b="0" i="1" dirty="0" smtClean="0">
+                      <a:rPr lang="de-DE" sz="2000" b="0" i="1" dirty="0" smtClean="0">
                         <a:effectLst/>
                         <a:latin typeface="Cambria Math" panose="02040503050406030204" pitchFamily="18" charset="0"/>
                       </a:rPr>
                       <m:t>𝑥</m:t>
                     </m:r>
                     <m:r>
-                      <a:rPr lang="de-DE" b="0" i="1" dirty="0" smtClean="0">
+                      <a:rPr lang="de-DE" sz="2000" b="0" i="1" dirty="0" smtClean="0">
                         <a:effectLst/>
                         <a:latin typeface="Cambria Math" panose="02040503050406030204" pitchFamily="18" charset="0"/>
                       </a:rPr>
                       <m:t>) = </m:t>
                     </m:r>
                     <m:r>
-                      <a:rPr lang="de-DE" b="0" i="1" dirty="0" err="1" smtClean="0">
+                      <a:rPr lang="de-DE" sz="2000" b="0" i="1" dirty="0" err="1" smtClean="0">
                         <a:effectLst/>
                         <a:latin typeface="Cambria Math" panose="02040503050406030204" pitchFamily="18" charset="0"/>
                       </a:rPr>
                       <m:t>𝑎𝑟𝑠𝑖𝑛h</m:t>
                     </m:r>
                     <m:r>
-                      <a:rPr lang="de-DE" b="0" i="1" dirty="0" smtClean="0">
+                      <a:rPr lang="de-DE" sz="2000" b="0" i="1" dirty="0" smtClean="0">
                         <a:effectLst/>
                         <a:latin typeface="Cambria Math" panose="02040503050406030204" pitchFamily="18" charset="0"/>
                       </a:rPr>
                       <m:t>(</m:t>
                     </m:r>
                     <m:r>
-                      <a:rPr lang="de-DE" b="0" i="1" dirty="0" smtClean="0">
+                      <a:rPr lang="de-DE" sz="2000" b="0" i="1" dirty="0" smtClean="0">
                         <a:effectLst/>
                         <a:latin typeface="Cambria Math" panose="02040503050406030204" pitchFamily="18" charset="0"/>
                       </a:rPr>
                       <m:t>𝑥</m:t>
                     </m:r>
                     <m:r>
-                      <a:rPr lang="de-DE" b="0" i="1" dirty="0" smtClean="0">
+                      <a:rPr lang="de-DE" sz="2000" b="0" i="1" dirty="0" smtClean="0">
                         <a:effectLst/>
                         <a:latin typeface="Cambria Math" panose="02040503050406030204" pitchFamily="18" charset="0"/>
                       </a:rPr>
@@ -10706,13 +11157,13 @@
                   </m:oMath>
                 </a14:m>
                 <a:r>
-                  <a:rPr lang="de-DE" b="0" i="0" dirty="0">
+                  <a:rPr lang="de-DE" sz="2000" b="0" i="0" dirty="0">
                     <a:effectLst/>
                     <a:latin typeface="Arial" panose="020B0604020202020204" pitchFamily="34" charset="0"/>
                   </a:rPr>
                   <a:t> im C17 Standard von C.</a:t>
                 </a:r>
-                <a:endParaRPr lang="de-DE" dirty="0"/>
+                <a:endParaRPr lang="de-DE" sz="2000" dirty="0"/>
               </a:p>
             </p:txBody>
           </p:sp>
@@ -10730,13 +11181,13 @@
             </p:nvSpPr>
             <p:spPr>
               <a:xfrm>
-                <a:off x="319090" y="1297312"/>
-                <a:ext cx="8508999" cy="1226077"/>
+                <a:off x="319090" y="1103343"/>
+                <a:ext cx="8508999" cy="955594"/>
               </a:xfrm>
               <a:blipFill>
                 <a:blip r:embed="rId2"/>
                 <a:stretch>
-                  <a:fillRect t="-8247" b="-13402"/>
+                  <a:fillRect t="-1299"/>
                 </a:stretch>
               </a:blipFill>
             </p:spPr>
@@ -10767,7 +11218,7 @@
         </p:nvSpPr>
         <p:spPr>
           <a:xfrm>
-            <a:off x="319088" y="3329933"/>
+            <a:off x="319088" y="3842554"/>
             <a:ext cx="8508999" cy="955594"/>
           </a:xfrm>
         </p:spPr>
@@ -10777,11 +11228,41 @@
           <a:p>
             <a:r>
               <a:rPr lang="de-DE" dirty="0"/>
-              <a:t>Im folgenden erklären wir (1) den mathematischen Ansatz (2) den Ansatz und Abwägungen für die C Implementierungen (3) die gemessenen Ergebnisse vorgestellt (4) die gesamte Ausarbeitung eingeordnet </a:t>
+              <a:t>Im folgenden erklären wir (1) die mathematischen Ansätze (2) den Ansatz und Abwägungen für die C Implementierungen (3) die gemessenen Ergebnisse vorgestellt (4) die gesamte Ausarbeitung eingeordnet </a:t>
             </a:r>
           </a:p>
         </p:txBody>
       </p:sp>
+      <p:pic>
+        <p:nvPicPr>
+          <p:cNvPr id="4" name="Grafik 3">
+            <a:extLst>
+              <a:ext uri="{FF2B5EF4-FFF2-40B4-BE49-F238E27FC236}">
+                <a16:creationId xmlns:a16="http://schemas.microsoft.com/office/drawing/2014/main" id="{BF0789FD-67D7-50D0-AE0B-9ED5108CDB21}"/>
+              </a:ext>
+            </a:extLst>
+          </p:cNvPr>
+          <p:cNvPicPr>
+            <a:picLocks noChangeAspect="1"/>
+          </p:cNvPicPr>
+          <p:nvPr/>
+        </p:nvPicPr>
+        <p:blipFill>
+          <a:blip r:embed="rId3"/>
+          <a:stretch>
+            <a:fillRect/>
+          </a:stretch>
+        </p:blipFill>
+        <p:spPr>
+          <a:xfrm>
+            <a:off x="1562957" y="2203919"/>
+            <a:ext cx="6018086" cy="1638635"/>
+          </a:xfrm>
+          <a:prstGeom prst="rect">
+            <a:avLst/>
+          </a:prstGeom>
+        </p:spPr>
+      </p:pic>
     </p:spTree>
   </p:cSld>
   <p:clrMapOvr>
@@ -10824,7 +11305,7 @@
           <a:p>
             <a:r>
               <a:rPr lang="de-DE" dirty="0"/>
-              <a:t>(1) Der mathematische Ansatz</a:t>
+              <a:t>(1) Lösungsansatz</a:t>
             </a:r>
           </a:p>
         </p:txBody>
@@ -10858,6 +11339,70 @@
             <a:r>
               <a:rPr lang="de-DE" dirty="0"/>
               <a:t>München, 21. August 2023</a:t>
+            </a:r>
+          </a:p>
+        </p:txBody>
+      </p:sp>
+      <p:sp>
+        <p:nvSpPr>
+          <p:cNvPr id="2" name="Rechteck 1">
+            <a:extLst>
+              <a:ext uri="{FF2B5EF4-FFF2-40B4-BE49-F238E27FC236}">
+                <a16:creationId xmlns:a16="http://schemas.microsoft.com/office/drawing/2014/main" id="{A7F66E87-55E2-4E6B-2B21-0383ACF6B11F}"/>
+              </a:ext>
+            </a:extLst>
+          </p:cNvPr>
+          <p:cNvSpPr/>
+          <p:nvPr/>
+        </p:nvSpPr>
+        <p:spPr>
+          <a:xfrm>
+            <a:off x="711200" y="3169920"/>
+            <a:ext cx="2611120" cy="589280"/>
+          </a:xfrm>
+          <a:prstGeom prst="rect">
+            <a:avLst/>
+          </a:prstGeom>
+          <a:solidFill>
+            <a:schemeClr val="accent6"/>
+          </a:solidFill>
+          <a:ln>
+            <a:noFill/>
+          </a:ln>
+        </p:spPr>
+        <p:style>
+          <a:lnRef idx="2">
+            <a:schemeClr val="accent1">
+              <a:shade val="50000"/>
+            </a:schemeClr>
+          </a:lnRef>
+          <a:fillRef idx="1">
+            <a:schemeClr val="accent1"/>
+          </a:fillRef>
+          <a:effectRef idx="0">
+            <a:schemeClr val="accent1"/>
+          </a:effectRef>
+          <a:fontRef idx="minor">
+            <a:schemeClr val="lt1"/>
+          </a:fontRef>
+        </p:style>
+        <p:txBody>
+          <a:bodyPr rot="0" spcFirstLastPara="0" vertOverflow="overflow" horzOverflow="overflow" vert="horz" wrap="square" lIns="91440" tIns="45720" rIns="91440" bIns="45720" numCol="1" spcCol="0" rtlCol="0" fromWordArt="0" anchor="t" anchorCtr="0" forceAA="0" compatLnSpc="1">
+            <a:prstTxWarp prst="textNoShape">
+              <a:avLst/>
+            </a:prstTxWarp>
+            <a:noAutofit/>
+          </a:bodyPr>
+          <a:lstStyle/>
+          <a:p>
+            <a:pPr algn="ctr">
+              <a:lnSpc>
+                <a:spcPct val="114000"/>
+              </a:lnSpc>
+            </a:pPr>
+            <a:r>
+              <a:rPr lang="de-DE" sz="2800" b="1" dirty="0"/>
+              <a:t>Daniel</a:t>
             </a:r>
           </a:p>
         </p:txBody>
@@ -10887,267 +11432,418 @@
           <a:chExt cx="0" cy="0"/>
         </a:xfrm>
       </p:grpSpPr>
-      <mc:AlternateContent xmlns:mc="http://schemas.openxmlformats.org/markup-compatibility/2006" xmlns:a14="http://schemas.microsoft.com/office/drawing/2010/main">
-        <mc:Choice Requires="a14">
+      <p:sp>
+        <p:nvSpPr>
+          <p:cNvPr id="2" name="Inhaltsplatzhalter 1">
+            <a:extLst>
+              <a:ext uri="{FF2B5EF4-FFF2-40B4-BE49-F238E27FC236}">
+                <a16:creationId xmlns:a16="http://schemas.microsoft.com/office/drawing/2014/main" id="{102FB429-BB8A-FEDA-5CFC-47211AEB264D}"/>
+              </a:ext>
+            </a:extLst>
+          </p:cNvPr>
+          <p:cNvSpPr>
+            <a:spLocks noGrp="1"/>
+          </p:cNvSpPr>
+          <p:nvPr>
+            <p:ph idx="14"/>
+          </p:nvPr>
+        </p:nvSpPr>
+        <p:spPr>
+          <a:xfrm>
+            <a:off x="319091" y="842357"/>
+            <a:ext cx="4180910" cy="2297083"/>
+          </a:xfrm>
+        </p:spPr>
+        <p:txBody>
+          <a:bodyPr/>
+          <a:lstStyle/>
+          <a:p>
+            <a:r>
+              <a:rPr lang="de-DE" b="1" dirty="0"/>
+              <a:t>Reihendarstellung </a:t>
+            </a:r>
+            <a:r>
+              <a:rPr lang="de-DE" b="1" dirty="0" err="1"/>
+              <a:t>für</a:t>
+            </a:r>
+            <a:r>
+              <a:rPr lang="de-DE" b="1" dirty="0"/>
+              <a:t> |x| ≤ 1</a:t>
+            </a:r>
+          </a:p>
+          <a:p>
+            <a:endParaRPr lang="de-DE" b="1" dirty="0"/>
+          </a:p>
+          <a:p>
+            <a:endParaRPr lang="de-DE" b="1" dirty="0"/>
+          </a:p>
+          <a:p>
+            <a:r>
+              <a:rPr lang="de-DE" dirty="0">
+                <a:solidFill>
+                  <a:srgbClr val="FF0000"/>
+                </a:solidFill>
+              </a:rPr>
+              <a:t>TODO DANIEL</a:t>
+            </a:r>
+          </a:p>
+          <a:p>
+            <a:endParaRPr lang="de-DE" dirty="0"/>
+          </a:p>
+          <a:p>
+            <a:endParaRPr lang="de-DE" dirty="0"/>
+          </a:p>
+        </p:txBody>
+      </p:sp>
+      <p:sp>
+        <p:nvSpPr>
+          <p:cNvPr id="3" name="Inhaltsplatzhalter 2">
+            <a:extLst>
+              <a:ext uri="{FF2B5EF4-FFF2-40B4-BE49-F238E27FC236}">
+                <a16:creationId xmlns:a16="http://schemas.microsoft.com/office/drawing/2014/main" id="{CD2ECB9F-2FA4-D08D-CC33-1B385A3A85C4}"/>
+              </a:ext>
+            </a:extLst>
+          </p:cNvPr>
+          <p:cNvSpPr>
+            <a:spLocks noGrp="1"/>
+          </p:cNvSpPr>
+          <p:nvPr>
+            <p:ph idx="15"/>
+          </p:nvPr>
+        </p:nvSpPr>
+        <p:spPr>
+          <a:xfrm>
+            <a:off x="4647179" y="842357"/>
+            <a:ext cx="4180910" cy="2297083"/>
+          </a:xfrm>
+        </p:spPr>
+        <p:txBody>
+          <a:bodyPr/>
+          <a:lstStyle/>
+          <a:p>
+            <a:r>
+              <a:rPr lang="de-DE" b="1" dirty="0"/>
+              <a:t>Reihendarstellung </a:t>
+            </a:r>
+            <a:r>
+              <a:rPr lang="de-DE" b="1" dirty="0" err="1"/>
+              <a:t>für</a:t>
+            </a:r>
+            <a:r>
+              <a:rPr lang="de-DE" b="1" dirty="0"/>
+              <a:t> |x| ≥ 1</a:t>
+            </a:r>
+          </a:p>
+        </p:txBody>
+      </p:sp>
+      <p:sp>
+        <p:nvSpPr>
+          <p:cNvPr id="4" name="Titel 3">
+            <a:extLst>
+              <a:ext uri="{FF2B5EF4-FFF2-40B4-BE49-F238E27FC236}">
+                <a16:creationId xmlns:a16="http://schemas.microsoft.com/office/drawing/2014/main" id="{2B3E948E-2171-E2D9-E3D8-C3D6317EF9BD}"/>
+              </a:ext>
+            </a:extLst>
+          </p:cNvPr>
+          <p:cNvSpPr>
+            <a:spLocks noGrp="1"/>
+          </p:cNvSpPr>
+          <p:nvPr>
+            <p:ph type="title"/>
+          </p:nvPr>
+        </p:nvSpPr>
+        <p:spPr>
+          <a:xfrm>
+            <a:off x="319090" y="283507"/>
+            <a:ext cx="8508999" cy="380745"/>
+          </a:xfrm>
+        </p:spPr>
+        <p:txBody>
+          <a:bodyPr/>
+          <a:lstStyle/>
+          <a:p>
+            <a:r>
+              <a:rPr lang="de-DE" dirty="0"/>
+              <a:t>Reihendarstellungen</a:t>
+            </a:r>
+          </a:p>
+        </p:txBody>
+      </p:sp>
+      <p:sp>
+        <p:nvSpPr>
+          <p:cNvPr id="5" name="Foliennummernplatzhalter 4">
+            <a:extLst>
+              <a:ext uri="{FF2B5EF4-FFF2-40B4-BE49-F238E27FC236}">
+                <a16:creationId xmlns:a16="http://schemas.microsoft.com/office/drawing/2014/main" id="{9804D3EF-A1B4-20AD-08C1-EB8C325DB92B}"/>
+              </a:ext>
+            </a:extLst>
+          </p:cNvPr>
+          <p:cNvSpPr>
+            <a:spLocks noGrp="1"/>
+          </p:cNvSpPr>
+          <p:nvPr>
+            <p:ph type="sldNum" sz="quarter" idx="16"/>
+          </p:nvPr>
+        </p:nvSpPr>
+        <p:spPr/>
+        <p:txBody>
+          <a:bodyPr/>
+          <a:lstStyle/>
+          <a:p>
+            <a:fld id="{CE58CB1E-F828-4F11-99E0-327109AF9DA4}" type="slidenum">
+              <a:rPr lang="de-DE" smtClean="0"/>
+              <a:pPr/>
+              <a:t>4</a:t>
+            </a:fld>
+            <a:endParaRPr lang="de-DE" dirty="0"/>
+          </a:p>
+        </p:txBody>
+      </p:sp>
+      <p:sp>
+        <p:nvSpPr>
+          <p:cNvPr id="6" name="Fußzeilenplatzhalter 5">
+            <a:extLst>
+              <a:ext uri="{FF2B5EF4-FFF2-40B4-BE49-F238E27FC236}">
+                <a16:creationId xmlns:a16="http://schemas.microsoft.com/office/drawing/2014/main" id="{835383F4-57BC-1103-4A04-2CE92001A7EC}"/>
+              </a:ext>
+            </a:extLst>
+          </p:cNvPr>
+          <p:cNvSpPr>
+            <a:spLocks noGrp="1"/>
+          </p:cNvSpPr>
+          <p:nvPr>
+            <p:ph type="ftr" sz="quarter" idx="17"/>
+          </p:nvPr>
+        </p:nvSpPr>
+        <p:spPr/>
+        <p:txBody>
+          <a:bodyPr/>
+          <a:lstStyle/>
+          <a:p>
+            <a:r>
+              <a:rPr lang="de-DE"/>
+              <a:t>Praktikum GRA | Gruppe 233 | Vortrag zu Aufgabe A316</a:t>
+            </a:r>
+            <a:endParaRPr lang="en-US" dirty="0"/>
+          </a:p>
+        </p:txBody>
+      </p:sp>
+      <mc:AlternateContent xmlns:mc="http://schemas.openxmlformats.org/markup-compatibility/2006">
+        <mc:Choice xmlns:a14="http://schemas.microsoft.com/office/drawing/2010/main" Requires="a14">
           <p:sp>
             <p:nvSpPr>
-              <p:cNvPr id="2" name="Inhaltsplatzhalter 1">
+              <p:cNvPr id="7" name="Inhaltsplatzhalter 1">
                 <a:extLst>
                   <a:ext uri="{FF2B5EF4-FFF2-40B4-BE49-F238E27FC236}">
-                    <a16:creationId xmlns:a16="http://schemas.microsoft.com/office/drawing/2014/main" id="{13C91B9A-3A4D-09D2-1A4D-83484A59B5EE}"/>
+                    <a16:creationId xmlns:a16="http://schemas.microsoft.com/office/drawing/2014/main" id="{D645575E-E539-4DC2-94D3-FD96E06D1F12}"/>
                   </a:ext>
                 </a:extLst>
               </p:cNvPr>
-              <p:cNvSpPr>
-                <a:spLocks noGrp="1"/>
+              <p:cNvSpPr txBox="1">
+                <a:spLocks/>
               </p:cNvSpPr>
-              <p:nvPr>
-                <p:ph idx="1"/>
-              </p:nvPr>
+              <p:nvPr/>
             </p:nvSpPr>
-            <p:spPr/>
+            <p:spPr>
+              <a:xfrm>
+                <a:off x="319091" y="3139440"/>
+                <a:ext cx="8505818" cy="1537440"/>
+              </a:xfrm>
+              <a:prstGeom prst="rect">
+                <a:avLst/>
+              </a:prstGeom>
+              <a:noFill/>
+              <a:ln w="9525">
+                <a:noFill/>
+                <a:miter lim="800000"/>
+                <a:headEnd/>
+                <a:tailEnd/>
+              </a:ln>
+            </p:spPr>
             <p:txBody>
-              <a:bodyPr/>
-              <a:lstStyle/>
+              <a:bodyPr vert="horz" wrap="square" lIns="0" tIns="0" rIns="0" bIns="0" numCol="1" anchor="t" anchorCtr="0" compatLnSpc="1">
+                <a:prstTxWarp prst="textNoShape">
+                  <a:avLst/>
+                </a:prstTxWarp>
+              </a:bodyPr>
+              <a:lstStyle>
+                <a:lvl1pPr algn="l" rtl="0" eaLnBrk="0" fontAlgn="base" hangingPunct="0">
+                  <a:lnSpc>
+                    <a:spcPct val="114000"/>
+                  </a:lnSpc>
+                  <a:spcBef>
+                    <a:spcPct val="0"/>
+                  </a:spcBef>
+                  <a:spcAft>
+                    <a:spcPct val="0"/>
+                  </a:spcAft>
+                  <a:defRPr lang="de-DE" sz="1400" kern="1200" noProof="0" dirty="0" smtClean="0">
+                    <a:solidFill>
+                      <a:schemeClr val="tx1"/>
+                    </a:solidFill>
+                    <a:latin typeface="+mn-lt"/>
+                    <a:ea typeface="+mn-ea"/>
+                    <a:cs typeface="+mn-cs"/>
+                  </a:defRPr>
+                </a:lvl1pPr>
+                <a:lvl2pPr marL="176213" indent="-176213" algn="l" rtl="0" eaLnBrk="0" fontAlgn="base" hangingPunct="0">
+                  <a:lnSpc>
+                    <a:spcPct val="114000"/>
+                  </a:lnSpc>
+                  <a:spcBef>
+                    <a:spcPct val="0"/>
+                  </a:spcBef>
+                  <a:spcAft>
+                    <a:spcPct val="0"/>
+                  </a:spcAft>
+                  <a:buFont typeface="Arial" charset="0"/>
+                  <a:buChar char="•"/>
+                  <a:defRPr lang="de-DE" sz="1400" kern="1200" noProof="0" dirty="0" smtClean="0">
+                    <a:solidFill>
+                      <a:schemeClr val="tx1"/>
+                    </a:solidFill>
+                    <a:latin typeface="+mn-lt"/>
+                    <a:ea typeface="+mn-ea"/>
+                    <a:cs typeface="+mn-cs"/>
+                  </a:defRPr>
+                </a:lvl2pPr>
+                <a:lvl3pPr marL="360363" indent="-184150" algn="l" rtl="0" eaLnBrk="0" fontAlgn="base" hangingPunct="0">
+                  <a:lnSpc>
+                    <a:spcPct val="125000"/>
+                  </a:lnSpc>
+                  <a:spcBef>
+                    <a:spcPct val="0"/>
+                  </a:spcBef>
+                  <a:spcAft>
+                    <a:spcPct val="0"/>
+                  </a:spcAft>
+                  <a:buFont typeface="Symbol" pitchFamily="18" charset="2"/>
+                  <a:buChar char="-"/>
+                  <a:defRPr sz="1400" kern="1200" baseline="0">
+                    <a:solidFill>
+                      <a:schemeClr val="tx1"/>
+                    </a:solidFill>
+                    <a:latin typeface="+mn-lt"/>
+                    <a:ea typeface="+mn-ea"/>
+                    <a:cs typeface="+mn-cs"/>
+                  </a:defRPr>
+                </a:lvl3pPr>
+                <a:lvl4pPr marL="538163" indent="-177800" algn="l" rtl="0" eaLnBrk="0" fontAlgn="base" hangingPunct="0">
+                  <a:lnSpc>
+                    <a:spcPct val="125000"/>
+                  </a:lnSpc>
+                  <a:spcBef>
+                    <a:spcPct val="0"/>
+                  </a:spcBef>
+                  <a:spcAft>
+                    <a:spcPct val="0"/>
+                  </a:spcAft>
+                  <a:buFont typeface="Symbol" pitchFamily="18" charset="2"/>
+                  <a:buChar char="-"/>
+                  <a:defRPr sz="1400" kern="1200">
+                    <a:solidFill>
+                      <a:schemeClr val="tx1"/>
+                    </a:solidFill>
+                    <a:latin typeface="+mn-lt"/>
+                    <a:ea typeface="+mn-ea"/>
+                    <a:cs typeface="+mn-cs"/>
+                  </a:defRPr>
+                </a:lvl4pPr>
+                <a:lvl5pPr marL="714375" indent="-176213" algn="l" rtl="0" eaLnBrk="0" fontAlgn="base" hangingPunct="0">
+                  <a:lnSpc>
+                    <a:spcPct val="125000"/>
+                  </a:lnSpc>
+                  <a:spcBef>
+                    <a:spcPct val="0"/>
+                  </a:spcBef>
+                  <a:spcAft>
+                    <a:spcPct val="0"/>
+                  </a:spcAft>
+                  <a:buFont typeface="Symbol" pitchFamily="18" charset="2"/>
+                  <a:buChar char="-"/>
+                  <a:defRPr sz="1400" kern="1200">
+                    <a:solidFill>
+                      <a:schemeClr val="tx1"/>
+                    </a:solidFill>
+                    <a:latin typeface="+mn-lt"/>
+                    <a:ea typeface="+mn-ea"/>
+                    <a:cs typeface="+mn-cs"/>
+                  </a:defRPr>
+                </a:lvl5pPr>
+                <a:lvl6pPr marL="2514600" indent="-228600" algn="l" defTabSz="914400" rtl="0" eaLnBrk="1" latinLnBrk="0" hangingPunct="1">
+                  <a:spcBef>
+                    <a:spcPct val="20000"/>
+                  </a:spcBef>
+                  <a:buFont typeface="Arial" pitchFamily="34" charset="0"/>
+                  <a:buChar char="•"/>
+                  <a:defRPr sz="2000" kern="1200">
+                    <a:solidFill>
+                      <a:schemeClr val="tx1"/>
+                    </a:solidFill>
+                    <a:latin typeface="+mn-lt"/>
+                    <a:ea typeface="+mn-ea"/>
+                    <a:cs typeface="+mn-cs"/>
+                  </a:defRPr>
+                </a:lvl6pPr>
+                <a:lvl7pPr marL="2971800" indent="-228600" algn="l" defTabSz="914400" rtl="0" eaLnBrk="1" latinLnBrk="0" hangingPunct="1">
+                  <a:spcBef>
+                    <a:spcPct val="20000"/>
+                  </a:spcBef>
+                  <a:buFont typeface="Arial" pitchFamily="34" charset="0"/>
+                  <a:buChar char="•"/>
+                  <a:defRPr sz="2000" kern="1200">
+                    <a:solidFill>
+                      <a:schemeClr val="tx1"/>
+                    </a:solidFill>
+                    <a:latin typeface="+mn-lt"/>
+                    <a:ea typeface="+mn-ea"/>
+                    <a:cs typeface="+mn-cs"/>
+                  </a:defRPr>
+                </a:lvl7pPr>
+                <a:lvl8pPr marL="3429000" indent="-228600" algn="l" defTabSz="914400" rtl="0" eaLnBrk="1" latinLnBrk="0" hangingPunct="1">
+                  <a:spcBef>
+                    <a:spcPct val="20000"/>
+                  </a:spcBef>
+                  <a:buFont typeface="Arial" pitchFamily="34" charset="0"/>
+                  <a:buChar char="•"/>
+                  <a:defRPr sz="2000" kern="1200">
+                    <a:solidFill>
+                      <a:schemeClr val="tx1"/>
+                    </a:solidFill>
+                    <a:latin typeface="+mn-lt"/>
+                    <a:ea typeface="+mn-ea"/>
+                    <a:cs typeface="+mn-cs"/>
+                  </a:defRPr>
+                </a:lvl8pPr>
+                <a:lvl9pPr marL="3886200" indent="-228600" algn="l" defTabSz="914400" rtl="0" eaLnBrk="1" latinLnBrk="0" hangingPunct="1">
+                  <a:spcBef>
+                    <a:spcPct val="20000"/>
+                  </a:spcBef>
+                  <a:buFont typeface="Arial" pitchFamily="34" charset="0"/>
+                  <a:buChar char="•"/>
+                  <a:defRPr sz="2000" kern="1200">
+                    <a:solidFill>
+                      <a:schemeClr val="tx1"/>
+                    </a:solidFill>
+                    <a:latin typeface="+mn-lt"/>
+                    <a:ea typeface="+mn-ea"/>
+                    <a:cs typeface="+mn-cs"/>
+                  </a:defRPr>
+                </a:lvl9pPr>
+              </a:lstStyle>
               <a:p>
-                <a:pPr/>
+                <a:r>
+                  <a:rPr lang="de-DE" b="1" dirty="0"/>
+                  <a:t>Genauigkeit</a:t>
+                </a:r>
+              </a:p>
+              <a:p>
                 <a14:m>
                   <m:oMathPara xmlns:m="http://schemas.openxmlformats.org/officeDocument/2006/math">
                     <m:oMathParaPr>
                       <m:jc m:val="centerGroup"/>
                     </m:oMathParaPr>
                     <m:oMath xmlns:m="http://schemas.openxmlformats.org/officeDocument/2006/math">
-                      <m:d>
-                        <m:dPr>
-                          <m:ctrlPr>
-                            <a:rPr lang="de-DE" b="0" i="1" smtClean="0">
-                              <a:latin typeface="Cambria Math" panose="02040503050406030204" pitchFamily="18" charset="0"/>
-                            </a:rPr>
-                          </m:ctrlPr>
-                        </m:dPr>
-                        <m:e>
-                          <m:r>
-                            <a:rPr lang="de-DE" b="0" i="1" smtClean="0">
-                              <a:latin typeface="Cambria Math" panose="02040503050406030204" pitchFamily="18" charset="0"/>
-                            </a:rPr>
-                            <m:t>1</m:t>
-                          </m:r>
-                        </m:e>
-                      </m:d>
-                      <m:r>
-                        <a:rPr lang="de-DE" b="0" i="1" smtClean="0">
-                          <a:latin typeface="Cambria Math" panose="02040503050406030204" pitchFamily="18" charset="0"/>
-                        </a:rPr>
-                        <m:t>   </m:t>
-                      </m:r>
-                      <m:r>
-                        <a:rPr lang="de-DE" b="0" i="1" smtClean="0">
-                          <a:latin typeface="Cambria Math" panose="02040503050406030204" pitchFamily="18" charset="0"/>
-                        </a:rPr>
-                        <m:t>𝑎𝑟𝑠𝑖𝑛h</m:t>
-                      </m:r>
-                      <m:d>
-                        <m:dPr>
-                          <m:ctrlPr>
-                            <a:rPr lang="de-DE" b="0" i="1" smtClean="0">
-                              <a:latin typeface="Cambria Math" panose="02040503050406030204" pitchFamily="18" charset="0"/>
-                            </a:rPr>
-                          </m:ctrlPr>
-                        </m:dPr>
-                        <m:e>
-                          <m:r>
-                            <a:rPr lang="de-DE" b="0" i="1" smtClean="0">
-                              <a:latin typeface="Cambria Math" panose="02040503050406030204" pitchFamily="18" charset="0"/>
-                            </a:rPr>
-                            <m:t>𝑥</m:t>
-                          </m:r>
-                        </m:e>
-                      </m:d>
-                      <m:r>
-                        <a:rPr lang="de-DE" b="0" i="1" smtClean="0">
-                          <a:latin typeface="Cambria Math" panose="02040503050406030204" pitchFamily="18" charset="0"/>
-                        </a:rPr>
-                        <m:t>=</m:t>
-                      </m:r>
-                      <m:func>
-                        <m:funcPr>
-                          <m:ctrlPr>
-                            <a:rPr lang="de-DE" b="0" i="1" smtClean="0">
-                              <a:latin typeface="Cambria Math" panose="02040503050406030204" pitchFamily="18" charset="0"/>
-                            </a:rPr>
-                          </m:ctrlPr>
-                        </m:funcPr>
-                        <m:fName>
-                          <m:r>
-                            <m:rPr>
-                              <m:sty m:val="p"/>
-                            </m:rPr>
-                            <a:rPr lang="de-DE" b="0" i="0" smtClean="0">
-                              <a:latin typeface="Cambria Math" panose="02040503050406030204" pitchFamily="18" charset="0"/>
-                            </a:rPr>
-                            <m:t>ln</m:t>
-                          </m:r>
-                        </m:fName>
-                        <m:e>
-                          <m:d>
-                            <m:dPr>
-                              <m:ctrlPr>
-                                <a:rPr lang="de-DE" b="0" i="1" smtClean="0">
-                                  <a:latin typeface="Cambria Math" panose="02040503050406030204" pitchFamily="18" charset="0"/>
-                                </a:rPr>
-                              </m:ctrlPr>
-                            </m:dPr>
-                            <m:e>
-                              <m:r>
-                                <a:rPr lang="de-DE" b="0" i="1" smtClean="0">
-                                  <a:latin typeface="Cambria Math" panose="02040503050406030204" pitchFamily="18" charset="0"/>
-                                </a:rPr>
-                                <m:t>𝑥</m:t>
-                              </m:r>
-                              <m:r>
-                                <a:rPr lang="de-DE" b="0" i="1" smtClean="0">
-                                  <a:latin typeface="Cambria Math" panose="02040503050406030204" pitchFamily="18" charset="0"/>
-                                </a:rPr>
-                                <m:t>+</m:t>
-                              </m:r>
-                              <m:rad>
-                                <m:radPr>
-                                  <m:degHide m:val="on"/>
-                                  <m:ctrlPr>
-                                    <a:rPr lang="de-DE" b="0" i="1" smtClean="0">
-                                      <a:latin typeface="Cambria Math" panose="02040503050406030204" pitchFamily="18" charset="0"/>
-                                    </a:rPr>
-                                  </m:ctrlPr>
-                                </m:radPr>
-                                <m:deg/>
-                                <m:e>
-                                  <m:sSup>
-                                    <m:sSupPr>
-                                      <m:ctrlPr>
-                                        <a:rPr lang="de-DE" b="0" i="1" smtClean="0">
-                                          <a:latin typeface="Cambria Math" panose="02040503050406030204" pitchFamily="18" charset="0"/>
-                                        </a:rPr>
-                                      </m:ctrlPr>
-                                    </m:sSupPr>
-                                    <m:e>
-                                      <m:r>
-                                        <a:rPr lang="de-DE" b="0" i="1" smtClean="0">
-                                          <a:latin typeface="Cambria Math" panose="02040503050406030204" pitchFamily="18" charset="0"/>
-                                        </a:rPr>
-                                        <m:t>𝑥</m:t>
-                                      </m:r>
-                                    </m:e>
-                                    <m:sup>
-                                      <m:r>
-                                        <a:rPr lang="de-DE" b="0" i="1" smtClean="0">
-                                          <a:latin typeface="Cambria Math" panose="02040503050406030204" pitchFamily="18" charset="0"/>
-                                        </a:rPr>
-                                        <m:t>2</m:t>
-                                      </m:r>
-                                    </m:sup>
-                                  </m:sSup>
-                                  <m:r>
-                                    <a:rPr lang="de-DE" b="0" i="1" smtClean="0">
-                                      <a:latin typeface="Cambria Math" panose="02040503050406030204" pitchFamily="18" charset="0"/>
-                                    </a:rPr>
-                                    <m:t>+1</m:t>
-                                  </m:r>
-                                </m:e>
-                              </m:rad>
-                            </m:e>
-                          </m:d>
-                        </m:e>
-                      </m:func>
-                      <m:r>
-                        <a:rPr lang="de-DE" b="0" i="1" smtClean="0">
-                          <a:latin typeface="Cambria Math" panose="02040503050406030204" pitchFamily="18" charset="0"/>
-                        </a:rPr>
-                        <m:t> </m:t>
-                      </m:r>
-                      <m:r>
-                        <a:rPr lang="de-DE" b="0" i="1" smtClean="0">
-                          <a:latin typeface="Cambria Math" panose="02040503050406030204" pitchFamily="18" charset="0"/>
-                        </a:rPr>
-                        <m:t>𝑚𝑖𝑡</m:t>
-                      </m:r>
-                      <m:r>
-                        <a:rPr lang="de-DE" b="0" i="1" smtClean="0">
-                          <a:latin typeface="Cambria Math" panose="02040503050406030204" pitchFamily="18" charset="0"/>
-                        </a:rPr>
-                        <m:t>  </m:t>
-                      </m:r>
-                      <m:r>
-                        <a:rPr lang="de-DE" b="0" i="1" smtClean="0">
-                          <a:latin typeface="Cambria Math" panose="02040503050406030204" pitchFamily="18" charset="0"/>
-                        </a:rPr>
-                        <m:t>𝑥</m:t>
-                      </m:r>
-                      <m:r>
-                        <a:rPr lang="de-DE" b="0" i="1" smtClean="0">
-                          <a:latin typeface="Cambria Math" panose="02040503050406030204" pitchFamily="18" charset="0"/>
-                        </a:rPr>
-                        <m:t> </m:t>
-                      </m:r>
-                      <m:r>
-                        <a:rPr lang="de-DE" b="0" i="1" smtClean="0">
-                          <a:latin typeface="Cambria Math" panose="02040503050406030204" pitchFamily="18" charset="0"/>
-                          <a:ea typeface="Cambria Math" panose="02040503050406030204" pitchFamily="18" charset="0"/>
-                        </a:rPr>
-                        <m:t>𝜖</m:t>
-                      </m:r>
-                      <m:r>
-                        <a:rPr lang="de-DE" b="0" i="1" smtClean="0">
-                          <a:latin typeface="Cambria Math" panose="02040503050406030204" pitchFamily="18" charset="0"/>
-                          <a:ea typeface="Cambria Math" panose="02040503050406030204" pitchFamily="18" charset="0"/>
-                        </a:rPr>
-                        <m:t> </m:t>
-                      </m:r>
-                      <m:r>
-                        <a:rPr lang="de-DE" b="0" i="1" smtClean="0">
-                          <a:latin typeface="Cambria Math" panose="02040503050406030204" pitchFamily="18" charset="0"/>
-                          <a:ea typeface="Cambria Math" panose="02040503050406030204" pitchFamily="18" charset="0"/>
-                        </a:rPr>
-                        <m:t>ℝ</m:t>
-                      </m:r>
-                    </m:oMath>
-                  </m:oMathPara>
-                </a14:m>
-                <a:endParaRPr lang="de-DE" dirty="0"/>
-              </a:p>
-              <a:p>
-                <a:endParaRPr lang="de-DE" dirty="0"/>
-              </a:p>
-              <a:p>
-                <a:pPr/>
-                <a14:m>
-                  <m:oMathPara xmlns:m="http://schemas.openxmlformats.org/officeDocument/2006/math">
-                    <m:oMathParaPr>
-                      <m:jc m:val="centerGroup"/>
-                    </m:oMathParaPr>
-                    <m:oMath xmlns:m="http://schemas.openxmlformats.org/officeDocument/2006/math">
-                      <m:d>
-                        <m:dPr>
-                          <m:ctrlPr>
-                            <a:rPr lang="de-DE" b="0" i="1" smtClean="0">
-                              <a:latin typeface="Cambria Math" panose="02040503050406030204" pitchFamily="18" charset="0"/>
-                            </a:rPr>
-                          </m:ctrlPr>
-                        </m:dPr>
-                        <m:e>
-                          <m:r>
-                            <a:rPr lang="de-DE" b="0" i="1" smtClean="0">
-                              <a:latin typeface="Cambria Math" panose="02040503050406030204" pitchFamily="18" charset="0"/>
-                            </a:rPr>
-                            <m:t>2</m:t>
-                          </m:r>
-                        </m:e>
-                      </m:d>
-                      <m:r>
-                        <a:rPr lang="de-DE" b="0" i="1" smtClean="0">
-                          <a:latin typeface="Cambria Math" panose="02040503050406030204" pitchFamily="18" charset="0"/>
-                        </a:rPr>
-                        <m:t>   </m:t>
-                      </m:r>
                       <m:r>
                         <a:rPr lang="de-DE" b="0" i="1" smtClean="0">
                           <a:latin typeface="Cambria Math" panose="02040503050406030204" pitchFamily="18" charset="0"/>
@@ -11177,277 +11873,10 @@
                         </a:rPr>
                         <m:t>= </m:t>
                       </m:r>
-                      <m:nary>
-                        <m:naryPr>
-                          <m:ctrlPr>
-                            <a:rPr lang="de-DE" b="0" i="1" smtClean="0">
-                              <a:latin typeface="Cambria Math" panose="02040503050406030204" pitchFamily="18" charset="0"/>
-                            </a:rPr>
-                          </m:ctrlPr>
-                        </m:naryPr>
-                        <m:sub>
-                          <m:r>
-                            <m:rPr>
-                              <m:brk m:alnAt="23"/>
-                            </m:rPr>
-                            <a:rPr lang="de-DE" b="0" i="1" smtClean="0">
-                              <a:latin typeface="Cambria Math" panose="02040503050406030204" pitchFamily="18" charset="0"/>
-                            </a:rPr>
-                            <m:t>0</m:t>
-                          </m:r>
-                        </m:sub>
-                        <m:sup>
-                          <m:r>
-                            <a:rPr lang="de-DE" b="0" i="1" smtClean="0">
-                              <a:latin typeface="Cambria Math" panose="02040503050406030204" pitchFamily="18" charset="0"/>
-                            </a:rPr>
-                            <m:t>1</m:t>
-                          </m:r>
-                        </m:sup>
-                        <m:e>
-                          <m:f>
-                            <m:fPr>
-                              <m:ctrlPr>
-                                <a:rPr lang="de-DE" b="0" i="1" smtClean="0">
-                                  <a:latin typeface="Cambria Math" panose="02040503050406030204" pitchFamily="18" charset="0"/>
-                                </a:rPr>
-                              </m:ctrlPr>
-                            </m:fPr>
-                            <m:num>
-                              <m:r>
-                                <a:rPr lang="de-DE" b="0" i="1" smtClean="0">
-                                  <a:latin typeface="Cambria Math" panose="02040503050406030204" pitchFamily="18" charset="0"/>
-                                </a:rPr>
-                                <m:t>𝑥</m:t>
-                              </m:r>
-                            </m:num>
-                            <m:den>
-                              <m:rad>
-                                <m:radPr>
-                                  <m:degHide m:val="on"/>
-                                  <m:ctrlPr>
-                                    <a:rPr lang="de-DE" b="0" i="1" smtClean="0">
-                                      <a:latin typeface="Cambria Math" panose="02040503050406030204" pitchFamily="18" charset="0"/>
-                                    </a:rPr>
-                                  </m:ctrlPr>
-                                </m:radPr>
-                                <m:deg/>
-                                <m:e>
-                                  <m:sSup>
-                                    <m:sSupPr>
-                                      <m:ctrlPr>
-                                        <a:rPr lang="de-DE" b="0" i="1" smtClean="0">
-                                          <a:latin typeface="Cambria Math" panose="02040503050406030204" pitchFamily="18" charset="0"/>
-                                        </a:rPr>
-                                      </m:ctrlPr>
-                                    </m:sSupPr>
-                                    <m:e>
-                                      <m:r>
-                                        <a:rPr lang="de-DE" b="0" i="1" smtClean="0">
-                                          <a:latin typeface="Cambria Math" panose="02040503050406030204" pitchFamily="18" charset="0"/>
-                                        </a:rPr>
-                                        <m:t>𝑥</m:t>
-                                      </m:r>
-                                    </m:e>
-                                    <m:sup>
-                                      <m:r>
-                                        <a:rPr lang="de-DE" b="0" i="1" smtClean="0">
-                                          <a:latin typeface="Cambria Math" panose="02040503050406030204" pitchFamily="18" charset="0"/>
-                                        </a:rPr>
-                                        <m:t>2</m:t>
-                                      </m:r>
-                                    </m:sup>
-                                  </m:sSup>
-                                  <m:sSup>
-                                    <m:sSupPr>
-                                      <m:ctrlPr>
-                                        <a:rPr lang="de-DE" b="0" i="1" smtClean="0">
-                                          <a:latin typeface="Cambria Math" panose="02040503050406030204" pitchFamily="18" charset="0"/>
-                                        </a:rPr>
-                                      </m:ctrlPr>
-                                    </m:sSupPr>
-                                    <m:e>
-                                      <m:r>
-                                        <a:rPr lang="de-DE" b="0" i="1" smtClean="0">
-                                          <a:latin typeface="Cambria Math" panose="02040503050406030204" pitchFamily="18" charset="0"/>
-                                        </a:rPr>
-                                        <m:t>𝑦</m:t>
-                                      </m:r>
-                                    </m:e>
-                                    <m:sup>
-                                      <m:r>
-                                        <a:rPr lang="de-DE" b="0" i="1" smtClean="0">
-                                          <a:latin typeface="Cambria Math" panose="02040503050406030204" pitchFamily="18" charset="0"/>
-                                        </a:rPr>
-                                        <m:t>2</m:t>
-                                      </m:r>
-                                    </m:sup>
-                                  </m:sSup>
-                                  <m:r>
-                                    <a:rPr lang="de-DE" b="0" i="1" smtClean="0">
-                                      <a:latin typeface="Cambria Math" panose="02040503050406030204" pitchFamily="18" charset="0"/>
-                                    </a:rPr>
-                                    <m:t>+1</m:t>
-                                  </m:r>
-                                </m:e>
-                              </m:rad>
-                            </m:den>
-                          </m:f>
-                        </m:e>
-                      </m:nary>
-                      <m:r>
-                        <a:rPr lang="de-DE" b="0" i="1" smtClean="0">
-                          <a:latin typeface="Cambria Math" panose="02040503050406030204" pitchFamily="18" charset="0"/>
-                        </a:rPr>
-                        <m:t> </m:t>
-                      </m:r>
-                      <m:r>
-                        <a:rPr lang="de-DE" b="0" i="1" smtClean="0">
-                          <a:latin typeface="Cambria Math" panose="02040503050406030204" pitchFamily="18" charset="0"/>
-                        </a:rPr>
-                        <m:t>𝑑𝑦</m:t>
-                      </m:r>
-                      <m:r>
-                        <a:rPr lang="de-DE" b="0" i="1" smtClean="0">
-                          <a:latin typeface="Cambria Math" panose="02040503050406030204" pitchFamily="18" charset="0"/>
-                        </a:rPr>
-                        <m:t>  </m:t>
-                      </m:r>
-                      <m:r>
-                        <a:rPr lang="de-DE" b="0" i="1" smtClean="0">
-                          <a:latin typeface="Cambria Math" panose="02040503050406030204" pitchFamily="18" charset="0"/>
-                        </a:rPr>
-                        <m:t>𝑚𝑖𝑡</m:t>
-                      </m:r>
-                      <m:r>
-                        <a:rPr lang="de-DE" b="0" i="1" smtClean="0">
-                          <a:latin typeface="Cambria Math" panose="02040503050406030204" pitchFamily="18" charset="0"/>
-                        </a:rPr>
-                        <m:t> </m:t>
-                      </m:r>
-                      <m:r>
-                        <a:rPr lang="de-DE" b="0" i="1" smtClean="0">
-                          <a:latin typeface="Cambria Math" panose="02040503050406030204" pitchFamily="18" charset="0"/>
-                        </a:rPr>
-                        <m:t>𝑥</m:t>
-                      </m:r>
-                      <m:r>
-                        <a:rPr lang="de-DE" b="0" i="1" smtClean="0">
-                          <a:latin typeface="Cambria Math" panose="02040503050406030204" pitchFamily="18" charset="0"/>
-                        </a:rPr>
-                        <m:t> </m:t>
-                      </m:r>
-                      <m:r>
-                        <a:rPr lang="de-DE" b="0" i="1" smtClean="0">
-                          <a:latin typeface="Cambria Math" panose="02040503050406030204" pitchFamily="18" charset="0"/>
-                          <a:ea typeface="Cambria Math" panose="02040503050406030204" pitchFamily="18" charset="0"/>
-                        </a:rPr>
-                        <m:t>𝜖</m:t>
-                      </m:r>
-                      <m:r>
-                        <a:rPr lang="de-DE" b="0" i="1" smtClean="0">
-                          <a:latin typeface="Cambria Math" panose="02040503050406030204" pitchFamily="18" charset="0"/>
-                          <a:ea typeface="Cambria Math" panose="02040503050406030204" pitchFamily="18" charset="0"/>
-                        </a:rPr>
-                        <m:t> </m:t>
-                      </m:r>
-                      <m:r>
-                        <a:rPr lang="de-DE" b="0" i="1" smtClean="0">
-                          <a:latin typeface="Cambria Math" panose="02040503050406030204" pitchFamily="18" charset="0"/>
-                          <a:ea typeface="Cambria Math" panose="02040503050406030204" pitchFamily="18" charset="0"/>
-                        </a:rPr>
-                        <m:t>ℝ</m:t>
-                      </m:r>
-                    </m:oMath>
-                  </m:oMathPara>
-                </a14:m>
-                <a:endParaRPr lang="de-DE" dirty="0"/>
-              </a:p>
-              <a:p>
-                <a:endParaRPr lang="de-DE" dirty="0"/>
-              </a:p>
-              <a:p>
-                <a:pPr/>
-                <a14:m>
-                  <m:oMathPara xmlns:m="http://schemas.openxmlformats.org/officeDocument/2006/math">
-                    <m:oMathParaPr>
-                      <m:jc m:val="centerGroup"/>
-                    </m:oMathParaPr>
-                    <m:oMath xmlns:m="http://schemas.openxmlformats.org/officeDocument/2006/math">
-                      <m:r>
-                        <a:rPr lang="de-DE" b="0" i="1" smtClean="0">
-                          <a:latin typeface="Cambria Math" panose="02040503050406030204" pitchFamily="18" charset="0"/>
-                        </a:rPr>
-                        <m:t>𝑢𝑛𝑑</m:t>
-                      </m:r>
-                      <m:r>
-                        <a:rPr lang="de-DE" b="0" i="1" smtClean="0">
-                          <a:latin typeface="Cambria Math" panose="02040503050406030204" pitchFamily="18" charset="0"/>
-                        </a:rPr>
-                        <m:t> </m:t>
-                      </m:r>
-                      <m:r>
-                        <a:rPr lang="de-DE" b="0" i="1" smtClean="0">
-                          <a:latin typeface="Cambria Math" panose="02040503050406030204" pitchFamily="18" charset="0"/>
-                        </a:rPr>
-                        <m:t>𝑓</m:t>
-                      </m:r>
-                      <m:r>
-                        <a:rPr lang="de-DE" b="0" i="1" smtClean="0">
-                          <a:latin typeface="Cambria Math" panose="02040503050406030204" pitchFamily="18" charset="0"/>
-                        </a:rPr>
-                        <m:t>ü</m:t>
-                      </m:r>
-                      <m:r>
-                        <a:rPr lang="de-DE" b="0" i="1" smtClean="0">
-                          <a:latin typeface="Cambria Math" panose="02040503050406030204" pitchFamily="18" charset="0"/>
-                        </a:rPr>
-                        <m:t>𝑟</m:t>
-                      </m:r>
-                      <m:r>
-                        <a:rPr lang="de-DE" b="0" i="1" smtClean="0">
-                          <a:latin typeface="Cambria Math" panose="02040503050406030204" pitchFamily="18" charset="0"/>
-                        </a:rPr>
-                        <m:t> </m:t>
-                      </m:r>
-                      <m:r>
-                        <a:rPr lang="de-DE" b="0" i="1" smtClean="0">
-                          <a:latin typeface="Cambria Math" panose="02040503050406030204" pitchFamily="18" charset="0"/>
-                        </a:rPr>
-                        <m:t>𝑔𝑟𝑜</m:t>
-                      </m:r>
-                      <m:r>
-                        <a:rPr lang="de-DE" b="0" i="1" smtClean="0">
-                          <a:latin typeface="Cambria Math" panose="02040503050406030204" pitchFamily="18" charset="0"/>
-                        </a:rPr>
-                        <m:t>ß</m:t>
-                      </m:r>
-                      <m:r>
-                        <a:rPr lang="de-DE" b="0" i="1" smtClean="0">
-                          <a:latin typeface="Cambria Math" panose="02040503050406030204" pitchFamily="18" charset="0"/>
-                        </a:rPr>
-                        <m:t>𝑒</m:t>
-                      </m:r>
-                      <m:r>
-                        <a:rPr lang="de-DE" b="0" i="1" smtClean="0">
-                          <a:latin typeface="Cambria Math" panose="02040503050406030204" pitchFamily="18" charset="0"/>
-                        </a:rPr>
-                        <m:t> </m:t>
-                      </m:r>
-                      <m:r>
-                        <a:rPr lang="de-DE" b="0" i="1" smtClean="0">
-                          <a:latin typeface="Cambria Math" panose="02040503050406030204" pitchFamily="18" charset="0"/>
-                        </a:rPr>
-                        <m:t>𝑥</m:t>
-                      </m:r>
-                      <m:r>
-                        <a:rPr lang="de-DE" b="0" i="1" smtClean="0">
-                          <a:latin typeface="Cambria Math" panose="02040503050406030204" pitchFamily="18" charset="0"/>
-                        </a:rPr>
-                        <m:t>:  </m:t>
-                      </m:r>
                       <m:d>
                         <m:dPr>
+                          <m:begChr m:val="{"/>
+                          <m:endChr m:val=""/>
                           <m:ctrlPr>
                             <a:rPr lang="de-DE" b="0" i="1" smtClean="0">
                               <a:latin typeface="Cambria Math" panose="02040503050406030204" pitchFamily="18" charset="0"/>
@@ -11455,99 +11884,261 @@
                           </m:ctrlPr>
                         </m:dPr>
                         <m:e>
-                          <m:r>
-                            <a:rPr lang="de-DE" b="0" i="1" smtClean="0">
-                              <a:latin typeface="Cambria Math" panose="02040503050406030204" pitchFamily="18" charset="0"/>
-                            </a:rPr>
-                            <m:t>3</m:t>
-                          </m:r>
+                          <m:eqArr>
+                            <m:eqArrPr>
+                              <m:ctrlPr>
+                                <a:rPr lang="de-DE" b="0" i="1" smtClean="0">
+                                  <a:latin typeface="Cambria Math" panose="02040503050406030204" pitchFamily="18" charset="0"/>
+                                </a:rPr>
+                              </m:ctrlPr>
+                            </m:eqArrPr>
+                            <m:e>
+                              <m:r>
+                                <a:rPr lang="de-DE" i="1">
+                                  <a:latin typeface="Cambria Math" panose="02040503050406030204" pitchFamily="18" charset="0"/>
+                                </a:rPr>
+                                <m:t>𝑇𝑎𝑦𝑙𝑜𝑟𝐴𝑟𝑠𝑖𝑛h</m:t>
+                              </m:r>
+                              <m:r>
+                                <a:rPr lang="de-DE" b="0" i="1" smtClean="0">
+                                  <a:latin typeface="Cambria Math" panose="02040503050406030204" pitchFamily="18" charset="0"/>
+                                </a:rPr>
+                                <m:t>                    </m:t>
+                              </m:r>
+                              <m:r>
+                                <a:rPr lang="de-DE" i="1">
+                                  <a:latin typeface="Cambria Math" panose="02040503050406030204" pitchFamily="18" charset="0"/>
+                                </a:rPr>
+                                <m:t>𝑓𝑎𝑙𝑙𝑠</m:t>
+                              </m:r>
+                              <m:r>
+                                <a:rPr lang="de-DE" i="1">
+                                  <a:latin typeface="Cambria Math" panose="02040503050406030204" pitchFamily="18" charset="0"/>
+                                </a:rPr>
+                                <m:t> </m:t>
+                              </m:r>
+                              <m:d>
+                                <m:dPr>
+                                  <m:begChr m:val="|"/>
+                                  <m:endChr m:val="|"/>
+                                  <m:ctrlPr>
+                                    <a:rPr lang="de-DE" i="1">
+                                      <a:latin typeface="Cambria Math" panose="02040503050406030204" pitchFamily="18" charset="0"/>
+                                    </a:rPr>
+                                  </m:ctrlPr>
+                                </m:dPr>
+                                <m:e>
+                                  <m:r>
+                                    <a:rPr lang="de-DE" i="1">
+                                      <a:latin typeface="Cambria Math" panose="02040503050406030204" pitchFamily="18" charset="0"/>
+                                    </a:rPr>
+                                    <m:t>𝑥</m:t>
+                                  </m:r>
+                                </m:e>
+                              </m:d>
+                              <m:r>
+                                <a:rPr lang="de-DE" i="1">
+                                  <a:latin typeface="Cambria Math" panose="02040503050406030204" pitchFamily="18" charset="0"/>
+                                </a:rPr>
+                                <m:t>&lt; 1 </m:t>
+                              </m:r>
+                              <m:r>
+                                <a:rPr lang="de-DE" b="0" i="1" smtClean="0">
+                                  <a:latin typeface="Cambria Math" panose="02040503050406030204" pitchFamily="18" charset="0"/>
+                                </a:rPr>
+                                <m:t>                      </m:t>
+                              </m:r>
+                              <m:r>
+                                <a:rPr lang="de-DE" i="1">
+                                  <a:latin typeface="Cambria Math" panose="02040503050406030204" pitchFamily="18" charset="0"/>
+                                </a:rPr>
+                                <m:t> </m:t>
+                              </m:r>
+                            </m:e>
+                            <m:e>
+                              <m:r>
+                                <a:rPr lang="de-DE" i="1">
+                                  <a:latin typeface="Cambria Math" panose="02040503050406030204" pitchFamily="18" charset="0"/>
+                                </a:rPr>
+                                <m:t>𝑙𝑛</m:t>
+                              </m:r>
+                              <m:d>
+                                <m:dPr>
+                                  <m:ctrlPr>
+                                    <a:rPr lang="de-DE" i="1">
+                                      <a:latin typeface="Cambria Math" panose="02040503050406030204" pitchFamily="18" charset="0"/>
+                                    </a:rPr>
+                                  </m:ctrlPr>
+                                </m:dPr>
+                                <m:e>
+                                  <m:r>
+                                    <a:rPr lang="de-DE" i="1">
+                                      <a:latin typeface="Cambria Math" panose="02040503050406030204" pitchFamily="18" charset="0"/>
+                                    </a:rPr>
+                                    <m:t>2</m:t>
+                                  </m:r>
+                                  <m:r>
+                                    <a:rPr lang="de-DE" i="1">
+                                      <a:latin typeface="Cambria Math" panose="02040503050406030204" pitchFamily="18" charset="0"/>
+                                    </a:rPr>
+                                    <m:t>𝑥</m:t>
+                                  </m:r>
+                                </m:e>
+                              </m:d>
+                              <m:r>
+                                <a:rPr lang="de-DE" i="1">
+                                  <a:latin typeface="Cambria Math" panose="02040503050406030204" pitchFamily="18" charset="0"/>
+                                </a:rPr>
+                                <m:t>+ </m:t>
+                              </m:r>
+                              <m:r>
+                                <a:rPr lang="de-DE" i="1">
+                                  <a:latin typeface="Cambria Math" panose="02040503050406030204" pitchFamily="18" charset="0"/>
+                                </a:rPr>
+                                <m:t>𝑒𝑟𝑟𝑜𝑟</m:t>
+                              </m:r>
+                              <m:d>
+                                <m:dPr>
+                                  <m:ctrlPr>
+                                    <a:rPr lang="de-DE" i="1">
+                                      <a:latin typeface="Cambria Math" panose="02040503050406030204" pitchFamily="18" charset="0"/>
+                                    </a:rPr>
+                                  </m:ctrlPr>
+                                </m:dPr>
+                                <m:e>
+                                  <m:r>
+                                    <a:rPr lang="de-DE" i="1">
+                                      <a:latin typeface="Cambria Math" panose="02040503050406030204" pitchFamily="18" charset="0"/>
+                                    </a:rPr>
+                                    <m:t>𝑥</m:t>
+                                  </m:r>
+                                </m:e>
+                              </m:d>
+                              <m:r>
+                                <a:rPr lang="de-DE" b="0" i="1" smtClean="0">
+                                  <a:latin typeface="Cambria Math" panose="02040503050406030204" pitchFamily="18" charset="0"/>
+                                </a:rPr>
+                                <m:t>          </m:t>
+                              </m:r>
+                              <m:r>
+                                <a:rPr lang="de-DE" i="1">
+                                  <a:latin typeface="Cambria Math" panose="02040503050406030204" pitchFamily="18" charset="0"/>
+                                </a:rPr>
+                                <m:t>𝑓𝑎𝑙𝑙𝑠</m:t>
+                              </m:r>
+                              <m:r>
+                                <a:rPr lang="de-DE" i="1">
+                                  <a:latin typeface="Cambria Math" panose="02040503050406030204" pitchFamily="18" charset="0"/>
+                                </a:rPr>
+                                <m:t> </m:t>
+                              </m:r>
+                              <m:d>
+                                <m:dPr>
+                                  <m:begChr m:val="|"/>
+                                  <m:endChr m:val="|"/>
+                                  <m:ctrlPr>
+                                    <a:rPr lang="de-DE" i="1">
+                                      <a:latin typeface="Cambria Math" panose="02040503050406030204" pitchFamily="18" charset="0"/>
+                                    </a:rPr>
+                                  </m:ctrlPr>
+                                </m:dPr>
+                                <m:e>
+                                  <m:r>
+                                    <a:rPr lang="de-DE" i="1">
+                                      <a:latin typeface="Cambria Math" panose="02040503050406030204" pitchFamily="18" charset="0"/>
+                                    </a:rPr>
+                                    <m:t>𝑥</m:t>
+                                  </m:r>
+                                </m:e>
+                              </m:d>
+                              <m:r>
+                                <a:rPr lang="de-DE" i="1">
+                                  <a:latin typeface="Cambria Math" panose="02040503050406030204" pitchFamily="18" charset="0"/>
+                                </a:rPr>
+                                <m:t>&gt; 1</m:t>
+                              </m:r>
+                              <m:r>
+                                <a:rPr lang="de-DE" b="0" i="1" smtClean="0">
+                                  <a:latin typeface="Cambria Math" panose="02040503050406030204" pitchFamily="18" charset="0"/>
+                                </a:rPr>
+                                <m:t>                      </m:t>
+                              </m:r>
+                              <m:r>
+                                <a:rPr lang="de-DE" i="1">
+                                  <a:latin typeface="Cambria Math" panose="02040503050406030204" pitchFamily="18" charset="0"/>
+                                </a:rPr>
+                                <m:t>  </m:t>
+                              </m:r>
+                            </m:e>
+                            <m:e>
+                              <m:r>
+                                <a:rPr lang="de-DE" i="1">
+                                  <a:latin typeface="Cambria Math" panose="02040503050406030204" pitchFamily="18" charset="0"/>
+                                </a:rPr>
+                                <m:t>𝑥</m:t>
+                              </m:r>
+                              <m:r>
+                                <a:rPr lang="de-DE" b="0" i="1" smtClean="0">
+                                  <a:latin typeface="Cambria Math" panose="02040503050406030204" pitchFamily="18" charset="0"/>
+                                </a:rPr>
+                                <m:t>                                            </m:t>
+                              </m:r>
+                              <m:r>
+                                <a:rPr lang="de-DE" i="1">
+                                  <a:latin typeface="Cambria Math" panose="02040503050406030204" pitchFamily="18" charset="0"/>
+                                </a:rPr>
+                                <m:t>𝑓𝑎𝑙𝑙𝑠</m:t>
+                              </m:r>
+                              <m:r>
+                                <a:rPr lang="de-DE" i="1">
+                                  <a:latin typeface="Cambria Math" panose="02040503050406030204" pitchFamily="18" charset="0"/>
+                                </a:rPr>
+                                <m:t> </m:t>
+                              </m:r>
+                              <m:r>
+                                <a:rPr lang="de-DE" i="1">
+                                  <a:latin typeface="Cambria Math" panose="02040503050406030204" pitchFamily="18" charset="0"/>
+                                </a:rPr>
+                                <m:t>𝑥</m:t>
+                              </m:r>
+                              <m:r>
+                                <a:rPr lang="de-DE" i="1">
+                                  <a:latin typeface="Cambria Math" panose="02040503050406030204" pitchFamily="18" charset="0"/>
+                                </a:rPr>
+                                <m:t> ∈ {± </m:t>
+                              </m:r>
+                              <m:r>
+                                <a:rPr lang="de-DE" i="1">
+                                  <a:latin typeface="Cambria Math" panose="02040503050406030204" pitchFamily="18" charset="0"/>
+                                </a:rPr>
+                                <m:t>𝑖𝑛𝑓</m:t>
+                              </m:r>
+                              <m:r>
+                                <a:rPr lang="de-DE" i="1">
+                                  <a:latin typeface="Cambria Math" panose="02040503050406030204" pitchFamily="18" charset="0"/>
+                                </a:rPr>
+                                <m:t>, ±</m:t>
+                              </m:r>
+                              <m:r>
+                                <a:rPr lang="de-DE" i="1">
+                                  <a:latin typeface="Cambria Math" panose="02040503050406030204" pitchFamily="18" charset="0"/>
+                                </a:rPr>
+                                <m:t>𝑁𝑎𝑛</m:t>
+                              </m:r>
+                              <m:r>
+                                <a:rPr lang="de-DE" i="1">
+                                  <a:latin typeface="Cambria Math" panose="02040503050406030204" pitchFamily="18" charset="0"/>
+                                </a:rPr>
+                                <m:t>}  </m:t>
+                              </m:r>
+                            </m:e>
+                          </m:eqArr>
                         </m:e>
                       </m:d>
-                      <m:r>
-                        <a:rPr lang="de-DE" b="0" i="1" smtClean="0">
-                          <a:latin typeface="Cambria Math" panose="02040503050406030204" pitchFamily="18" charset="0"/>
-                        </a:rPr>
-                        <m:t> </m:t>
-                      </m:r>
-                      <m:r>
-                        <a:rPr lang="de-DE" b="0" i="1" smtClean="0">
-                          <a:latin typeface="Cambria Math" panose="02040503050406030204" pitchFamily="18" charset="0"/>
-                        </a:rPr>
-                        <m:t>𝑎𝑟𝑠𝑖𝑛h</m:t>
-                      </m:r>
-                      <m:d>
-                        <m:dPr>
-                          <m:ctrlPr>
-                            <a:rPr lang="de-DE" b="0" i="1" smtClean="0">
-                              <a:latin typeface="Cambria Math" panose="02040503050406030204" pitchFamily="18" charset="0"/>
-                            </a:rPr>
-                          </m:ctrlPr>
-                        </m:dPr>
-                        <m:e>
-                          <m:r>
-                            <a:rPr lang="de-DE" b="0" i="1" smtClean="0">
-                              <a:latin typeface="Cambria Math" panose="02040503050406030204" pitchFamily="18" charset="0"/>
-                            </a:rPr>
-                            <m:t>𝑥</m:t>
-                          </m:r>
-                        </m:e>
-                      </m:d>
-                      <m:r>
-                        <a:rPr lang="de-DE" b="0" i="1" smtClean="0">
-                          <a:latin typeface="Cambria Math" panose="02040503050406030204" pitchFamily="18" charset="0"/>
-                          <a:ea typeface="Cambria Math" panose="02040503050406030204" pitchFamily="18" charset="0"/>
-                        </a:rPr>
-                        <m:t>≈</m:t>
-                      </m:r>
-                      <m:r>
-                        <m:rPr>
-                          <m:sty m:val="p"/>
-                        </m:rPr>
-                        <a:rPr lang="de-DE" b="0" i="0" smtClean="0">
-                          <a:latin typeface="Cambria Math" panose="02040503050406030204" pitchFamily="18" charset="0"/>
-                          <a:ea typeface="Cambria Math" panose="02040503050406030204" pitchFamily="18" charset="0"/>
-                        </a:rPr>
-                        <m:t>ln</m:t>
-                      </m:r>
-                      <m:r>
-                        <a:rPr lang="de-DE" b="0" i="1" smtClean="0">
-                          <a:latin typeface="Cambria Math" panose="02040503050406030204" pitchFamily="18" charset="0"/>
-                          <a:ea typeface="Cambria Math" panose="02040503050406030204" pitchFamily="18" charset="0"/>
-                        </a:rPr>
-                        <m:t>⁡(2</m:t>
-                      </m:r>
-                      <m:d>
-                        <m:dPr>
-                          <m:begChr m:val="|"/>
-                          <m:endChr m:val="|"/>
-                          <m:ctrlPr>
-                            <a:rPr lang="de-DE" b="0" i="1" smtClean="0">
-                              <a:latin typeface="Cambria Math" panose="02040503050406030204" pitchFamily="18" charset="0"/>
-                              <a:ea typeface="Cambria Math" panose="02040503050406030204" pitchFamily="18" charset="0"/>
-                            </a:rPr>
-                          </m:ctrlPr>
-                        </m:dPr>
-                        <m:e>
-                          <m:r>
-                            <a:rPr lang="de-DE" b="0" i="1" smtClean="0">
-                              <a:latin typeface="Cambria Math" panose="02040503050406030204" pitchFamily="18" charset="0"/>
-                              <a:ea typeface="Cambria Math" panose="02040503050406030204" pitchFamily="18" charset="0"/>
-                            </a:rPr>
-                            <m:t>𝑥</m:t>
-                          </m:r>
-                        </m:e>
-                      </m:d>
-                      <m:r>
-                        <a:rPr lang="de-DE" b="0" i="1" smtClean="0">
-                          <a:latin typeface="Cambria Math" panose="02040503050406030204" pitchFamily="18" charset="0"/>
-                          <a:ea typeface="Cambria Math" panose="02040503050406030204" pitchFamily="18" charset="0"/>
-                        </a:rPr>
-                        <m:t>)</m:t>
-                      </m:r>
                     </m:oMath>
                   </m:oMathPara>
                 </a14:m>
-                <a:endParaRPr lang="de-DE" dirty="0"/>
+                <a:endParaRPr lang="de-DE" b="0" dirty="0"/>
               </a:p>
               <a:p>
                 <a:endParaRPr lang="de-DE" dirty="0"/>
@@ -11555,42 +12146,44 @@
               <a:p>
                 <a:endParaRPr lang="de-DE" dirty="0"/>
               </a:p>
-              <a:p>
-                <a:r>
-                  <a:rPr lang="de-DE" dirty="0"/>
-                  <a:t>Diese Formeln werden im weiteren für unseren Ansatz und unsere Implementierung verwendet.</a:t>
-                </a:r>
-              </a:p>
-              <a:p>
-                <a:endParaRPr lang="de-DE" dirty="0"/>
-              </a:p>
             </p:txBody>
           </p:sp>
         </mc:Choice>
-        <mc:Fallback xmlns="">
+        <mc:Fallback>
           <p:sp>
             <p:nvSpPr>
-              <p:cNvPr id="2" name="Inhaltsplatzhalter 1">
+              <p:cNvPr id="7" name="Inhaltsplatzhalter 1">
                 <a:extLst>
                   <a:ext uri="{FF2B5EF4-FFF2-40B4-BE49-F238E27FC236}">
-                    <a16:creationId xmlns:a16="http://schemas.microsoft.com/office/drawing/2014/main" id="{13C91B9A-3A4D-09D2-1A4D-83484A59B5EE}"/>
+                    <a16:creationId xmlns:a16="http://schemas.microsoft.com/office/drawing/2014/main" id="{D645575E-E539-4DC2-94D3-FD96E06D1F12}"/>
                   </a:ext>
                 </a:extLst>
               </p:cNvPr>
-              <p:cNvSpPr>
-                <a:spLocks noGrp="1" noRot="1" noChangeAspect="1" noMove="1" noResize="1" noEditPoints="1" noAdjustHandles="1" noChangeArrowheads="1" noChangeShapeType="1" noTextEdit="1"/>
+              <p:cNvSpPr txBox="1">
+                <a:spLocks noRot="1" noChangeAspect="1" noMove="1" noResize="1" noEditPoints="1" noAdjustHandles="1" noChangeArrowheads="1" noChangeShapeType="1" noTextEdit="1"/>
               </p:cNvSpPr>
-              <p:nvPr>
-                <p:ph idx="1"/>
-              </p:nvPr>
+              <p:nvPr/>
             </p:nvSpPr>
             <p:spPr>
+              <a:xfrm>
+                <a:off x="319091" y="3139440"/>
+                <a:ext cx="8505818" cy="1537440"/>
+              </a:xfrm>
+              <a:prstGeom prst="rect">
+                <a:avLst/>
+              </a:prstGeom>
               <a:blipFill>
                 <a:blip r:embed="rId2"/>
                 <a:stretch>
-                  <a:fillRect l="-1190" t="-6967"/>
+                  <a:fillRect l="-1190" t="-98361" b="-146721"/>
                 </a:stretch>
               </a:blipFill>
+              <a:ln w="9525">
+                <a:noFill/>
+                <a:miter lim="800000"/>
+                <a:headEnd/>
+                <a:tailEnd/>
+              </a:ln>
             </p:spPr>
             <p:txBody>
               <a:bodyPr/>
@@ -11607,12 +12200,347 @@
           </p:sp>
         </mc:Fallback>
       </mc:AlternateContent>
+    </p:spTree>
+    <p:extLst>
+      <p:ext uri="{BB962C8B-B14F-4D97-AF65-F5344CB8AC3E}">
+        <p14:creationId xmlns:p14="http://schemas.microsoft.com/office/powerpoint/2010/main" val="195628822"/>
+      </p:ext>
+    </p:extLst>
+  </p:cSld>
+  <p:clrMapOvr>
+    <a:masterClrMapping/>
+  </p:clrMapOvr>
+</p:sld>
+</file>
+
+<file path=ppt/slides/slide5.xml><?xml version="1.0" encoding="utf-8"?>
+<p:sld xmlns:a="http://schemas.openxmlformats.org/drawingml/2006/main" xmlns:r="http://schemas.openxmlformats.org/officeDocument/2006/relationships" xmlns:p="http://schemas.openxmlformats.org/presentationml/2006/main">
+  <p:cSld>
+    <p:spTree>
+      <p:nvGrpSpPr>
+        <p:cNvPr id="1" name=""/>
+        <p:cNvGrpSpPr/>
+        <p:nvPr/>
+      </p:nvGrpSpPr>
+      <p:grpSpPr>
+        <a:xfrm>
+          <a:off x="0" y="0"/>
+          <a:ext cx="0" cy="0"/>
+          <a:chOff x="0" y="0"/>
+          <a:chExt cx="0" cy="0"/>
+        </a:xfrm>
+      </p:grpSpPr>
       <p:sp>
         <p:nvSpPr>
-          <p:cNvPr id="3" name="Titel 2">
+          <p:cNvPr id="12" name="Inhaltsplatzhalter 1">
             <a:extLst>
               <a:ext uri="{FF2B5EF4-FFF2-40B4-BE49-F238E27FC236}">
-                <a16:creationId xmlns:a16="http://schemas.microsoft.com/office/drawing/2014/main" id="{DA5CDD0E-C949-E10F-7151-E02BF800CE9F}"/>
+                <a16:creationId xmlns:a16="http://schemas.microsoft.com/office/drawing/2014/main" id="{F2E01DF1-DC74-6C63-81DB-66719C942C80}"/>
+              </a:ext>
+            </a:extLst>
+          </p:cNvPr>
+          <p:cNvSpPr txBox="1">
+            <a:spLocks/>
+          </p:cNvSpPr>
+          <p:nvPr/>
+        </p:nvSpPr>
+        <p:spPr>
+          <a:xfrm>
+            <a:off x="319091" y="842357"/>
+            <a:ext cx="8505818" cy="3855269"/>
+          </a:xfrm>
+          <a:prstGeom prst="rect">
+            <a:avLst/>
+          </a:prstGeom>
+          <a:noFill/>
+          <a:ln w="9525">
+            <a:noFill/>
+            <a:miter lim="800000"/>
+            <a:headEnd/>
+            <a:tailEnd/>
+          </a:ln>
+        </p:spPr>
+        <p:txBody>
+          <a:bodyPr vert="horz" wrap="square" lIns="0" tIns="0" rIns="0" bIns="0" numCol="1" anchor="t" anchorCtr="0" compatLnSpc="1">
+            <a:prstTxWarp prst="textNoShape">
+              <a:avLst/>
+            </a:prstTxWarp>
+          </a:bodyPr>
+          <a:lstStyle>
+            <a:lvl1pPr algn="l" rtl="0" eaLnBrk="0" fontAlgn="base" hangingPunct="0">
+              <a:lnSpc>
+                <a:spcPct val="114000"/>
+              </a:lnSpc>
+              <a:spcBef>
+                <a:spcPct val="0"/>
+              </a:spcBef>
+              <a:spcAft>
+                <a:spcPct val="0"/>
+              </a:spcAft>
+              <a:defRPr lang="de-DE" sz="1400" kern="1200" noProof="0" dirty="0" smtClean="0">
+                <a:solidFill>
+                  <a:schemeClr val="tx1"/>
+                </a:solidFill>
+                <a:latin typeface="+mn-lt"/>
+                <a:ea typeface="+mn-ea"/>
+                <a:cs typeface="+mn-cs"/>
+              </a:defRPr>
+            </a:lvl1pPr>
+            <a:lvl2pPr marL="176213" indent="-176213" algn="l" rtl="0" eaLnBrk="0" fontAlgn="base" hangingPunct="0">
+              <a:lnSpc>
+                <a:spcPct val="114000"/>
+              </a:lnSpc>
+              <a:spcBef>
+                <a:spcPct val="0"/>
+              </a:spcBef>
+              <a:spcAft>
+                <a:spcPct val="0"/>
+              </a:spcAft>
+              <a:buFont typeface="Arial" charset="0"/>
+              <a:buChar char="•"/>
+              <a:defRPr lang="de-DE" sz="1400" kern="1200" noProof="0" dirty="0" smtClean="0">
+                <a:solidFill>
+                  <a:schemeClr val="tx1"/>
+                </a:solidFill>
+                <a:latin typeface="+mn-lt"/>
+                <a:ea typeface="+mn-ea"/>
+                <a:cs typeface="+mn-cs"/>
+              </a:defRPr>
+            </a:lvl2pPr>
+            <a:lvl3pPr marL="360363" indent="-184150" algn="l" rtl="0" eaLnBrk="0" fontAlgn="base" hangingPunct="0">
+              <a:lnSpc>
+                <a:spcPct val="125000"/>
+              </a:lnSpc>
+              <a:spcBef>
+                <a:spcPct val="0"/>
+              </a:spcBef>
+              <a:spcAft>
+                <a:spcPct val="0"/>
+              </a:spcAft>
+              <a:buFont typeface="Symbol" pitchFamily="18" charset="2"/>
+              <a:buChar char="-"/>
+              <a:defRPr sz="1400" kern="1200" baseline="0">
+                <a:solidFill>
+                  <a:schemeClr val="tx1"/>
+                </a:solidFill>
+                <a:latin typeface="+mn-lt"/>
+                <a:ea typeface="+mn-ea"/>
+                <a:cs typeface="+mn-cs"/>
+              </a:defRPr>
+            </a:lvl3pPr>
+            <a:lvl4pPr marL="538163" indent="-177800" algn="l" rtl="0" eaLnBrk="0" fontAlgn="base" hangingPunct="0">
+              <a:lnSpc>
+                <a:spcPct val="125000"/>
+              </a:lnSpc>
+              <a:spcBef>
+                <a:spcPct val="0"/>
+              </a:spcBef>
+              <a:spcAft>
+                <a:spcPct val="0"/>
+              </a:spcAft>
+              <a:buFont typeface="Symbol" pitchFamily="18" charset="2"/>
+              <a:buChar char="-"/>
+              <a:defRPr sz="1400" kern="1200">
+                <a:solidFill>
+                  <a:schemeClr val="tx1"/>
+                </a:solidFill>
+                <a:latin typeface="+mn-lt"/>
+                <a:ea typeface="+mn-ea"/>
+                <a:cs typeface="+mn-cs"/>
+              </a:defRPr>
+            </a:lvl4pPr>
+            <a:lvl5pPr marL="714375" indent="-176213" algn="l" rtl="0" eaLnBrk="0" fontAlgn="base" hangingPunct="0">
+              <a:lnSpc>
+                <a:spcPct val="125000"/>
+              </a:lnSpc>
+              <a:spcBef>
+                <a:spcPct val="0"/>
+              </a:spcBef>
+              <a:spcAft>
+                <a:spcPct val="0"/>
+              </a:spcAft>
+              <a:buFont typeface="Symbol" pitchFamily="18" charset="2"/>
+              <a:buChar char="-"/>
+              <a:defRPr sz="1400" kern="1200">
+                <a:solidFill>
+                  <a:schemeClr val="tx1"/>
+                </a:solidFill>
+                <a:latin typeface="+mn-lt"/>
+                <a:ea typeface="+mn-ea"/>
+                <a:cs typeface="+mn-cs"/>
+              </a:defRPr>
+            </a:lvl5pPr>
+            <a:lvl6pPr marL="2514600" indent="-228600" algn="l" defTabSz="914400" rtl="0" eaLnBrk="1" latinLnBrk="0" hangingPunct="1">
+              <a:spcBef>
+                <a:spcPct val="20000"/>
+              </a:spcBef>
+              <a:buFont typeface="Arial" pitchFamily="34" charset="0"/>
+              <a:buChar char="•"/>
+              <a:defRPr sz="2000" kern="1200">
+                <a:solidFill>
+                  <a:schemeClr val="tx1"/>
+                </a:solidFill>
+                <a:latin typeface="+mn-lt"/>
+                <a:ea typeface="+mn-ea"/>
+                <a:cs typeface="+mn-cs"/>
+              </a:defRPr>
+            </a:lvl6pPr>
+            <a:lvl7pPr marL="2971800" indent="-228600" algn="l" defTabSz="914400" rtl="0" eaLnBrk="1" latinLnBrk="0" hangingPunct="1">
+              <a:spcBef>
+                <a:spcPct val="20000"/>
+              </a:spcBef>
+              <a:buFont typeface="Arial" pitchFamily="34" charset="0"/>
+              <a:buChar char="•"/>
+              <a:defRPr sz="2000" kern="1200">
+                <a:solidFill>
+                  <a:schemeClr val="tx1"/>
+                </a:solidFill>
+                <a:latin typeface="+mn-lt"/>
+                <a:ea typeface="+mn-ea"/>
+                <a:cs typeface="+mn-cs"/>
+              </a:defRPr>
+            </a:lvl7pPr>
+            <a:lvl8pPr marL="3429000" indent="-228600" algn="l" defTabSz="914400" rtl="0" eaLnBrk="1" latinLnBrk="0" hangingPunct="1">
+              <a:spcBef>
+                <a:spcPct val="20000"/>
+              </a:spcBef>
+              <a:buFont typeface="Arial" pitchFamily="34" charset="0"/>
+              <a:buChar char="•"/>
+              <a:defRPr sz="2000" kern="1200">
+                <a:solidFill>
+                  <a:schemeClr val="tx1"/>
+                </a:solidFill>
+                <a:latin typeface="+mn-lt"/>
+                <a:ea typeface="+mn-ea"/>
+                <a:cs typeface="+mn-cs"/>
+              </a:defRPr>
+            </a:lvl8pPr>
+            <a:lvl9pPr marL="3886200" indent="-228600" algn="l" defTabSz="914400" rtl="0" eaLnBrk="1" latinLnBrk="0" hangingPunct="1">
+              <a:spcBef>
+                <a:spcPct val="20000"/>
+              </a:spcBef>
+              <a:buFont typeface="Arial" pitchFamily="34" charset="0"/>
+              <a:buChar char="•"/>
+              <a:defRPr sz="2000" kern="1200">
+                <a:solidFill>
+                  <a:schemeClr val="tx1"/>
+                </a:solidFill>
+                <a:latin typeface="+mn-lt"/>
+                <a:ea typeface="+mn-ea"/>
+                <a:cs typeface="+mn-cs"/>
+              </a:defRPr>
+            </a:lvl9pPr>
+          </a:lstStyle>
+          <a:p>
+            <a:r>
+              <a:rPr lang="de-DE" dirty="0"/>
+              <a:t>1 MB </a:t>
+            </a:r>
+            <a:r>
+              <a:rPr lang="de-DE" dirty="0" err="1"/>
+              <a:t>für</a:t>
+            </a:r>
+            <a:r>
+              <a:rPr lang="de-DE" dirty="0"/>
+              <a:t> die </a:t>
+            </a:r>
+            <a:r>
+              <a:rPr lang="de-DE" dirty="0" err="1"/>
+              <a:t>Lookuptabelle</a:t>
+            </a:r>
+            <a:r>
+              <a:rPr lang="de-DE" dirty="0"/>
+              <a:t> festgelegt </a:t>
+            </a:r>
+          </a:p>
+          <a:p>
+            <a:r>
+              <a:rPr lang="de-DE" dirty="0"/>
+              <a:t>40000 Werten </a:t>
+            </a:r>
+          </a:p>
+          <a:p>
+            <a:r>
+              <a:rPr lang="de-DE" dirty="0"/>
+              <a:t>logarithmische Verteilung der Werte festgelegt, da auch die Verteilung aller </a:t>
+            </a:r>
+            <a:r>
+              <a:rPr lang="de-DE" dirty="0" err="1"/>
+              <a:t>möglichen</a:t>
+            </a:r>
+            <a:r>
+              <a:rPr lang="de-DE" dirty="0"/>
+              <a:t> Werte im Datentyp double </a:t>
+            </a:r>
+            <a:r>
+              <a:rPr lang="de-DE" dirty="0" err="1"/>
+              <a:t>loga</a:t>
+            </a:r>
+            <a:r>
+              <a:rPr lang="de-DE" dirty="0"/>
+              <a:t>- </a:t>
+            </a:r>
+            <a:r>
+              <a:rPr lang="de-DE" dirty="0" err="1"/>
+              <a:t>rithmisch</a:t>
+            </a:r>
+            <a:r>
+              <a:rPr lang="de-DE" dirty="0"/>
+              <a:t> </a:t>
+            </a:r>
+            <a:r>
+              <a:rPr lang="de-DE" dirty="0" err="1"/>
+              <a:t>is</a:t>
+            </a:r>
+            <a:r>
+              <a:rPr lang="de-DE" dirty="0"/>
+              <a:t> </a:t>
+            </a:r>
+          </a:p>
+          <a:p>
+            <a:endParaRPr lang="de-DE" dirty="0"/>
+          </a:p>
+          <a:p>
+            <a:r>
+              <a:rPr lang="de-DE" dirty="0"/>
+              <a:t>Mapping: </a:t>
+            </a:r>
+            <a:r>
+              <a:rPr lang="de-DE" dirty="0" err="1"/>
+              <a:t>table</a:t>
+            </a:r>
+            <a:r>
+              <a:rPr lang="de-DE" dirty="0"/>
+              <a:t>[i] ≤ </a:t>
+            </a:r>
+            <a:r>
+              <a:rPr lang="de-DE" dirty="0" err="1"/>
+              <a:t>arsinh</a:t>
+            </a:r>
+            <a:r>
+              <a:rPr lang="de-DE" dirty="0"/>
+              <a:t>(x) &lt; </a:t>
+            </a:r>
+            <a:r>
+              <a:rPr lang="de-DE" dirty="0" err="1"/>
+              <a:t>table</a:t>
+            </a:r>
+            <a:r>
+              <a:rPr lang="de-DE" dirty="0"/>
+              <a:t>[i + 1] </a:t>
+            </a:r>
+          </a:p>
+          <a:p>
+            <a:endParaRPr lang="de-DE" dirty="0"/>
+          </a:p>
+        </p:txBody>
+      </p:sp>
+      <p:sp>
+        <p:nvSpPr>
+          <p:cNvPr id="4" name="Titel 3">
+            <a:extLst>
+              <a:ext uri="{FF2B5EF4-FFF2-40B4-BE49-F238E27FC236}">
+                <a16:creationId xmlns:a16="http://schemas.microsoft.com/office/drawing/2014/main" id="{2B3E948E-2171-E2D9-E3D8-C3D6317EF9BD}"/>
               </a:ext>
             </a:extLst>
           </p:cNvPr>
@@ -11625,7 +12553,7 @@
         </p:nvSpPr>
         <p:spPr>
           <a:xfrm>
-            <a:off x="319090" y="972000"/>
+            <a:off x="319090" y="283507"/>
             <a:ext cx="8508999" cy="380745"/>
           </a:xfrm>
         </p:spPr>
@@ -11635,17 +12563,17 @@
           <a:p>
             <a:r>
               <a:rPr lang="de-DE" dirty="0"/>
-              <a:t>Mögliche Definitionen</a:t>
+              <a:t>Tabellen-Lookup</a:t>
             </a:r>
           </a:p>
         </p:txBody>
       </p:sp>
       <p:sp>
         <p:nvSpPr>
-          <p:cNvPr id="4" name="Foliennummernplatzhalter 3">
+          <p:cNvPr id="5" name="Foliennummernplatzhalter 4">
             <a:extLst>
               <a:ext uri="{FF2B5EF4-FFF2-40B4-BE49-F238E27FC236}">
-                <a16:creationId xmlns:a16="http://schemas.microsoft.com/office/drawing/2014/main" id="{0431D83F-B720-0901-F7EC-4FB27129052F}"/>
+                <a16:creationId xmlns:a16="http://schemas.microsoft.com/office/drawing/2014/main" id="{9804D3EF-A1B4-20AD-08C1-EB8C325DB92B}"/>
               </a:ext>
             </a:extLst>
           </p:cNvPr>
@@ -11653,7 +12581,7 @@
             <a:spLocks noGrp="1"/>
           </p:cNvSpPr>
           <p:nvPr>
-            <p:ph type="sldNum" sz="quarter" idx="11"/>
+            <p:ph type="sldNum" sz="quarter" idx="16"/>
           </p:nvPr>
         </p:nvSpPr>
         <p:spPr/>
@@ -11664,7 +12592,7 @@
             <a:fld id="{CE58CB1E-F828-4F11-99E0-327109AF9DA4}" type="slidenum">
               <a:rPr lang="de-DE" smtClean="0"/>
               <a:pPr/>
-              <a:t>4</a:t>
+              <a:t>5</a:t>
             </a:fld>
             <a:endParaRPr lang="de-DE" dirty="0"/>
           </a:p>
@@ -11672,10 +12600,10 @@
       </p:sp>
       <p:sp>
         <p:nvSpPr>
-          <p:cNvPr id="5" name="Fußzeilenplatzhalter 4">
+          <p:cNvPr id="6" name="Fußzeilenplatzhalter 5">
             <a:extLst>
               <a:ext uri="{FF2B5EF4-FFF2-40B4-BE49-F238E27FC236}">
-                <a16:creationId xmlns:a16="http://schemas.microsoft.com/office/drawing/2014/main" id="{B22B6819-DD98-0FF7-FC1B-9E040E9CDCA7}"/>
+                <a16:creationId xmlns:a16="http://schemas.microsoft.com/office/drawing/2014/main" id="{835383F4-57BC-1103-4A04-2CE92001A7EC}"/>
               </a:ext>
             </a:extLst>
           </p:cNvPr>
@@ -11683,7 +12611,7 @@
             <a:spLocks noGrp="1"/>
           </p:cNvSpPr>
           <p:nvPr>
-            <p:ph type="ftr" sz="quarter" idx="12"/>
+            <p:ph type="ftr" sz="quarter" idx="17"/>
           </p:nvPr>
         </p:nvSpPr>
         <p:spPr/>
@@ -11702,7 +12630,7 @@
     </p:spTree>
     <p:extLst>
       <p:ext uri="{BB962C8B-B14F-4D97-AF65-F5344CB8AC3E}">
-        <p14:creationId xmlns:p14="http://schemas.microsoft.com/office/powerpoint/2010/main" val="4071653749"/>
+        <p14:creationId xmlns:p14="http://schemas.microsoft.com/office/powerpoint/2010/main" val="2666036062"/>
       </p:ext>
     </p:extLst>
   </p:cSld>
@@ -11712,7 +12640,7 @@
 </p:sld>
 </file>
 
-<file path=ppt/slides/slide5.xml><?xml version="1.0" encoding="utf-8"?>
+<file path=ppt/slides/slide6.xml><?xml version="1.0" encoding="utf-8"?>
 <p:sld xmlns:a="http://schemas.openxmlformats.org/drawingml/2006/main" xmlns:r="http://schemas.openxmlformats.org/officeDocument/2006/relationships" xmlns:p="http://schemas.openxmlformats.org/presentationml/2006/main">
   <p:cSld>
     <p:spTree>
@@ -11746,7 +12674,7 @@
           <a:p>
             <a:r>
               <a:rPr lang="de-DE" dirty="0"/>
-              <a:t>(2) Ansatz und Abwägungen für die C Implementierungen</a:t>
+              <a:t>(2) Umsetzung der C Implementierungen</a:t>
             </a:r>
           </a:p>
         </p:txBody>
@@ -11784,6 +12712,70 @@
           </a:p>
         </p:txBody>
       </p:sp>
+      <p:sp>
+        <p:nvSpPr>
+          <p:cNvPr id="2" name="Rechteck 1">
+            <a:extLst>
+              <a:ext uri="{FF2B5EF4-FFF2-40B4-BE49-F238E27FC236}">
+                <a16:creationId xmlns:a16="http://schemas.microsoft.com/office/drawing/2014/main" id="{E366F3B7-893C-D3B9-CDF9-2DD5F9FD9867}"/>
+              </a:ext>
+            </a:extLst>
+          </p:cNvPr>
+          <p:cNvSpPr/>
+          <p:nvPr/>
+        </p:nvSpPr>
+        <p:spPr>
+          <a:xfrm>
+            <a:off x="711200" y="3169920"/>
+            <a:ext cx="2611120" cy="589280"/>
+          </a:xfrm>
+          <a:prstGeom prst="rect">
+            <a:avLst/>
+          </a:prstGeom>
+          <a:solidFill>
+            <a:schemeClr val="accent6"/>
+          </a:solidFill>
+          <a:ln>
+            <a:noFill/>
+          </a:ln>
+        </p:spPr>
+        <p:style>
+          <a:lnRef idx="2">
+            <a:schemeClr val="accent1">
+              <a:shade val="50000"/>
+            </a:schemeClr>
+          </a:lnRef>
+          <a:fillRef idx="1">
+            <a:schemeClr val="accent1"/>
+          </a:fillRef>
+          <a:effectRef idx="0">
+            <a:schemeClr val="accent1"/>
+          </a:effectRef>
+          <a:fontRef idx="minor">
+            <a:schemeClr val="lt1"/>
+          </a:fontRef>
+        </p:style>
+        <p:txBody>
+          <a:bodyPr rot="0" spcFirstLastPara="0" vertOverflow="overflow" horzOverflow="overflow" vert="horz" wrap="square" lIns="91440" tIns="45720" rIns="91440" bIns="45720" numCol="1" spcCol="0" rtlCol="0" fromWordArt="0" anchor="t" anchorCtr="0" forceAA="0" compatLnSpc="1">
+            <a:prstTxWarp prst="textNoShape">
+              <a:avLst/>
+            </a:prstTxWarp>
+            <a:noAutofit/>
+          </a:bodyPr>
+          <a:lstStyle/>
+          <a:p>
+            <a:pPr algn="ctr">
+              <a:lnSpc>
+                <a:spcPct val="114000"/>
+              </a:lnSpc>
+            </a:pPr>
+            <a:r>
+              <a:rPr lang="de-DE" sz="2800" b="1" dirty="0"/>
+              <a:t>Ludwig</a:t>
+            </a:r>
+          </a:p>
+        </p:txBody>
+      </p:sp>
     </p:spTree>
     <p:extLst>
       <p:ext uri="{BB962C8B-B14F-4D97-AF65-F5344CB8AC3E}">
@@ -11797,7 +12789,7 @@
 </p:sld>
 </file>
 
-<file path=ppt/slides/slide6.xml><?xml version="1.0" encoding="utf-8"?>
+<file path=ppt/slides/slide7.xml><?xml version="1.0" encoding="utf-8"?>
 <p:sld xmlns:a="http://schemas.openxmlformats.org/drawingml/2006/main" xmlns:r="http://schemas.openxmlformats.org/officeDocument/2006/relationships" xmlns:p="http://schemas.openxmlformats.org/presentationml/2006/main">
   <p:cSld>
     <p:spTree>
@@ -11821,7 +12813,7 @@
               <p:cNvPr id="2" name="Inhaltsplatzhalter 1">
                 <a:extLst>
                   <a:ext uri="{FF2B5EF4-FFF2-40B4-BE49-F238E27FC236}">
-                    <a16:creationId xmlns:a16="http://schemas.microsoft.com/office/drawing/2014/main" id="{F746551A-FC2A-799C-6132-AB7F1EF0B463}"/>
+                    <a16:creationId xmlns:a16="http://schemas.microsoft.com/office/drawing/2014/main" id="{D2F0F151-4050-7E8A-6F93-94203D2A79D7}"/>
                   </a:ext>
                 </a:extLst>
               </p:cNvPr>
@@ -11832,7 +12824,12 @@
                 <p:ph idx="1"/>
               </p:nvPr>
             </p:nvSpPr>
-            <p:spPr/>
+            <p:spPr>
+              <a:xfrm>
+                <a:off x="319090" y="904240"/>
+                <a:ext cx="8508999" cy="3791585"/>
+              </a:xfrm>
+            </p:spPr>
             <p:txBody>
               <a:bodyPr/>
               <a:lstStyle/>
@@ -12194,6 +13191,13 @@
                               <m:r>
                                 <a:rPr lang="de-DE" b="0" i="1" smtClean="0">
                                   <a:latin typeface="Cambria Math" panose="02040503050406030204" pitchFamily="18" charset="0"/>
+                                  <a:ea typeface="Cambria Math" panose="02040503050406030204" pitchFamily="18" charset="0"/>
+                                </a:rPr>
+                                <m:t>                                     </m:t>
+                              </m:r>
+                              <m:r>
+                                <a:rPr lang="de-DE" b="0" i="1" smtClean="0">
+                                  <a:latin typeface="Cambria Math" panose="02040503050406030204" pitchFamily="18" charset="0"/>
                                 </a:rPr>
                                 <m:t>+</m:t>
                               </m:r>
@@ -12207,13 +13211,25 @@
                                 <a:rPr lang="de-DE" b="0" i="1" smtClean="0">
                                   <a:latin typeface="Cambria Math" panose="02040503050406030204" pitchFamily="18" charset="0"/>
                                 </a:rPr>
-                                <m:t>                                   </m:t>
+                                <m:t>                </m:t>
                               </m:r>
                               <m:r>
                                 <a:rPr lang="de-DE" b="0" i="1" smtClean="0">
                                   <a:latin typeface="Cambria Math" panose="02040503050406030204" pitchFamily="18" charset="0"/>
                                 </a:rPr>
                                 <m:t>𝑠𝑜𝑛𝑠𝑡</m:t>
+                              </m:r>
+                              <m:r>
+                                <a:rPr lang="de-DE" b="0" i="1" smtClean="0">
+                                  <a:latin typeface="Cambria Math" panose="02040503050406030204" pitchFamily="18" charset="0"/>
+                                </a:rPr>
+                                <m:t>                                                  </m:t>
+                              </m:r>
+                              <m:r>
+                                <a:rPr lang="de-DE" b="0" i="1" smtClean="0">
+                                  <a:latin typeface="Cambria Math" panose="02040503050406030204" pitchFamily="18" charset="0"/>
+                                </a:rPr>
+                                <m:t>        </m:t>
                               </m:r>
                             </m:e>
                           </m:eqArr>
@@ -12225,11 +13241,12 @@
                 <a:endParaRPr lang="de-DE" b="0" dirty="0"/>
               </a:p>
               <a:p>
-                <a:pPr/>
                 <a:endParaRPr lang="de-DE" dirty="0"/>
               </a:p>
               <a:p>
-                <a:pPr/>
+                <a:endParaRPr lang="de-DE" dirty="0"/>
+              </a:p>
+              <a:p>
                 <a:endParaRPr lang="de-DE" dirty="0"/>
               </a:p>
             </p:txBody>
@@ -12241,7 +13258,7 @@
               <p:cNvPr id="2" name="Inhaltsplatzhalter 1">
                 <a:extLst>
                   <a:ext uri="{FF2B5EF4-FFF2-40B4-BE49-F238E27FC236}">
-                    <a16:creationId xmlns:a16="http://schemas.microsoft.com/office/drawing/2014/main" id="{F746551A-FC2A-799C-6132-AB7F1EF0B463}"/>
+                    <a16:creationId xmlns:a16="http://schemas.microsoft.com/office/drawing/2014/main" id="{D2F0F151-4050-7E8A-6F93-94203D2A79D7}"/>
                   </a:ext>
                 </a:extLst>
               </p:cNvPr>
@@ -12253,6 +13270,10 @@
               </p:nvPr>
             </p:nvSpPr>
             <p:spPr>
+              <a:xfrm>
+                <a:off x="319090" y="904240"/>
+                <a:ext cx="8508999" cy="3791585"/>
+              </a:xfrm>
               <a:blipFill>
                 <a:blip r:embed="rId2"/>
                 <a:stretch>
@@ -12280,7 +13301,7 @@
           <p:cNvPr id="3" name="Titel 2">
             <a:extLst>
               <a:ext uri="{FF2B5EF4-FFF2-40B4-BE49-F238E27FC236}">
-                <a16:creationId xmlns:a16="http://schemas.microsoft.com/office/drawing/2014/main" id="{FF8C367E-F011-BB85-F3BC-2F7666BD4A21}"/>
+                <a16:creationId xmlns:a16="http://schemas.microsoft.com/office/drawing/2014/main" id="{FB63955A-DA90-C8BB-2658-7749845A9610}"/>
               </a:ext>
             </a:extLst>
           </p:cNvPr>
@@ -12293,7 +13314,7 @@
         </p:nvSpPr>
         <p:spPr>
           <a:xfrm>
-            <a:off x="319090" y="972000"/>
+            <a:off x="319090" y="280240"/>
             <a:ext cx="8508999" cy="380745"/>
           </a:xfrm>
         </p:spPr>
@@ -12313,7 +13334,7 @@
           <p:cNvPr id="4" name="Foliennummernplatzhalter 3">
             <a:extLst>
               <a:ext uri="{FF2B5EF4-FFF2-40B4-BE49-F238E27FC236}">
-                <a16:creationId xmlns:a16="http://schemas.microsoft.com/office/drawing/2014/main" id="{18A44738-DB54-A2E3-883B-BE804BF7B11A}"/>
+                <a16:creationId xmlns:a16="http://schemas.microsoft.com/office/drawing/2014/main" id="{7D132BA0-57DB-642B-791A-1FD94CCB7245}"/>
               </a:ext>
             </a:extLst>
           </p:cNvPr>
@@ -12332,7 +13353,7 @@
             <a:fld id="{CE58CB1E-F828-4F11-99E0-327109AF9DA4}" type="slidenum">
               <a:rPr lang="de-DE" smtClean="0"/>
               <a:pPr/>
-              <a:t>6</a:t>
+              <a:t>7</a:t>
             </a:fld>
             <a:endParaRPr lang="de-DE" dirty="0"/>
           </a:p>
@@ -12343,7 +13364,7 @@
           <p:cNvPr id="5" name="Fußzeilenplatzhalter 4">
             <a:extLst>
               <a:ext uri="{FF2B5EF4-FFF2-40B4-BE49-F238E27FC236}">
-                <a16:creationId xmlns:a16="http://schemas.microsoft.com/office/drawing/2014/main" id="{A67886B6-E19B-6B05-FFFD-2BFAADE88F47}"/>
+                <a16:creationId xmlns:a16="http://schemas.microsoft.com/office/drawing/2014/main" id="{948344B4-A36F-0E3F-B257-797CA66CCDBE}"/>
               </a:ext>
             </a:extLst>
           </p:cNvPr>
@@ -12370,7 +13391,7 @@
     </p:spTree>
     <p:extLst>
       <p:ext uri="{BB962C8B-B14F-4D97-AF65-F5344CB8AC3E}">
-        <p14:creationId xmlns:p14="http://schemas.microsoft.com/office/powerpoint/2010/main" val="334817072"/>
+        <p14:creationId xmlns:p14="http://schemas.microsoft.com/office/powerpoint/2010/main" val="2885655146"/>
       </p:ext>
     </p:extLst>
   </p:cSld>
@@ -12380,7 +13401,7 @@
 </p:sld>
 </file>
 
-<file path=ppt/slides/slide7.xml><?xml version="1.0" encoding="utf-8"?>
+<file path=ppt/slides/slide8.xml><?xml version="1.0" encoding="utf-8"?>
 <p:sld xmlns:a="http://schemas.openxmlformats.org/drawingml/2006/main" xmlns:r="http://schemas.openxmlformats.org/officeDocument/2006/relationships" xmlns:p="http://schemas.openxmlformats.org/presentationml/2006/main">
   <p:cSld>
     <p:spTree>
@@ -12452,213 +13473,74 @@
           </a:p>
         </p:txBody>
       </p:sp>
+      <p:sp>
+        <p:nvSpPr>
+          <p:cNvPr id="2" name="Rechteck 1">
+            <a:extLst>
+              <a:ext uri="{FF2B5EF4-FFF2-40B4-BE49-F238E27FC236}">
+                <a16:creationId xmlns:a16="http://schemas.microsoft.com/office/drawing/2014/main" id="{EA3E901E-CB90-EDBB-8659-467EB60017E6}"/>
+              </a:ext>
+            </a:extLst>
+          </p:cNvPr>
+          <p:cNvSpPr/>
+          <p:nvPr/>
+        </p:nvSpPr>
+        <p:spPr>
+          <a:xfrm>
+            <a:off x="711200" y="3169920"/>
+            <a:ext cx="2611120" cy="589280"/>
+          </a:xfrm>
+          <a:prstGeom prst="rect">
+            <a:avLst/>
+          </a:prstGeom>
+          <a:solidFill>
+            <a:schemeClr val="accent6"/>
+          </a:solidFill>
+          <a:ln>
+            <a:noFill/>
+          </a:ln>
+        </p:spPr>
+        <p:style>
+          <a:lnRef idx="2">
+            <a:schemeClr val="accent1">
+              <a:shade val="50000"/>
+            </a:schemeClr>
+          </a:lnRef>
+          <a:fillRef idx="1">
+            <a:schemeClr val="accent1"/>
+          </a:fillRef>
+          <a:effectRef idx="0">
+            <a:schemeClr val="accent1"/>
+          </a:effectRef>
+          <a:fontRef idx="minor">
+            <a:schemeClr val="lt1"/>
+          </a:fontRef>
+        </p:style>
+        <p:txBody>
+          <a:bodyPr rot="0" spcFirstLastPara="0" vertOverflow="overflow" horzOverflow="overflow" vert="horz" wrap="square" lIns="91440" tIns="45720" rIns="91440" bIns="45720" numCol="1" spcCol="0" rtlCol="0" fromWordArt="0" anchor="t" anchorCtr="0" forceAA="0" compatLnSpc="1">
+            <a:prstTxWarp prst="textNoShape">
+              <a:avLst/>
+            </a:prstTxWarp>
+            <a:noAutofit/>
+          </a:bodyPr>
+          <a:lstStyle/>
+          <a:p>
+            <a:pPr algn="ctr">
+              <a:lnSpc>
+                <a:spcPct val="114000"/>
+              </a:lnSpc>
+            </a:pPr>
+            <a:r>
+              <a:rPr lang="de-DE" sz="2800" b="1" dirty="0"/>
+              <a:t>Pins</a:t>
+            </a:r>
+          </a:p>
+        </p:txBody>
+      </p:sp>
     </p:spTree>
     <p:extLst>
       <p:ext uri="{BB962C8B-B14F-4D97-AF65-F5344CB8AC3E}">
         <p14:creationId xmlns:p14="http://schemas.microsoft.com/office/powerpoint/2010/main" val="4237379473"/>
-      </p:ext>
-    </p:extLst>
-  </p:cSld>
-  <p:clrMapOvr>
-    <a:masterClrMapping/>
-  </p:clrMapOvr>
-</p:sld>
-</file>
-
-<file path=ppt/slides/slide8.xml><?xml version="1.0" encoding="utf-8"?>
-<p:sld xmlns:a="http://schemas.openxmlformats.org/drawingml/2006/main" xmlns:r="http://schemas.openxmlformats.org/officeDocument/2006/relationships" xmlns:p="http://schemas.openxmlformats.org/presentationml/2006/main">
-  <p:cSld>
-    <p:spTree>
-      <p:nvGrpSpPr>
-        <p:cNvPr id="1" name=""/>
-        <p:cNvGrpSpPr/>
-        <p:nvPr/>
-      </p:nvGrpSpPr>
-      <p:grpSpPr>
-        <a:xfrm>
-          <a:off x="0" y="0"/>
-          <a:ext cx="0" cy="0"/>
-          <a:chOff x="0" y="0"/>
-          <a:chExt cx="0" cy="0"/>
-        </a:xfrm>
-      </p:grpSpPr>
-      <p:sp>
-        <p:nvSpPr>
-          <p:cNvPr id="2" name="Textplatzhalter 1">
-            <a:extLst>
-              <a:ext uri="{FF2B5EF4-FFF2-40B4-BE49-F238E27FC236}">
-                <a16:creationId xmlns:a16="http://schemas.microsoft.com/office/drawing/2014/main" id="{71A1EF53-8686-156F-99F0-744307B24ED6}"/>
-              </a:ext>
-            </a:extLst>
-          </p:cNvPr>
-          <p:cNvSpPr>
-            <a:spLocks noGrp="1"/>
-          </p:cNvSpPr>
-          <p:nvPr>
-            <p:ph type="body" sz="quarter" idx="13"/>
-          </p:nvPr>
-        </p:nvSpPr>
-        <p:spPr/>
-        <p:txBody>
-          <a:bodyPr/>
-          <a:lstStyle/>
-          <a:p>
-            <a:r>
-              <a:rPr lang="de-DE" dirty="0">
-                <a:latin typeface="Arial" panose="020B0604020202020204" pitchFamily="34" charset="0"/>
-              </a:rPr>
-              <a:t>D</a:t>
-            </a:r>
-            <a:r>
-              <a:rPr lang="de-DE" b="0" i="0" dirty="0">
-                <a:effectLst/>
-                <a:latin typeface="Arial" panose="020B0604020202020204" pitchFamily="34" charset="0"/>
-              </a:rPr>
-              <a:t>ie Genauigkeit der Lösung als die Abweichung der Implementierung (4) vom Funktionswert der mathematisch definierten Funktion (1) zu verstehen.</a:t>
-            </a:r>
-            <a:endParaRPr lang="de-DE" dirty="0"/>
-          </a:p>
-        </p:txBody>
-      </p:sp>
-      <p:sp>
-        <p:nvSpPr>
-          <p:cNvPr id="3" name="Titel 2">
-            <a:extLst>
-              <a:ext uri="{FF2B5EF4-FFF2-40B4-BE49-F238E27FC236}">
-                <a16:creationId xmlns:a16="http://schemas.microsoft.com/office/drawing/2014/main" id="{E28AE206-A266-EA67-E1C4-A56285CB47E0}"/>
-              </a:ext>
-            </a:extLst>
-          </p:cNvPr>
-          <p:cNvSpPr>
-            <a:spLocks noGrp="1"/>
-          </p:cNvSpPr>
-          <p:nvPr>
-            <p:ph type="title"/>
-          </p:nvPr>
-        </p:nvSpPr>
-        <p:spPr>
-          <a:xfrm>
-            <a:off x="319090" y="972000"/>
-            <a:ext cx="8508999" cy="380745"/>
-          </a:xfrm>
-        </p:spPr>
-        <p:txBody>
-          <a:bodyPr/>
-          <a:lstStyle/>
-          <a:p>
-            <a:r>
-              <a:rPr lang="de-DE" dirty="0"/>
-              <a:t>Genauigkeit</a:t>
-            </a:r>
-          </a:p>
-        </p:txBody>
-      </p:sp>
-      <p:sp>
-        <p:nvSpPr>
-          <p:cNvPr id="4" name="Foliennummernplatzhalter 3">
-            <a:extLst>
-              <a:ext uri="{FF2B5EF4-FFF2-40B4-BE49-F238E27FC236}">
-                <a16:creationId xmlns:a16="http://schemas.microsoft.com/office/drawing/2014/main" id="{D80D2827-88CE-E17A-0523-C5F6C7065DD4}"/>
-              </a:ext>
-            </a:extLst>
-          </p:cNvPr>
-          <p:cNvSpPr>
-            <a:spLocks noGrp="1"/>
-          </p:cNvSpPr>
-          <p:nvPr>
-            <p:ph type="sldNum" sz="quarter" idx="15"/>
-          </p:nvPr>
-        </p:nvSpPr>
-        <p:spPr/>
-        <p:txBody>
-          <a:bodyPr/>
-          <a:lstStyle/>
-          <a:p>
-            <a:fld id="{CE58CB1E-F828-4F11-99E0-327109AF9DA4}" type="slidenum">
-              <a:rPr lang="de-DE" smtClean="0"/>
-              <a:pPr/>
-              <a:t>8</a:t>
-            </a:fld>
-            <a:endParaRPr lang="de-DE" dirty="0"/>
-          </a:p>
-        </p:txBody>
-      </p:sp>
-      <p:sp>
-        <p:nvSpPr>
-          <p:cNvPr id="5" name="Fußzeilenplatzhalter 4">
-            <a:extLst>
-              <a:ext uri="{FF2B5EF4-FFF2-40B4-BE49-F238E27FC236}">
-                <a16:creationId xmlns:a16="http://schemas.microsoft.com/office/drawing/2014/main" id="{516EA7C5-7A00-3C7A-F676-D76109244FE3}"/>
-              </a:ext>
-            </a:extLst>
-          </p:cNvPr>
-          <p:cNvSpPr>
-            <a:spLocks noGrp="1"/>
-          </p:cNvSpPr>
-          <p:nvPr>
-            <p:ph type="ftr" sz="quarter" idx="16"/>
-          </p:nvPr>
-        </p:nvSpPr>
-        <p:spPr/>
-        <p:txBody>
-          <a:bodyPr/>
-          <a:lstStyle/>
-          <a:p>
-            <a:r>
-              <a:rPr lang="de-DE"/>
-              <a:t>Praktikum GRA | Gruppe 233 | Vortrag zu Aufgabe A316</a:t>
-            </a:r>
-            <a:endParaRPr lang="en-US" dirty="0"/>
-          </a:p>
-        </p:txBody>
-      </p:sp>
-      <p:sp>
-        <p:nvSpPr>
-          <p:cNvPr id="6" name="Inhaltsplatzhalter 5">
-            <a:extLst>
-              <a:ext uri="{FF2B5EF4-FFF2-40B4-BE49-F238E27FC236}">
-                <a16:creationId xmlns:a16="http://schemas.microsoft.com/office/drawing/2014/main" id="{A0154A1F-68EB-2047-A2DA-C9F41CD68484}"/>
-              </a:ext>
-            </a:extLst>
-          </p:cNvPr>
-          <p:cNvSpPr>
-            <a:spLocks noGrp="1"/>
-          </p:cNvSpPr>
-          <p:nvPr>
-            <p:ph sz="quarter" idx="18"/>
-          </p:nvPr>
-        </p:nvSpPr>
-        <p:spPr/>
-        <p:txBody>
-          <a:bodyPr/>
-          <a:lstStyle/>
-          <a:p>
-            <a:endParaRPr lang="de-DE" dirty="0"/>
-          </a:p>
-        </p:txBody>
-      </p:sp>
-      <p:sp>
-        <p:nvSpPr>
-          <p:cNvPr id="7" name="Bildplatzhalter 6">
-            <a:extLst>
-              <a:ext uri="{FF2B5EF4-FFF2-40B4-BE49-F238E27FC236}">
-                <a16:creationId xmlns:a16="http://schemas.microsoft.com/office/drawing/2014/main" id="{30B7ED01-887E-83DD-5548-648E7F6984F1}"/>
-              </a:ext>
-            </a:extLst>
-          </p:cNvPr>
-          <p:cNvSpPr>
-            <a:spLocks noGrp="1"/>
-          </p:cNvSpPr>
-          <p:nvPr>
-            <p:ph type="pic" sz="quarter" idx="14"/>
-          </p:nvPr>
-        </p:nvSpPr>
-        <p:spPr/>
-      </p:sp>
-    </p:spTree>
-    <p:extLst>
-      <p:ext uri="{BB962C8B-B14F-4D97-AF65-F5344CB8AC3E}">
-        <p14:creationId xmlns:p14="http://schemas.microsoft.com/office/powerpoint/2010/main" val="2099027833"/>
       </p:ext>
     </p:extLst>
   </p:cSld>
@@ -12687,10 +13569,10 @@
       </p:grpSpPr>
       <p:sp>
         <p:nvSpPr>
-          <p:cNvPr id="2" name="Textplatzhalter 1">
+          <p:cNvPr id="2" name="Inhaltsplatzhalter 1">
             <a:extLst>
               <a:ext uri="{FF2B5EF4-FFF2-40B4-BE49-F238E27FC236}">
-                <a16:creationId xmlns:a16="http://schemas.microsoft.com/office/drawing/2014/main" id="{71A1EF53-8686-156F-99F0-744307B24ED6}"/>
+                <a16:creationId xmlns:a16="http://schemas.microsoft.com/office/drawing/2014/main" id="{8D7E9E3F-D8C9-136F-056C-F90511BEAF66}"/>
               </a:ext>
             </a:extLst>
           </p:cNvPr>
@@ -12698,31 +13580,59 @@
             <a:spLocks noGrp="1"/>
           </p:cNvSpPr>
           <p:nvPr>
-            <p:ph type="body" sz="quarter" idx="13"/>
+            <p:ph idx="14"/>
           </p:nvPr>
         </p:nvSpPr>
-        <p:spPr/>
+        <p:spPr>
+          <a:xfrm>
+            <a:off x="319091" y="1635760"/>
+            <a:ext cx="4180910" cy="3061866"/>
+          </a:xfrm>
+        </p:spPr>
         <p:txBody>
           <a:bodyPr/>
           <a:lstStyle/>
           <a:p>
-            <a:r>
-              <a:rPr lang="de-DE" b="0" i="0" dirty="0">
-                <a:effectLst/>
-                <a:latin typeface="Arial" panose="020B0604020202020204" pitchFamily="34" charset="0"/>
-              </a:rPr>
-              <a:t>Die Performanz der Implementierungen wird anhand der Laufzeit gemessen.</a:t>
-            </a:r>
-            <a:endParaRPr lang="de-DE" dirty="0"/>
+            <a:endParaRPr lang="de-DE"/>
           </a:p>
         </p:txBody>
       </p:sp>
       <p:sp>
         <p:nvSpPr>
-          <p:cNvPr id="3" name="Titel 2">
+          <p:cNvPr id="3" name="Inhaltsplatzhalter 2">
             <a:extLst>
               <a:ext uri="{FF2B5EF4-FFF2-40B4-BE49-F238E27FC236}">
-                <a16:creationId xmlns:a16="http://schemas.microsoft.com/office/drawing/2014/main" id="{E28AE206-A266-EA67-E1C4-A56285CB47E0}"/>
+                <a16:creationId xmlns:a16="http://schemas.microsoft.com/office/drawing/2014/main" id="{881088A2-3C17-BDCC-D633-FDB02CEFF581}"/>
+              </a:ext>
+            </a:extLst>
+          </p:cNvPr>
+          <p:cNvSpPr>
+            <a:spLocks noGrp="1"/>
+          </p:cNvSpPr>
+          <p:nvPr>
+            <p:ph idx="15"/>
+          </p:nvPr>
+        </p:nvSpPr>
+        <p:spPr>
+          <a:xfrm>
+            <a:off x="4647179" y="1635760"/>
+            <a:ext cx="4180910" cy="3061866"/>
+          </a:xfrm>
+        </p:spPr>
+        <p:txBody>
+          <a:bodyPr/>
+          <a:lstStyle/>
+          <a:p>
+            <a:endParaRPr lang="de-DE"/>
+          </a:p>
+        </p:txBody>
+      </p:sp>
+      <p:sp>
+        <p:nvSpPr>
+          <p:cNvPr id="4" name="Titel 3">
+            <a:extLst>
+              <a:ext uri="{FF2B5EF4-FFF2-40B4-BE49-F238E27FC236}">
+                <a16:creationId xmlns:a16="http://schemas.microsoft.com/office/drawing/2014/main" id="{67F787CB-3960-0C01-F817-40FF3B97CB9D}"/>
               </a:ext>
             </a:extLst>
           </p:cNvPr>
@@ -12735,7 +13645,7 @@
         </p:nvSpPr>
         <p:spPr>
           <a:xfrm>
-            <a:off x="319090" y="972000"/>
+            <a:off x="319090" y="283507"/>
             <a:ext cx="8508999" cy="380745"/>
           </a:xfrm>
         </p:spPr>
@@ -12745,17 +13655,17 @@
           <a:p>
             <a:r>
               <a:rPr lang="de-DE" dirty="0"/>
-              <a:t>Performanz (Zeit)</a:t>
+              <a:t>Genauigkeit</a:t>
             </a:r>
           </a:p>
         </p:txBody>
       </p:sp>
       <p:sp>
         <p:nvSpPr>
-          <p:cNvPr id="4" name="Foliennummernplatzhalter 3">
+          <p:cNvPr id="5" name="Foliennummernplatzhalter 4">
             <a:extLst>
               <a:ext uri="{FF2B5EF4-FFF2-40B4-BE49-F238E27FC236}">
-                <a16:creationId xmlns:a16="http://schemas.microsoft.com/office/drawing/2014/main" id="{D80D2827-88CE-E17A-0523-C5F6C7065DD4}"/>
+                <a16:creationId xmlns:a16="http://schemas.microsoft.com/office/drawing/2014/main" id="{C54877B7-CC28-BAC6-022A-50E4859EA347}"/>
               </a:ext>
             </a:extLst>
           </p:cNvPr>
@@ -12763,7 +13673,7 @@
             <a:spLocks noGrp="1"/>
           </p:cNvSpPr>
           <p:nvPr>
-            <p:ph type="sldNum" sz="quarter" idx="15"/>
+            <p:ph type="sldNum" sz="quarter" idx="16"/>
           </p:nvPr>
         </p:nvSpPr>
         <p:spPr/>
@@ -12782,10 +13692,10 @@
       </p:sp>
       <p:sp>
         <p:nvSpPr>
-          <p:cNvPr id="5" name="Fußzeilenplatzhalter 4">
+          <p:cNvPr id="6" name="Fußzeilenplatzhalter 5">
             <a:extLst>
               <a:ext uri="{FF2B5EF4-FFF2-40B4-BE49-F238E27FC236}">
-                <a16:creationId xmlns:a16="http://schemas.microsoft.com/office/drawing/2014/main" id="{516EA7C5-7A00-3C7A-F676-D76109244FE3}"/>
+                <a16:creationId xmlns:a16="http://schemas.microsoft.com/office/drawing/2014/main" id="{618F1D88-FB99-B288-A3D7-D98A68247902}"/>
               </a:ext>
             </a:extLst>
           </p:cNvPr>
@@ -12793,7 +13703,7 @@
             <a:spLocks noGrp="1"/>
           </p:cNvSpPr>
           <p:nvPr>
-            <p:ph type="ftr" sz="quarter" idx="16"/>
+            <p:ph type="ftr" sz="quarter" idx="17"/>
           </p:nvPr>
         </p:nvSpPr>
         <p:spPr/>
@@ -12811,124 +13721,209 @@
       </p:sp>
       <p:sp>
         <p:nvSpPr>
-          <p:cNvPr id="7" name="Bildplatzhalter 6">
+          <p:cNvPr id="7" name="Textplatzhalter 1">
             <a:extLst>
               <a:ext uri="{FF2B5EF4-FFF2-40B4-BE49-F238E27FC236}">
-                <a16:creationId xmlns:a16="http://schemas.microsoft.com/office/drawing/2014/main" id="{30B7ED01-887E-83DD-5548-648E7F6984F1}"/>
+                <a16:creationId xmlns:a16="http://schemas.microsoft.com/office/drawing/2014/main" id="{F8562EE9-78A8-DD4A-0D45-3D70B066A3EA}"/>
               </a:ext>
             </a:extLst>
           </p:cNvPr>
-          <p:cNvSpPr>
-            <a:spLocks noGrp="1"/>
+          <p:cNvSpPr txBox="1">
+            <a:spLocks/>
           </p:cNvSpPr>
-          <p:nvPr>
-            <p:ph type="pic" sz="quarter" idx="14"/>
-          </p:nvPr>
+          <p:nvPr/>
         </p:nvSpPr>
-        <p:spPr/>
-      </p:sp>
-      <p:sp>
-        <p:nvSpPr>
-          <p:cNvPr id="8" name="Inhaltsplatzhalter 7">
-            <a:extLst>
-              <a:ext uri="{FF2B5EF4-FFF2-40B4-BE49-F238E27FC236}">
-                <a16:creationId xmlns:a16="http://schemas.microsoft.com/office/drawing/2014/main" id="{0AE1B3BD-DEBC-14AD-0FD0-56CF84C25579}"/>
-              </a:ext>
-            </a:extLst>
-          </p:cNvPr>
-          <p:cNvSpPr>
-            <a:spLocks noGrp="1"/>
-          </p:cNvSpPr>
-          <p:nvPr>
-            <p:ph sz="quarter" idx="18"/>
-          </p:nvPr>
-        </p:nvSpPr>
-        <p:spPr/>
-        <p:txBody>
-          <a:bodyPr/>
-          <a:lstStyle/>
-          <a:p>
-            <a:pPr marL="285750" indent="-285750">
-              <a:buFont typeface="Arial" panose="020B0604020202020204" pitchFamily="34" charset="0"/>
-              <a:buChar char="•"/>
-            </a:pPr>
-            <a:r>
-              <a:rPr lang="de-DE" dirty="0">
-                <a:latin typeface="Arial" panose="020B0604020202020204" pitchFamily="34" charset="0"/>
-              </a:rPr>
-              <a:t>R</a:t>
-            </a:r>
-            <a:r>
-              <a:rPr lang="de-DE" b="0" i="0" dirty="0">
-                <a:effectLst/>
-                <a:latin typeface="Arial" panose="020B0604020202020204" pitchFamily="34" charset="0"/>
-              </a:rPr>
-              <a:t>eine Reihen-Implementierung um ein Vielfaches (bis zu 12x) langsamer als die anderen</a:t>
-            </a:r>
-          </a:p>
-          <a:p>
-            <a:pPr marL="285750" indent="-285750">
-              <a:buFont typeface="Arial" panose="020B0604020202020204" pitchFamily="34" charset="0"/>
-              <a:buChar char="•"/>
-            </a:pPr>
-            <a:r>
-              <a:rPr lang="de-DE" b="0" i="0" dirty="0">
-                <a:effectLst/>
-                <a:latin typeface="Arial" panose="020B0604020202020204" pitchFamily="34" charset="0"/>
-              </a:rPr>
-              <a:t>Implementierung mit komplexen Instruktionen ist etwas schneller als unsere Lookup-</a:t>
-            </a:r>
-            <a:r>
-              <a:rPr lang="de-DE" dirty="0">
-                <a:latin typeface="Arial" panose="020B0604020202020204" pitchFamily="34" charset="0"/>
-              </a:rPr>
-              <a:t>T</a:t>
-            </a:r>
-            <a:r>
-              <a:rPr lang="de-DE" b="0" i="0" dirty="0">
-                <a:effectLst/>
-                <a:latin typeface="Arial" panose="020B0604020202020204" pitchFamily="34" charset="0"/>
-              </a:rPr>
-              <a:t>abelle</a:t>
-            </a:r>
-            <a:endParaRPr lang="de-DE" dirty="0"/>
-          </a:p>
-        </p:txBody>
-      </p:sp>
-      <p:pic>
-        <p:nvPicPr>
-          <p:cNvPr id="9" name="Inhaltsplatzhalter 12">
-            <a:extLst>
-              <a:ext uri="{FF2B5EF4-FFF2-40B4-BE49-F238E27FC236}">
-                <a16:creationId xmlns:a16="http://schemas.microsoft.com/office/drawing/2014/main" id="{779A70D7-5368-CF8A-7776-10E00851AD7E}"/>
-              </a:ext>
-            </a:extLst>
-          </p:cNvPr>
-          <p:cNvPicPr>
-            <a:picLocks noChangeAspect="1"/>
-          </p:cNvPicPr>
-          <p:nvPr/>
-        </p:nvPicPr>
-        <p:blipFill>
-          <a:blip r:embed="rId2"/>
-          <a:stretch>
-            <a:fillRect/>
-          </a:stretch>
-        </p:blipFill>
         <p:spPr>
           <a:xfrm>
-            <a:off x="4908207" y="2148752"/>
-            <a:ext cx="3660378" cy="2546350"/>
+            <a:off x="319090" y="980440"/>
+            <a:ext cx="8508999" cy="495780"/>
           </a:xfrm>
           <a:prstGeom prst="rect">
             <a:avLst/>
           </a:prstGeom>
         </p:spPr>
-      </p:pic>
+        <p:txBody>
+          <a:bodyPr/>
+          <a:lstStyle>
+            <a:lvl1pPr algn="l" rtl="0" eaLnBrk="0" fontAlgn="base" hangingPunct="0">
+              <a:lnSpc>
+                <a:spcPct val="100000"/>
+              </a:lnSpc>
+              <a:spcBef>
+                <a:spcPct val="0"/>
+              </a:spcBef>
+              <a:spcAft>
+                <a:spcPct val="0"/>
+              </a:spcAft>
+              <a:defRPr sz="1600" kern="1200">
+                <a:solidFill>
+                  <a:schemeClr val="tx1"/>
+                </a:solidFill>
+                <a:latin typeface="+mn-lt"/>
+                <a:ea typeface="+mn-ea"/>
+                <a:cs typeface="+mn-cs"/>
+              </a:defRPr>
+            </a:lvl1pPr>
+            <a:lvl2pPr marL="176213" indent="-176213" algn="l" rtl="0" eaLnBrk="0" fontAlgn="base" hangingPunct="0">
+              <a:lnSpc>
+                <a:spcPct val="100000"/>
+              </a:lnSpc>
+              <a:spcBef>
+                <a:spcPct val="0"/>
+              </a:spcBef>
+              <a:spcAft>
+                <a:spcPct val="0"/>
+              </a:spcAft>
+              <a:buFont typeface="Arial" charset="0"/>
+              <a:buChar char="•"/>
+              <a:defRPr sz="1600" kern="1200">
+                <a:solidFill>
+                  <a:schemeClr val="tx1"/>
+                </a:solidFill>
+                <a:latin typeface="+mn-lt"/>
+                <a:ea typeface="+mn-ea"/>
+                <a:cs typeface="+mn-cs"/>
+              </a:defRPr>
+            </a:lvl2pPr>
+            <a:lvl3pPr marL="360363" indent="-184150" algn="l" rtl="0" eaLnBrk="0" fontAlgn="base" hangingPunct="0">
+              <a:lnSpc>
+                <a:spcPct val="125000"/>
+              </a:lnSpc>
+              <a:spcBef>
+                <a:spcPct val="0"/>
+              </a:spcBef>
+              <a:spcAft>
+                <a:spcPct val="0"/>
+              </a:spcAft>
+              <a:buFont typeface="Symbol" pitchFamily="18" charset="2"/>
+              <a:buChar char="-"/>
+              <a:defRPr sz="1400" kern="1200">
+                <a:solidFill>
+                  <a:schemeClr val="tx1"/>
+                </a:solidFill>
+                <a:latin typeface="+mn-lt"/>
+                <a:ea typeface="+mn-ea"/>
+                <a:cs typeface="+mn-cs"/>
+              </a:defRPr>
+            </a:lvl3pPr>
+            <a:lvl4pPr marL="538163" indent="-177800" algn="l" rtl="0" eaLnBrk="0" fontAlgn="base" hangingPunct="0">
+              <a:lnSpc>
+                <a:spcPct val="125000"/>
+              </a:lnSpc>
+              <a:spcBef>
+                <a:spcPct val="0"/>
+              </a:spcBef>
+              <a:spcAft>
+                <a:spcPct val="0"/>
+              </a:spcAft>
+              <a:buFont typeface="Symbol" pitchFamily="18" charset="2"/>
+              <a:buChar char="-"/>
+              <a:defRPr sz="1400" kern="1200">
+                <a:solidFill>
+                  <a:schemeClr val="tx1"/>
+                </a:solidFill>
+                <a:latin typeface="+mn-lt"/>
+                <a:ea typeface="+mn-ea"/>
+                <a:cs typeface="+mn-cs"/>
+              </a:defRPr>
+            </a:lvl4pPr>
+            <a:lvl5pPr marL="714375" indent="-176213" algn="l" rtl="0" eaLnBrk="0" fontAlgn="base" hangingPunct="0">
+              <a:lnSpc>
+                <a:spcPct val="125000"/>
+              </a:lnSpc>
+              <a:spcBef>
+                <a:spcPct val="0"/>
+              </a:spcBef>
+              <a:spcAft>
+                <a:spcPct val="0"/>
+              </a:spcAft>
+              <a:buFont typeface="Symbol" pitchFamily="18" charset="2"/>
+              <a:buChar char="-"/>
+              <a:defRPr sz="1400" kern="1200">
+                <a:solidFill>
+                  <a:schemeClr val="tx1"/>
+                </a:solidFill>
+                <a:latin typeface="+mn-lt"/>
+                <a:ea typeface="+mn-ea"/>
+                <a:cs typeface="+mn-cs"/>
+              </a:defRPr>
+            </a:lvl5pPr>
+            <a:lvl6pPr marL="2514600" indent="-228600" algn="l" defTabSz="914400" rtl="0" eaLnBrk="1" latinLnBrk="0" hangingPunct="1">
+              <a:spcBef>
+                <a:spcPct val="20000"/>
+              </a:spcBef>
+              <a:buFont typeface="Arial" pitchFamily="34" charset="0"/>
+              <a:buChar char="•"/>
+              <a:defRPr sz="2000" kern="1200">
+                <a:solidFill>
+                  <a:schemeClr val="tx1"/>
+                </a:solidFill>
+                <a:latin typeface="+mn-lt"/>
+                <a:ea typeface="+mn-ea"/>
+                <a:cs typeface="+mn-cs"/>
+              </a:defRPr>
+            </a:lvl6pPr>
+            <a:lvl7pPr marL="2971800" indent="-228600" algn="l" defTabSz="914400" rtl="0" eaLnBrk="1" latinLnBrk="0" hangingPunct="1">
+              <a:spcBef>
+                <a:spcPct val="20000"/>
+              </a:spcBef>
+              <a:buFont typeface="Arial" pitchFamily="34" charset="0"/>
+              <a:buChar char="•"/>
+              <a:defRPr sz="2000" kern="1200">
+                <a:solidFill>
+                  <a:schemeClr val="tx1"/>
+                </a:solidFill>
+                <a:latin typeface="+mn-lt"/>
+                <a:ea typeface="+mn-ea"/>
+                <a:cs typeface="+mn-cs"/>
+              </a:defRPr>
+            </a:lvl7pPr>
+            <a:lvl8pPr marL="3429000" indent="-228600" algn="l" defTabSz="914400" rtl="0" eaLnBrk="1" latinLnBrk="0" hangingPunct="1">
+              <a:spcBef>
+                <a:spcPct val="20000"/>
+              </a:spcBef>
+              <a:buFont typeface="Arial" pitchFamily="34" charset="0"/>
+              <a:buChar char="•"/>
+              <a:defRPr sz="2000" kern="1200">
+                <a:solidFill>
+                  <a:schemeClr val="tx1"/>
+                </a:solidFill>
+                <a:latin typeface="+mn-lt"/>
+                <a:ea typeface="+mn-ea"/>
+                <a:cs typeface="+mn-cs"/>
+              </a:defRPr>
+            </a:lvl8pPr>
+            <a:lvl9pPr marL="3886200" indent="-228600" algn="l" defTabSz="914400" rtl="0" eaLnBrk="1" latinLnBrk="0" hangingPunct="1">
+              <a:spcBef>
+                <a:spcPct val="20000"/>
+              </a:spcBef>
+              <a:buFont typeface="Arial" pitchFamily="34" charset="0"/>
+              <a:buChar char="•"/>
+              <a:defRPr sz="2000" kern="1200">
+                <a:solidFill>
+                  <a:schemeClr val="tx1"/>
+                </a:solidFill>
+                <a:latin typeface="+mn-lt"/>
+                <a:ea typeface="+mn-ea"/>
+                <a:cs typeface="+mn-cs"/>
+              </a:defRPr>
+            </a:lvl9pPr>
+          </a:lstStyle>
+          <a:p>
+            <a:r>
+              <a:rPr lang="de-DE">
+                <a:latin typeface="Arial" panose="020B0604020202020204" pitchFamily="34" charset="0"/>
+              </a:rPr>
+              <a:t>Die Genauigkeit der Lösung als die Abweichung der Implementierung (4) vom Funktionswert der mathematisch definierten Funktion (1) zu verstehen.</a:t>
+            </a:r>
+            <a:endParaRPr lang="de-DE" dirty="0"/>
+          </a:p>
+        </p:txBody>
+      </p:sp>
     </p:spTree>
     <p:extLst>
       <p:ext uri="{BB962C8B-B14F-4D97-AF65-F5344CB8AC3E}">
-        <p14:creationId xmlns:p14="http://schemas.microsoft.com/office/powerpoint/2010/main" val="1047364043"/>
+        <p14:creationId xmlns:p14="http://schemas.microsoft.com/office/powerpoint/2010/main" val="501065824"/>
       </p:ext>
     </p:extLst>
   </p:cSld>

</xml_diff>

<commit_message>
Update Vortrag & Kompilierte Ausarbeitung
</commit_message>
<xml_diff>
--- a/Vortrag/Vortrag.pptx
+++ b/Vortrag/Vortrag.pptx
@@ -10,30 +10,32 @@
     <p:sldMasterId id="2147483697" r:id="rId6"/>
   </p:sldMasterIdLst>
   <p:notesMasterIdLst>
-    <p:notesMasterId r:id="rId25"/>
+    <p:notesMasterId r:id="rId27"/>
   </p:notesMasterIdLst>
   <p:handoutMasterIdLst>
-    <p:handoutMasterId r:id="rId26"/>
+    <p:handoutMasterId r:id="rId28"/>
   </p:handoutMasterIdLst>
   <p:sldIdLst>
     <p:sldId id="355" r:id="rId7"/>
-    <p:sldId id="357" r:id="rId8"/>
-    <p:sldId id="356" r:id="rId9"/>
-    <p:sldId id="409" r:id="rId10"/>
-    <p:sldId id="410" r:id="rId11"/>
-    <p:sldId id="396" r:id="rId12"/>
-    <p:sldId id="411" r:id="rId13"/>
-    <p:sldId id="397" r:id="rId14"/>
-    <p:sldId id="414" r:id="rId15"/>
-    <p:sldId id="415" r:id="rId16"/>
-    <p:sldId id="398" r:id="rId17"/>
-    <p:sldId id="413" r:id="rId18"/>
-    <p:sldId id="412" r:id="rId19"/>
-    <p:sldId id="407" r:id="rId20"/>
-    <p:sldId id="379" r:id="rId21"/>
-    <p:sldId id="395" r:id="rId22"/>
-    <p:sldId id="380" r:id="rId23"/>
-    <p:sldId id="381" r:id="rId24"/>
+    <p:sldId id="416" r:id="rId8"/>
+    <p:sldId id="357" r:id="rId9"/>
+    <p:sldId id="356" r:id="rId10"/>
+    <p:sldId id="409" r:id="rId11"/>
+    <p:sldId id="410" r:id="rId12"/>
+    <p:sldId id="396" r:id="rId13"/>
+    <p:sldId id="411" r:id="rId14"/>
+    <p:sldId id="397" r:id="rId15"/>
+    <p:sldId id="414" r:id="rId16"/>
+    <p:sldId id="415" r:id="rId17"/>
+    <p:sldId id="398" r:id="rId18"/>
+    <p:sldId id="413" r:id="rId19"/>
+    <p:sldId id="412" r:id="rId20"/>
+    <p:sldId id="417" r:id="rId21"/>
+    <p:sldId id="407" r:id="rId22"/>
+    <p:sldId id="379" r:id="rId23"/>
+    <p:sldId id="395" r:id="rId24"/>
+    <p:sldId id="380" r:id="rId25"/>
+    <p:sldId id="381" r:id="rId26"/>
   </p:sldIdLst>
   <p:sldSz cx="9144000" cy="5143500" type="screen16x9"/>
   <p:notesSz cx="9925050" cy="6665913"/>
@@ -1106,7 +1108,7 @@
               <a:pPr>
                 <a:defRPr/>
               </a:pPr>
-              <a:t>13/07/2023</a:t>
+              <a:t>15/07/2023</a:t>
             </a:fld>
             <a:endParaRPr lang="en-GB" dirty="0"/>
           </a:p>
@@ -1325,7 +1327,7 @@
               <a:pPr>
                 <a:defRPr/>
               </a:pPr>
-              <a:t>13/07/2023</a:t>
+              <a:t>15/07/2023</a:t>
             </a:fld>
             <a:endParaRPr lang="en-GB"/>
           </a:p>
@@ -1827,7 +1829,7 @@
               <a:pPr>
                 <a:defRPr/>
               </a:pPr>
-              <a:t>3</a:t>
+              <a:t>4</a:t>
             </a:fld>
             <a:endParaRPr lang="en-GB"/>
           </a:p>
@@ -1919,7 +1921,7 @@
               <a:pPr>
                 <a:defRPr/>
               </a:pPr>
-              <a:t>18</a:t>
+              <a:t>20</a:t>
             </a:fld>
             <a:endParaRPr lang="en-GB"/>
           </a:p>
@@ -8581,6 +8583,389 @@
         </p:nvSpPr>
         <p:spPr>
           <a:xfrm>
+            <a:off x="319091" y="1635760"/>
+            <a:ext cx="4180910" cy="3061866"/>
+          </a:xfrm>
+        </p:spPr>
+        <p:txBody>
+          <a:bodyPr/>
+          <a:lstStyle/>
+          <a:p>
+            <a:endParaRPr lang="de-DE"/>
+          </a:p>
+        </p:txBody>
+      </p:sp>
+      <p:sp>
+        <p:nvSpPr>
+          <p:cNvPr id="3" name="Inhaltsplatzhalter 2">
+            <a:extLst>
+              <a:ext uri="{FF2B5EF4-FFF2-40B4-BE49-F238E27FC236}">
+                <a16:creationId xmlns:a16="http://schemas.microsoft.com/office/drawing/2014/main" id="{881088A2-3C17-BDCC-D633-FDB02CEFF581}"/>
+              </a:ext>
+            </a:extLst>
+          </p:cNvPr>
+          <p:cNvSpPr>
+            <a:spLocks noGrp="1"/>
+          </p:cNvSpPr>
+          <p:nvPr>
+            <p:ph idx="15"/>
+          </p:nvPr>
+        </p:nvSpPr>
+        <p:spPr>
+          <a:xfrm>
+            <a:off x="4647179" y="1635760"/>
+            <a:ext cx="4180910" cy="3061866"/>
+          </a:xfrm>
+        </p:spPr>
+        <p:txBody>
+          <a:bodyPr/>
+          <a:lstStyle/>
+          <a:p>
+            <a:endParaRPr lang="de-DE"/>
+          </a:p>
+        </p:txBody>
+      </p:sp>
+      <p:sp>
+        <p:nvSpPr>
+          <p:cNvPr id="4" name="Titel 3">
+            <a:extLst>
+              <a:ext uri="{FF2B5EF4-FFF2-40B4-BE49-F238E27FC236}">
+                <a16:creationId xmlns:a16="http://schemas.microsoft.com/office/drawing/2014/main" id="{67F787CB-3960-0C01-F817-40FF3B97CB9D}"/>
+              </a:ext>
+            </a:extLst>
+          </p:cNvPr>
+          <p:cNvSpPr>
+            <a:spLocks noGrp="1"/>
+          </p:cNvSpPr>
+          <p:nvPr>
+            <p:ph type="title"/>
+          </p:nvPr>
+        </p:nvSpPr>
+        <p:spPr>
+          <a:xfrm>
+            <a:off x="319090" y="283507"/>
+            <a:ext cx="8508999" cy="380745"/>
+          </a:xfrm>
+        </p:spPr>
+        <p:txBody>
+          <a:bodyPr/>
+          <a:lstStyle/>
+          <a:p>
+            <a:r>
+              <a:rPr lang="de-DE" dirty="0"/>
+              <a:t>Genauigkeit</a:t>
+            </a:r>
+          </a:p>
+        </p:txBody>
+      </p:sp>
+      <p:sp>
+        <p:nvSpPr>
+          <p:cNvPr id="5" name="Foliennummernplatzhalter 4">
+            <a:extLst>
+              <a:ext uri="{FF2B5EF4-FFF2-40B4-BE49-F238E27FC236}">
+                <a16:creationId xmlns:a16="http://schemas.microsoft.com/office/drawing/2014/main" id="{C54877B7-CC28-BAC6-022A-50E4859EA347}"/>
+              </a:ext>
+            </a:extLst>
+          </p:cNvPr>
+          <p:cNvSpPr>
+            <a:spLocks noGrp="1"/>
+          </p:cNvSpPr>
+          <p:nvPr>
+            <p:ph type="sldNum" sz="quarter" idx="16"/>
+          </p:nvPr>
+        </p:nvSpPr>
+        <p:spPr/>
+        <p:txBody>
+          <a:bodyPr/>
+          <a:lstStyle/>
+          <a:p>
+            <a:fld id="{CE58CB1E-F828-4F11-99E0-327109AF9DA4}" type="slidenum">
+              <a:rPr lang="de-DE" smtClean="0"/>
+              <a:pPr/>
+              <a:t>10</a:t>
+            </a:fld>
+            <a:endParaRPr lang="de-DE" dirty="0"/>
+          </a:p>
+        </p:txBody>
+      </p:sp>
+      <p:sp>
+        <p:nvSpPr>
+          <p:cNvPr id="6" name="Fußzeilenplatzhalter 5">
+            <a:extLst>
+              <a:ext uri="{FF2B5EF4-FFF2-40B4-BE49-F238E27FC236}">
+                <a16:creationId xmlns:a16="http://schemas.microsoft.com/office/drawing/2014/main" id="{618F1D88-FB99-B288-A3D7-D98A68247902}"/>
+              </a:ext>
+            </a:extLst>
+          </p:cNvPr>
+          <p:cNvSpPr>
+            <a:spLocks noGrp="1"/>
+          </p:cNvSpPr>
+          <p:nvPr>
+            <p:ph type="ftr" sz="quarter" idx="17"/>
+          </p:nvPr>
+        </p:nvSpPr>
+        <p:spPr/>
+        <p:txBody>
+          <a:bodyPr/>
+          <a:lstStyle/>
+          <a:p>
+            <a:r>
+              <a:rPr lang="de-DE"/>
+              <a:t>Praktikum GRA | Gruppe 233 | Vortrag zu Aufgabe A316</a:t>
+            </a:r>
+            <a:endParaRPr lang="en-US" dirty="0"/>
+          </a:p>
+        </p:txBody>
+      </p:sp>
+      <p:sp>
+        <p:nvSpPr>
+          <p:cNvPr id="7" name="Textplatzhalter 1">
+            <a:extLst>
+              <a:ext uri="{FF2B5EF4-FFF2-40B4-BE49-F238E27FC236}">
+                <a16:creationId xmlns:a16="http://schemas.microsoft.com/office/drawing/2014/main" id="{F8562EE9-78A8-DD4A-0D45-3D70B066A3EA}"/>
+              </a:ext>
+            </a:extLst>
+          </p:cNvPr>
+          <p:cNvSpPr txBox="1">
+            <a:spLocks/>
+          </p:cNvSpPr>
+          <p:nvPr/>
+        </p:nvSpPr>
+        <p:spPr>
+          <a:xfrm>
+            <a:off x="319090" y="980440"/>
+            <a:ext cx="8508999" cy="495780"/>
+          </a:xfrm>
+          <a:prstGeom prst="rect">
+            <a:avLst/>
+          </a:prstGeom>
+        </p:spPr>
+        <p:txBody>
+          <a:bodyPr/>
+          <a:lstStyle>
+            <a:lvl1pPr algn="l" rtl="0" eaLnBrk="0" fontAlgn="base" hangingPunct="0">
+              <a:lnSpc>
+                <a:spcPct val="100000"/>
+              </a:lnSpc>
+              <a:spcBef>
+                <a:spcPct val="0"/>
+              </a:spcBef>
+              <a:spcAft>
+                <a:spcPct val="0"/>
+              </a:spcAft>
+              <a:defRPr sz="1600" kern="1200">
+                <a:solidFill>
+                  <a:schemeClr val="tx1"/>
+                </a:solidFill>
+                <a:latin typeface="+mn-lt"/>
+                <a:ea typeface="+mn-ea"/>
+                <a:cs typeface="+mn-cs"/>
+              </a:defRPr>
+            </a:lvl1pPr>
+            <a:lvl2pPr marL="176213" indent="-176213" algn="l" rtl="0" eaLnBrk="0" fontAlgn="base" hangingPunct="0">
+              <a:lnSpc>
+                <a:spcPct val="100000"/>
+              </a:lnSpc>
+              <a:spcBef>
+                <a:spcPct val="0"/>
+              </a:spcBef>
+              <a:spcAft>
+                <a:spcPct val="0"/>
+              </a:spcAft>
+              <a:buFont typeface="Arial" charset="0"/>
+              <a:buChar char="•"/>
+              <a:defRPr sz="1600" kern="1200">
+                <a:solidFill>
+                  <a:schemeClr val="tx1"/>
+                </a:solidFill>
+                <a:latin typeface="+mn-lt"/>
+                <a:ea typeface="+mn-ea"/>
+                <a:cs typeface="+mn-cs"/>
+              </a:defRPr>
+            </a:lvl2pPr>
+            <a:lvl3pPr marL="360363" indent="-184150" algn="l" rtl="0" eaLnBrk="0" fontAlgn="base" hangingPunct="0">
+              <a:lnSpc>
+                <a:spcPct val="125000"/>
+              </a:lnSpc>
+              <a:spcBef>
+                <a:spcPct val="0"/>
+              </a:spcBef>
+              <a:spcAft>
+                <a:spcPct val="0"/>
+              </a:spcAft>
+              <a:buFont typeface="Symbol" pitchFamily="18" charset="2"/>
+              <a:buChar char="-"/>
+              <a:defRPr sz="1400" kern="1200">
+                <a:solidFill>
+                  <a:schemeClr val="tx1"/>
+                </a:solidFill>
+                <a:latin typeface="+mn-lt"/>
+                <a:ea typeface="+mn-ea"/>
+                <a:cs typeface="+mn-cs"/>
+              </a:defRPr>
+            </a:lvl3pPr>
+            <a:lvl4pPr marL="538163" indent="-177800" algn="l" rtl="0" eaLnBrk="0" fontAlgn="base" hangingPunct="0">
+              <a:lnSpc>
+                <a:spcPct val="125000"/>
+              </a:lnSpc>
+              <a:spcBef>
+                <a:spcPct val="0"/>
+              </a:spcBef>
+              <a:spcAft>
+                <a:spcPct val="0"/>
+              </a:spcAft>
+              <a:buFont typeface="Symbol" pitchFamily="18" charset="2"/>
+              <a:buChar char="-"/>
+              <a:defRPr sz="1400" kern="1200">
+                <a:solidFill>
+                  <a:schemeClr val="tx1"/>
+                </a:solidFill>
+                <a:latin typeface="+mn-lt"/>
+                <a:ea typeface="+mn-ea"/>
+                <a:cs typeface="+mn-cs"/>
+              </a:defRPr>
+            </a:lvl4pPr>
+            <a:lvl5pPr marL="714375" indent="-176213" algn="l" rtl="0" eaLnBrk="0" fontAlgn="base" hangingPunct="0">
+              <a:lnSpc>
+                <a:spcPct val="125000"/>
+              </a:lnSpc>
+              <a:spcBef>
+                <a:spcPct val="0"/>
+              </a:spcBef>
+              <a:spcAft>
+                <a:spcPct val="0"/>
+              </a:spcAft>
+              <a:buFont typeface="Symbol" pitchFamily="18" charset="2"/>
+              <a:buChar char="-"/>
+              <a:defRPr sz="1400" kern="1200">
+                <a:solidFill>
+                  <a:schemeClr val="tx1"/>
+                </a:solidFill>
+                <a:latin typeface="+mn-lt"/>
+                <a:ea typeface="+mn-ea"/>
+                <a:cs typeface="+mn-cs"/>
+              </a:defRPr>
+            </a:lvl5pPr>
+            <a:lvl6pPr marL="2514600" indent="-228600" algn="l" defTabSz="914400" rtl="0" eaLnBrk="1" latinLnBrk="0" hangingPunct="1">
+              <a:spcBef>
+                <a:spcPct val="20000"/>
+              </a:spcBef>
+              <a:buFont typeface="Arial" pitchFamily="34" charset="0"/>
+              <a:buChar char="•"/>
+              <a:defRPr sz="2000" kern="1200">
+                <a:solidFill>
+                  <a:schemeClr val="tx1"/>
+                </a:solidFill>
+                <a:latin typeface="+mn-lt"/>
+                <a:ea typeface="+mn-ea"/>
+                <a:cs typeface="+mn-cs"/>
+              </a:defRPr>
+            </a:lvl6pPr>
+            <a:lvl7pPr marL="2971800" indent="-228600" algn="l" defTabSz="914400" rtl="0" eaLnBrk="1" latinLnBrk="0" hangingPunct="1">
+              <a:spcBef>
+                <a:spcPct val="20000"/>
+              </a:spcBef>
+              <a:buFont typeface="Arial" pitchFamily="34" charset="0"/>
+              <a:buChar char="•"/>
+              <a:defRPr sz="2000" kern="1200">
+                <a:solidFill>
+                  <a:schemeClr val="tx1"/>
+                </a:solidFill>
+                <a:latin typeface="+mn-lt"/>
+                <a:ea typeface="+mn-ea"/>
+                <a:cs typeface="+mn-cs"/>
+              </a:defRPr>
+            </a:lvl7pPr>
+            <a:lvl8pPr marL="3429000" indent="-228600" algn="l" defTabSz="914400" rtl="0" eaLnBrk="1" latinLnBrk="0" hangingPunct="1">
+              <a:spcBef>
+                <a:spcPct val="20000"/>
+              </a:spcBef>
+              <a:buFont typeface="Arial" pitchFamily="34" charset="0"/>
+              <a:buChar char="•"/>
+              <a:defRPr sz="2000" kern="1200">
+                <a:solidFill>
+                  <a:schemeClr val="tx1"/>
+                </a:solidFill>
+                <a:latin typeface="+mn-lt"/>
+                <a:ea typeface="+mn-ea"/>
+                <a:cs typeface="+mn-cs"/>
+              </a:defRPr>
+            </a:lvl8pPr>
+            <a:lvl9pPr marL="3886200" indent="-228600" algn="l" defTabSz="914400" rtl="0" eaLnBrk="1" latinLnBrk="0" hangingPunct="1">
+              <a:spcBef>
+                <a:spcPct val="20000"/>
+              </a:spcBef>
+              <a:buFont typeface="Arial" pitchFamily="34" charset="0"/>
+              <a:buChar char="•"/>
+              <a:defRPr sz="2000" kern="1200">
+                <a:solidFill>
+                  <a:schemeClr val="tx1"/>
+                </a:solidFill>
+                <a:latin typeface="+mn-lt"/>
+                <a:ea typeface="+mn-ea"/>
+                <a:cs typeface="+mn-cs"/>
+              </a:defRPr>
+            </a:lvl9pPr>
+          </a:lstStyle>
+          <a:p>
+            <a:r>
+              <a:rPr lang="de-DE">
+                <a:latin typeface="Arial" panose="020B0604020202020204" pitchFamily="34" charset="0"/>
+              </a:rPr>
+              <a:t>Die Genauigkeit der Lösung als die Abweichung der Implementierung (4) vom Funktionswert der mathematisch definierten Funktion (1) zu verstehen.</a:t>
+            </a:r>
+            <a:endParaRPr lang="de-DE" dirty="0"/>
+          </a:p>
+        </p:txBody>
+      </p:sp>
+    </p:spTree>
+    <p:extLst>
+      <p:ext uri="{BB962C8B-B14F-4D97-AF65-F5344CB8AC3E}">
+        <p14:creationId xmlns:p14="http://schemas.microsoft.com/office/powerpoint/2010/main" val="501065824"/>
+      </p:ext>
+    </p:extLst>
+  </p:cSld>
+  <p:clrMapOvr>
+    <a:masterClrMapping/>
+  </p:clrMapOvr>
+</p:sld>
+</file>
+
+<file path=ppt/slides/slide11.xml><?xml version="1.0" encoding="utf-8"?>
+<p:sld xmlns:a="http://schemas.openxmlformats.org/drawingml/2006/main" xmlns:r="http://schemas.openxmlformats.org/officeDocument/2006/relationships" xmlns:p="http://schemas.openxmlformats.org/presentationml/2006/main">
+  <p:cSld>
+    <p:spTree>
+      <p:nvGrpSpPr>
+        <p:cNvPr id="1" name=""/>
+        <p:cNvGrpSpPr/>
+        <p:nvPr/>
+      </p:nvGrpSpPr>
+      <p:grpSpPr>
+        <a:xfrm>
+          <a:off x="0" y="0"/>
+          <a:ext cx="0" cy="0"/>
+          <a:chOff x="0" y="0"/>
+          <a:chExt cx="0" cy="0"/>
+        </a:xfrm>
+      </p:grpSpPr>
+      <p:sp>
+        <p:nvSpPr>
+          <p:cNvPr id="2" name="Inhaltsplatzhalter 1">
+            <a:extLst>
+              <a:ext uri="{FF2B5EF4-FFF2-40B4-BE49-F238E27FC236}">
+                <a16:creationId xmlns:a16="http://schemas.microsoft.com/office/drawing/2014/main" id="{8D7E9E3F-D8C9-136F-056C-F90511BEAF66}"/>
+              </a:ext>
+            </a:extLst>
+          </p:cNvPr>
+          <p:cNvSpPr>
+            <a:spLocks noGrp="1"/>
+          </p:cNvSpPr>
+          <p:nvPr>
+            <p:ph idx="14"/>
+          </p:nvPr>
+        </p:nvSpPr>
+        <p:spPr>
+          <a:xfrm>
             <a:off x="319091" y="985520"/>
             <a:ext cx="4180910" cy="3712106"/>
           </a:xfrm>
@@ -8680,7 +9065,7 @@
             <a:fld id="{CE58CB1E-F828-4F11-99E0-327109AF9DA4}" type="slidenum">
               <a:rPr lang="de-DE" smtClean="0"/>
               <a:pPr/>
-              <a:t>10</a:t>
+              <a:t>11</a:t>
             </a:fld>
             <a:endParaRPr lang="de-DE" dirty="0"/>
           </a:p>
@@ -8728,7 +9113,7 @@
 </p:sld>
 </file>
 
-<file path=ppt/slides/slide11.xml><?xml version="1.0" encoding="utf-8"?>
+<file path=ppt/slides/slide12.xml><?xml version="1.0" encoding="utf-8"?>
 <p:sld xmlns:a="http://schemas.openxmlformats.org/drawingml/2006/main" xmlns:r="http://schemas.openxmlformats.org/officeDocument/2006/relationships" xmlns:p="http://schemas.openxmlformats.org/presentationml/2006/main">
   <p:cSld>
     <p:spTree>
@@ -8762,7 +9147,7 @@
           <a:p>
             <a:r>
               <a:rPr lang="de-DE" dirty="0"/>
-              <a:t>(4) Einordnung der gesamten Ausarbeitung</a:t>
+              <a:t>(4) Einordnung und Ausblick</a:t>
             </a:r>
           </a:p>
         </p:txBody>
@@ -8877,7 +9262,7 @@
 </p:sld>
 </file>
 
-<file path=ppt/slides/slide12.xml><?xml version="1.0" encoding="utf-8"?>
+<file path=ppt/slides/slide13.xml><?xml version="1.0" encoding="utf-8"?>
 <p:sld xmlns:a="http://schemas.openxmlformats.org/drawingml/2006/main" xmlns:r="http://schemas.openxmlformats.org/officeDocument/2006/relationships" xmlns:p="http://schemas.openxmlformats.org/presentationml/2006/main">
   <p:cSld>
     <p:spTree>
@@ -9020,7 +9405,7 @@
             <a:fld id="{CE58CB1E-F828-4F11-99E0-327109AF9DA4}" type="slidenum">
               <a:rPr lang="de-DE" smtClean="0"/>
               <a:pPr/>
-              <a:t>12</a:t>
+              <a:t>13</a:t>
             </a:fld>
             <a:endParaRPr lang="de-DE" dirty="0"/>
           </a:p>
@@ -9068,7 +9453,7 @@
 </p:sld>
 </file>
 
-<file path=ppt/slides/slide13.xml><?xml version="1.0" encoding="utf-8"?>
+<file path=ppt/slides/slide14.xml><?xml version="1.0" encoding="utf-8"?>
 <p:sld xmlns:a="http://schemas.openxmlformats.org/drawingml/2006/main" xmlns:r="http://schemas.openxmlformats.org/officeDocument/2006/relationships" xmlns:p="http://schemas.openxmlformats.org/presentationml/2006/main">
   <p:cSld>
     <p:spTree>
@@ -9156,7 +9541,216 @@
 </p:sld>
 </file>
 
-<file path=ppt/slides/slide14.xml><?xml version="1.0" encoding="utf-8"?>
+<file path=ppt/slides/slide15.xml><?xml version="1.0" encoding="utf-8"?>
+<p:sld xmlns:a="http://schemas.openxmlformats.org/drawingml/2006/main" xmlns:r="http://schemas.openxmlformats.org/officeDocument/2006/relationships" xmlns:p="http://schemas.openxmlformats.org/presentationml/2006/main">
+  <p:cSld>
+    <p:spTree>
+      <p:nvGrpSpPr>
+        <p:cNvPr id="1" name=""/>
+        <p:cNvGrpSpPr/>
+        <p:nvPr/>
+      </p:nvGrpSpPr>
+      <p:grpSpPr>
+        <a:xfrm>
+          <a:off x="0" y="0"/>
+          <a:ext cx="0" cy="0"/>
+          <a:chOff x="0" y="0"/>
+          <a:chExt cx="0" cy="0"/>
+        </a:xfrm>
+      </p:grpSpPr>
+      <p:sp>
+        <p:nvSpPr>
+          <p:cNvPr id="2" name="Inhaltsplatzhalter 1">
+            <a:extLst>
+              <a:ext uri="{FF2B5EF4-FFF2-40B4-BE49-F238E27FC236}">
+                <a16:creationId xmlns:a16="http://schemas.microsoft.com/office/drawing/2014/main" id="{1A8A6274-9C46-B376-397B-DE52B38154B1}"/>
+              </a:ext>
+            </a:extLst>
+          </p:cNvPr>
+          <p:cNvSpPr>
+            <a:spLocks noGrp="1"/>
+          </p:cNvSpPr>
+          <p:nvPr>
+            <p:ph idx="1"/>
+          </p:nvPr>
+        </p:nvSpPr>
+        <p:spPr>
+          <a:xfrm>
+            <a:off x="319090" y="931334"/>
+            <a:ext cx="8508999" cy="3764492"/>
+          </a:xfrm>
+        </p:spPr>
+        <p:txBody>
+          <a:bodyPr/>
+          <a:lstStyle/>
+          <a:p>
+            <a:pPr>
+              <a:lnSpc>
+                <a:spcPct val="150000"/>
+              </a:lnSpc>
+            </a:pPr>
+            <a:r>
+              <a:rPr lang="de-DE" b="1" dirty="0"/>
+              <a:t>O.V. (2019), </a:t>
+            </a:r>
+            <a:r>
+              <a:rPr lang="de-DE" dirty="0"/>
+              <a:t>https://meerdavon.com/wipe-out-aengste-surfen/ (Aufgerufen am: 15.07.2023) „Surfen“</a:t>
+            </a:r>
+          </a:p>
+          <a:p>
+            <a:pPr>
+              <a:lnSpc>
+                <a:spcPct val="150000"/>
+              </a:lnSpc>
+            </a:pPr>
+            <a:r>
+              <a:rPr lang="de-DE" b="1" dirty="0"/>
+              <a:t>Preuß, M. (2019), </a:t>
+            </a:r>
+            <a:r>
+              <a:rPr lang="de-DE" dirty="0"/>
+              <a:t>https://science-to-go.com/die-kettenlinie-2/ (Aufgerufen am: 15.07.2023) „Kettenlinie“</a:t>
+            </a:r>
+          </a:p>
+          <a:p>
+            <a:pPr>
+              <a:lnSpc>
+                <a:spcPct val="150000"/>
+              </a:lnSpc>
+            </a:pPr>
+            <a:r>
+              <a:rPr lang="de-DE" b="1" dirty="0"/>
+              <a:t>Hartung, L. (2019), </a:t>
+            </a:r>
+            <a:r>
+              <a:rPr lang="de-DE" dirty="0"/>
+              <a:t>https://www.spektrum.de/news/weisser-zwerg-nagt-riesenplaneten-an/1689980 (Aufgerufen am: 15.07.2023) „Gravitationswelle“</a:t>
+            </a:r>
+          </a:p>
+          <a:p>
+            <a:pPr>
+              <a:lnSpc>
+                <a:spcPct val="150000"/>
+              </a:lnSpc>
+            </a:pPr>
+            <a:r>
+              <a:rPr lang="de-DE" b="1" dirty="0"/>
+              <a:t>O.V. (2014), </a:t>
+            </a:r>
+            <a:r>
+              <a:rPr lang="de-DE" dirty="0"/>
+              <a:t>https://commons.wikimedia.org/wiki/File:History_of_the_Universe_%28multilingual%29.svg (Aufgerufen am: 15.07.2023) „Ausdehnung des Universums“</a:t>
+            </a:r>
+          </a:p>
+        </p:txBody>
+      </p:sp>
+      <p:sp>
+        <p:nvSpPr>
+          <p:cNvPr id="3" name="Titel 2">
+            <a:extLst>
+              <a:ext uri="{FF2B5EF4-FFF2-40B4-BE49-F238E27FC236}">
+                <a16:creationId xmlns:a16="http://schemas.microsoft.com/office/drawing/2014/main" id="{7C9DDFC9-98AC-CB8B-1A77-E63EAA6919AA}"/>
+              </a:ext>
+            </a:extLst>
+          </p:cNvPr>
+          <p:cNvSpPr>
+            <a:spLocks noGrp="1"/>
+          </p:cNvSpPr>
+          <p:nvPr>
+            <p:ph type="title"/>
+          </p:nvPr>
+        </p:nvSpPr>
+        <p:spPr>
+          <a:xfrm>
+            <a:off x="319090" y="280240"/>
+            <a:ext cx="8508999" cy="380745"/>
+          </a:xfrm>
+        </p:spPr>
+        <p:txBody>
+          <a:bodyPr/>
+          <a:lstStyle/>
+          <a:p>
+            <a:r>
+              <a:rPr lang="de-DE" dirty="0"/>
+              <a:t>Quellen</a:t>
+            </a:r>
+          </a:p>
+        </p:txBody>
+      </p:sp>
+      <p:sp>
+        <p:nvSpPr>
+          <p:cNvPr id="4" name="Foliennummernplatzhalter 3">
+            <a:extLst>
+              <a:ext uri="{FF2B5EF4-FFF2-40B4-BE49-F238E27FC236}">
+                <a16:creationId xmlns:a16="http://schemas.microsoft.com/office/drawing/2014/main" id="{AEEC6AF0-99D7-E3F0-F76A-76D77090EEC5}"/>
+              </a:ext>
+            </a:extLst>
+          </p:cNvPr>
+          <p:cNvSpPr>
+            <a:spLocks noGrp="1"/>
+          </p:cNvSpPr>
+          <p:nvPr>
+            <p:ph type="sldNum" sz="quarter" idx="11"/>
+          </p:nvPr>
+        </p:nvSpPr>
+        <p:spPr/>
+        <p:txBody>
+          <a:bodyPr/>
+          <a:lstStyle/>
+          <a:p>
+            <a:fld id="{CE58CB1E-F828-4F11-99E0-327109AF9DA4}" type="slidenum">
+              <a:rPr lang="de-DE" smtClean="0"/>
+              <a:pPr/>
+              <a:t>15</a:t>
+            </a:fld>
+            <a:endParaRPr lang="de-DE" dirty="0"/>
+          </a:p>
+        </p:txBody>
+      </p:sp>
+      <p:sp>
+        <p:nvSpPr>
+          <p:cNvPr id="5" name="Fußzeilenplatzhalter 4">
+            <a:extLst>
+              <a:ext uri="{FF2B5EF4-FFF2-40B4-BE49-F238E27FC236}">
+                <a16:creationId xmlns:a16="http://schemas.microsoft.com/office/drawing/2014/main" id="{58BE6AE1-2A90-9B7E-D485-14C83F90BB9A}"/>
+              </a:ext>
+            </a:extLst>
+          </p:cNvPr>
+          <p:cNvSpPr>
+            <a:spLocks noGrp="1"/>
+          </p:cNvSpPr>
+          <p:nvPr>
+            <p:ph type="ftr" sz="quarter" idx="12"/>
+          </p:nvPr>
+        </p:nvSpPr>
+        <p:spPr/>
+        <p:txBody>
+          <a:bodyPr/>
+          <a:lstStyle/>
+          <a:p>
+            <a:r>
+              <a:rPr lang="de-DE" dirty="0"/>
+              <a:t>Praktikum GRA | Gruppe 233 | Vortrag zu Aufgabe A316</a:t>
+            </a:r>
+            <a:endParaRPr lang="en-US" dirty="0"/>
+          </a:p>
+        </p:txBody>
+      </p:sp>
+    </p:spTree>
+    <p:extLst>
+      <p:ext uri="{BB962C8B-B14F-4D97-AF65-F5344CB8AC3E}">
+        <p14:creationId xmlns:p14="http://schemas.microsoft.com/office/powerpoint/2010/main" val="1083913482"/>
+      </p:ext>
+    </p:extLst>
+  </p:cSld>
+  <p:clrMapOvr>
+    <a:masterClrMapping/>
+  </p:clrMapOvr>
+</p:sld>
+</file>
+
+<file path=ppt/slides/slide16.xml><?xml version="1.0" encoding="utf-8"?>
 <p:sld xmlns:a="http://schemas.openxmlformats.org/drawingml/2006/main" xmlns:r="http://schemas.openxmlformats.org/officeDocument/2006/relationships" xmlns:p="http://schemas.openxmlformats.org/presentationml/2006/main" show="0">
   <p:cSld>
     <p:spTree>
@@ -9230,7 +9824,7 @@
             <a:fld id="{CE58CB1E-F828-4F11-99E0-327109AF9DA4}" type="slidenum">
               <a:rPr lang="de-DE" smtClean="0"/>
               <a:pPr/>
-              <a:t>14</a:t>
+              <a:t>16</a:t>
             </a:fld>
             <a:endParaRPr lang="de-DE" dirty="0"/>
           </a:p>
@@ -9508,7 +10102,7 @@
 </p:sld>
 </file>
 
-<file path=ppt/slides/slide15.xml><?xml version="1.0" encoding="utf-8"?>
+<file path=ppt/slides/slide17.xml><?xml version="1.0" encoding="utf-8"?>
 <p:sld xmlns:a="http://schemas.openxmlformats.org/drawingml/2006/main" xmlns:r="http://schemas.openxmlformats.org/officeDocument/2006/relationships" xmlns:p="http://schemas.openxmlformats.org/presentationml/2006/main" show="0">
   <p:cSld>
     <p:spTree>
@@ -10181,7 +10775,7 @@
             <a:fld id="{CE58CB1E-F828-4F11-99E0-327109AF9DA4}" type="slidenum">
               <a:rPr lang="de-DE" smtClean="0"/>
               <a:pPr/>
-              <a:t>15</a:t>
+              <a:t>17</a:t>
             </a:fld>
             <a:endParaRPr lang="de-DE" dirty="0"/>
           </a:p>
@@ -10247,7 +10841,7 @@
 </p:sld>
 </file>
 
-<file path=ppt/slides/slide16.xml><?xml version="1.0" encoding="utf-8"?>
+<file path=ppt/slides/slide18.xml><?xml version="1.0" encoding="utf-8"?>
 <p:sld xmlns:a="http://schemas.openxmlformats.org/drawingml/2006/main" xmlns:r="http://schemas.openxmlformats.org/officeDocument/2006/relationships" xmlns:p="http://schemas.openxmlformats.org/presentationml/2006/main" show="0">
   <p:cSld>
     <p:spTree>
@@ -10710,7 +11304,7 @@
             <a:fld id="{CE58CB1E-F828-4F11-99E0-327109AF9DA4}" type="slidenum">
               <a:rPr lang="de-DE" smtClean="0"/>
               <a:pPr/>
-              <a:t>16</a:t>
+              <a:t>18</a:t>
             </a:fld>
             <a:endParaRPr lang="de-DE" dirty="0"/>
           </a:p>
@@ -10777,7 +11371,7 @@
 </p:sld>
 </file>
 
-<file path=ppt/slides/slide17.xml><?xml version="1.0" encoding="utf-8"?>
+<file path=ppt/slides/slide19.xml><?xml version="1.0" encoding="utf-8"?>
 <p:sld xmlns:a="http://schemas.openxmlformats.org/drawingml/2006/main" xmlns:r="http://schemas.openxmlformats.org/officeDocument/2006/relationships" xmlns:p="http://schemas.openxmlformats.org/presentationml/2006/main" show="0">
   <p:cSld>
     <p:spTree>
@@ -10835,7 +11429,7 @@
             <a:fld id="{CE58CB1E-F828-4F11-99E0-327109AF9DA4}" type="slidenum">
               <a:rPr lang="de-DE" smtClean="0"/>
               <a:pPr/>
-              <a:t>17</a:t>
+              <a:t>19</a:t>
             </a:fld>
             <a:endParaRPr lang="de-DE" dirty="0"/>
           </a:p>
@@ -10929,7 +11523,239 @@
 </p:sld>
 </file>
 
-<file path=ppt/slides/slide18.xml><?xml version="1.0" encoding="utf-8"?>
+<file path=ppt/slides/slide2.xml><?xml version="1.0" encoding="utf-8"?>
+<p:sld xmlns:a="http://schemas.openxmlformats.org/drawingml/2006/main" xmlns:r="http://schemas.openxmlformats.org/officeDocument/2006/relationships" xmlns:p="http://schemas.openxmlformats.org/presentationml/2006/main">
+  <p:cSld>
+    <p:spTree>
+      <p:nvGrpSpPr>
+        <p:cNvPr id="1" name=""/>
+        <p:cNvGrpSpPr/>
+        <p:nvPr/>
+      </p:nvGrpSpPr>
+      <p:grpSpPr>
+        <a:xfrm>
+          <a:off x="0" y="0"/>
+          <a:ext cx="0" cy="0"/>
+          <a:chOff x="0" y="0"/>
+          <a:chExt cx="0" cy="0"/>
+        </a:xfrm>
+      </p:grpSpPr>
+      <p:sp>
+        <p:nvSpPr>
+          <p:cNvPr id="3" name="Titel 2">
+            <a:extLst>
+              <a:ext uri="{FF2B5EF4-FFF2-40B4-BE49-F238E27FC236}">
+                <a16:creationId xmlns:a16="http://schemas.microsoft.com/office/drawing/2014/main" id="{31A89ED8-5DDE-3175-ED13-B7DF1D964E1B}"/>
+              </a:ext>
+            </a:extLst>
+          </p:cNvPr>
+          <p:cNvSpPr>
+            <a:spLocks noGrp="1"/>
+          </p:cNvSpPr>
+          <p:nvPr>
+            <p:ph type="title"/>
+          </p:nvPr>
+        </p:nvSpPr>
+        <p:spPr/>
+        <p:txBody>
+          <a:bodyPr/>
+          <a:lstStyle/>
+          <a:p>
+            <a:endParaRPr lang="de-DE"/>
+          </a:p>
+        </p:txBody>
+      </p:sp>
+      <p:sp>
+        <p:nvSpPr>
+          <p:cNvPr id="4" name="Foliennummernplatzhalter 3">
+            <a:extLst>
+              <a:ext uri="{FF2B5EF4-FFF2-40B4-BE49-F238E27FC236}">
+                <a16:creationId xmlns:a16="http://schemas.microsoft.com/office/drawing/2014/main" id="{F7D7486C-9E7F-06BD-53F4-01A069AFC8CB}"/>
+              </a:ext>
+            </a:extLst>
+          </p:cNvPr>
+          <p:cNvSpPr>
+            <a:spLocks noGrp="1"/>
+          </p:cNvSpPr>
+          <p:nvPr>
+            <p:ph type="sldNum" sz="quarter" idx="15"/>
+          </p:nvPr>
+        </p:nvSpPr>
+        <p:spPr/>
+        <p:txBody>
+          <a:bodyPr/>
+          <a:lstStyle/>
+          <a:p>
+            <a:fld id="{CE58CB1E-F828-4F11-99E0-327109AF9DA4}" type="slidenum">
+              <a:rPr lang="de-DE" smtClean="0"/>
+              <a:pPr/>
+              <a:t>2</a:t>
+            </a:fld>
+            <a:endParaRPr lang="de-DE" dirty="0"/>
+          </a:p>
+        </p:txBody>
+      </p:sp>
+      <p:sp>
+        <p:nvSpPr>
+          <p:cNvPr id="5" name="Fußzeilenplatzhalter 4">
+            <a:extLst>
+              <a:ext uri="{FF2B5EF4-FFF2-40B4-BE49-F238E27FC236}">
+                <a16:creationId xmlns:a16="http://schemas.microsoft.com/office/drawing/2014/main" id="{C2040CA3-DE98-F6BB-F953-3A2C8B1D4047}"/>
+              </a:ext>
+            </a:extLst>
+          </p:cNvPr>
+          <p:cNvSpPr>
+            <a:spLocks noGrp="1"/>
+          </p:cNvSpPr>
+          <p:nvPr>
+            <p:ph type="ftr" sz="quarter" idx="16"/>
+          </p:nvPr>
+        </p:nvSpPr>
+        <p:spPr/>
+        <p:txBody>
+          <a:bodyPr/>
+          <a:lstStyle/>
+          <a:p>
+            <a:r>
+              <a:rPr lang="de-DE"/>
+              <a:t>Praktikum GRA | Gruppe 233 | Vortrag zu Aufgabe A316</a:t>
+            </a:r>
+            <a:endParaRPr lang="en-US" dirty="0"/>
+          </a:p>
+        </p:txBody>
+      </p:sp>
+      <p:pic>
+        <p:nvPicPr>
+          <p:cNvPr id="25" name="Grafik 24">
+            <a:extLst>
+              <a:ext uri="{FF2B5EF4-FFF2-40B4-BE49-F238E27FC236}">
+                <a16:creationId xmlns:a16="http://schemas.microsoft.com/office/drawing/2014/main" id="{59B26F12-DA4F-FC87-EE1C-70D76B673AC4}"/>
+              </a:ext>
+            </a:extLst>
+          </p:cNvPr>
+          <p:cNvPicPr>
+            <a:picLocks noChangeAspect="1"/>
+          </p:cNvPicPr>
+          <p:nvPr/>
+        </p:nvPicPr>
+        <p:blipFill>
+          <a:blip r:embed="rId2"/>
+          <a:stretch>
+            <a:fillRect/>
+          </a:stretch>
+        </p:blipFill>
+        <p:spPr>
+          <a:xfrm>
+            <a:off x="-8883" y="2084061"/>
+            <a:ext cx="4580872" cy="3068320"/>
+          </a:xfrm>
+          <a:prstGeom prst="rect">
+            <a:avLst/>
+          </a:prstGeom>
+        </p:spPr>
+      </p:pic>
+      <p:pic>
+        <p:nvPicPr>
+          <p:cNvPr id="27" name="Grafik 26">
+            <a:extLst>
+              <a:ext uri="{FF2B5EF4-FFF2-40B4-BE49-F238E27FC236}">
+                <a16:creationId xmlns:a16="http://schemas.microsoft.com/office/drawing/2014/main" id="{8C8A4A4A-AD63-4455-CA7D-7D0CE1703860}"/>
+              </a:ext>
+            </a:extLst>
+          </p:cNvPr>
+          <p:cNvPicPr>
+            <a:picLocks noChangeAspect="1"/>
+          </p:cNvPicPr>
+          <p:nvPr/>
+        </p:nvPicPr>
+        <p:blipFill>
+          <a:blip r:embed="rId3"/>
+          <a:stretch>
+            <a:fillRect/>
+          </a:stretch>
+        </p:blipFill>
+        <p:spPr>
+          <a:xfrm>
+            <a:off x="-8883" y="-725655"/>
+            <a:ext cx="4580871" cy="3046711"/>
+          </a:xfrm>
+          <a:prstGeom prst="rect">
+            <a:avLst/>
+          </a:prstGeom>
+        </p:spPr>
+      </p:pic>
+      <p:pic>
+        <p:nvPicPr>
+          <p:cNvPr id="29" name="Grafik 28">
+            <a:extLst>
+              <a:ext uri="{FF2B5EF4-FFF2-40B4-BE49-F238E27FC236}">
+                <a16:creationId xmlns:a16="http://schemas.microsoft.com/office/drawing/2014/main" id="{732781D6-AD53-A072-15E2-C37A87B6BD89}"/>
+              </a:ext>
+            </a:extLst>
+          </p:cNvPr>
+          <p:cNvPicPr>
+            <a:picLocks noChangeAspect="1"/>
+          </p:cNvPicPr>
+          <p:nvPr/>
+        </p:nvPicPr>
+        <p:blipFill rotWithShape="1">
+          <a:blip r:embed="rId4"/>
+          <a:srcRect l="470" t="-1" b="705"/>
+          <a:stretch/>
+        </p:blipFill>
+        <p:spPr>
+          <a:xfrm>
+            <a:off x="4572002" y="3229941"/>
+            <a:ext cx="4571998" cy="3040810"/>
+          </a:xfrm>
+          <a:prstGeom prst="rect">
+            <a:avLst/>
+          </a:prstGeom>
+        </p:spPr>
+      </p:pic>
+      <p:pic>
+        <p:nvPicPr>
+          <p:cNvPr id="23" name="Grafik 22">
+            <a:extLst>
+              <a:ext uri="{FF2B5EF4-FFF2-40B4-BE49-F238E27FC236}">
+                <a16:creationId xmlns:a16="http://schemas.microsoft.com/office/drawing/2014/main" id="{1860B2C0-4513-B7AE-7F31-16346ADF4432}"/>
+              </a:ext>
+            </a:extLst>
+          </p:cNvPr>
+          <p:cNvPicPr>
+            <a:picLocks noChangeAspect="1"/>
+          </p:cNvPicPr>
+          <p:nvPr/>
+        </p:nvPicPr>
+        <p:blipFill rotWithShape="1">
+          <a:blip r:embed="rId5"/>
+          <a:srcRect l="1029"/>
+          <a:stretch/>
+        </p:blipFill>
+        <p:spPr>
+          <a:xfrm>
+            <a:off x="4571993" y="-17756"/>
+            <a:ext cx="4572003" cy="3573620"/>
+          </a:xfrm>
+          <a:prstGeom prst="rect">
+            <a:avLst/>
+          </a:prstGeom>
+        </p:spPr>
+      </p:pic>
+    </p:spTree>
+    <p:extLst>
+      <p:ext uri="{BB962C8B-B14F-4D97-AF65-F5344CB8AC3E}">
+        <p14:creationId xmlns:p14="http://schemas.microsoft.com/office/powerpoint/2010/main" val="131464388"/>
+      </p:ext>
+    </p:extLst>
+  </p:cSld>
+  <p:clrMapOvr>
+    <a:masterClrMapping/>
+  </p:clrMapOvr>
+</p:sld>
+</file>
+
+<file path=ppt/slides/slide20.xml><?xml version="1.0" encoding="utf-8"?>
 <p:sld xmlns:a="http://schemas.openxmlformats.org/drawingml/2006/main" xmlns:r="http://schemas.openxmlformats.org/officeDocument/2006/relationships" xmlns:p="http://schemas.openxmlformats.org/presentationml/2006/main" show="0">
   <p:cSld>
     <p:spTree>
@@ -11012,7 +11838,7 @@
             <a:fld id="{CE58CB1E-F828-4F11-99E0-327109AF9DA4}" type="slidenum">
               <a:rPr lang="de-DE" smtClean="0"/>
               <a:pPr/>
-              <a:t>18</a:t>
+              <a:t>20</a:t>
             </a:fld>
             <a:endParaRPr lang="de-DE" dirty="0"/>
           </a:p>
@@ -11049,7 +11875,7 @@
 </p:sld>
 </file>
 
-<file path=ppt/slides/slide2.xml><?xml version="1.0" encoding="utf-8"?>
+<file path=ppt/slides/slide3.xml><?xml version="1.0" encoding="utf-8"?>
 <p:sld xmlns:a="http://schemas.openxmlformats.org/drawingml/2006/main" xmlns:r="http://schemas.openxmlformats.org/officeDocument/2006/relationships" xmlns:p="http://schemas.openxmlformats.org/presentationml/2006/main">
   <p:cSld>
     <p:spTree>
@@ -11066,8 +11892,8 @@
           <a:chExt cx="0" cy="0"/>
         </a:xfrm>
       </p:grpSpPr>
-      <mc:AlternateContent xmlns:mc="http://schemas.openxmlformats.org/markup-compatibility/2006">
-        <mc:Choice xmlns:a14="http://schemas.microsoft.com/office/drawing/2010/main" Requires="a14">
+      <mc:AlternateContent xmlns:mc="http://schemas.openxmlformats.org/markup-compatibility/2006" xmlns:a14="http://schemas.microsoft.com/office/drawing/2010/main">
+        <mc:Choice Requires="a14">
           <p:sp>
             <p:nvSpPr>
               <p:cNvPr id="5" name="Titel 4"/>
@@ -11168,7 +11994,7 @@
             </p:txBody>
           </p:sp>
         </mc:Choice>
-        <mc:Fallback>
+        <mc:Fallback xmlns="">
           <p:sp>
             <p:nvSpPr>
               <p:cNvPr id="5" name="Titel 4"/>
@@ -11271,7 +12097,7 @@
 </p:sld>
 </file>
 
-<file path=ppt/slides/slide3.xml><?xml version="1.0" encoding="utf-8"?>
+<file path=ppt/slides/slide4.xml><?xml version="1.0" encoding="utf-8"?>
 <p:sld xmlns:a="http://schemas.openxmlformats.org/drawingml/2006/main" xmlns:r="http://schemas.openxmlformats.org/officeDocument/2006/relationships" xmlns:p="http://schemas.openxmlformats.org/presentationml/2006/main">
   <p:cSld>
     <p:spTree>
@@ -11415,7 +12241,7 @@
 </p:sld>
 </file>
 
-<file path=ppt/slides/slide4.xml><?xml version="1.0" encoding="utf-8"?>
+<file path=ppt/slides/slide5.xml><?xml version="1.0" encoding="utf-8"?>
 <p:sld xmlns:a="http://schemas.openxmlformats.org/drawingml/2006/main" xmlns:r="http://schemas.openxmlformats.org/officeDocument/2006/relationships" xmlns:p="http://schemas.openxmlformats.org/presentationml/2006/main">
   <p:cSld>
     <p:spTree>
@@ -11593,7 +12419,7 @@
             <a:fld id="{CE58CB1E-F828-4F11-99E0-327109AF9DA4}" type="slidenum">
               <a:rPr lang="de-DE" smtClean="0"/>
               <a:pPr/>
-              <a:t>4</a:t>
+              <a:t>5</a:t>
             </a:fld>
             <a:endParaRPr lang="de-DE" dirty="0"/>
           </a:p>
@@ -11628,8 +12454,8 @@
           </a:p>
         </p:txBody>
       </p:sp>
-      <mc:AlternateContent xmlns:mc="http://schemas.openxmlformats.org/markup-compatibility/2006">
-        <mc:Choice xmlns:a14="http://schemas.microsoft.com/office/drawing/2010/main" Requires="a14">
+      <mc:AlternateContent xmlns:mc="http://schemas.openxmlformats.org/markup-compatibility/2006" xmlns:a14="http://schemas.microsoft.com/office/drawing/2010/main">
+        <mc:Choice Requires="a14">
           <p:sp>
             <p:nvSpPr>
               <p:cNvPr id="7" name="Inhaltsplatzhalter 1">
@@ -11838,6 +12664,7 @@
                 </a:r>
               </a:p>
               <a:p>
+                <a:pPr/>
                 <a14:m>
                   <m:oMathPara xmlns:m="http://schemas.openxmlformats.org/officeDocument/2006/math">
                     <m:oMathParaPr>
@@ -12149,7 +12976,7 @@
             </p:txBody>
           </p:sp>
         </mc:Choice>
-        <mc:Fallback>
+        <mc:Fallback xmlns="">
           <p:sp>
             <p:nvSpPr>
               <p:cNvPr id="7" name="Inhaltsplatzhalter 1">
@@ -12213,7 +13040,7 @@
 </p:sld>
 </file>
 
-<file path=ppt/slides/slide5.xml><?xml version="1.0" encoding="utf-8"?>
+<file path=ppt/slides/slide6.xml><?xml version="1.0" encoding="utf-8"?>
 <p:sld xmlns:a="http://schemas.openxmlformats.org/drawingml/2006/main" xmlns:r="http://schemas.openxmlformats.org/officeDocument/2006/relationships" xmlns:p="http://schemas.openxmlformats.org/presentationml/2006/main">
   <p:cSld>
     <p:spTree>
@@ -12592,7 +13419,7 @@
             <a:fld id="{CE58CB1E-F828-4F11-99E0-327109AF9DA4}" type="slidenum">
               <a:rPr lang="de-DE" smtClean="0"/>
               <a:pPr/>
-              <a:t>5</a:t>
+              <a:t>6</a:t>
             </a:fld>
             <a:endParaRPr lang="de-DE" dirty="0"/>
           </a:p>
@@ -12640,7 +13467,7 @@
 </p:sld>
 </file>
 
-<file path=ppt/slides/slide6.xml><?xml version="1.0" encoding="utf-8"?>
+<file path=ppt/slides/slide7.xml><?xml version="1.0" encoding="utf-8"?>
 <p:sld xmlns:a="http://schemas.openxmlformats.org/drawingml/2006/main" xmlns:r="http://schemas.openxmlformats.org/officeDocument/2006/relationships" xmlns:p="http://schemas.openxmlformats.org/presentationml/2006/main">
   <p:cSld>
     <p:spTree>
@@ -12674,7 +13501,7 @@
           <a:p>
             <a:r>
               <a:rPr lang="de-DE" dirty="0"/>
-              <a:t>(2) Umsetzung der C Implementierungen</a:t>
+              <a:t>(2) Umsetzung der Implementierungen</a:t>
             </a:r>
           </a:p>
         </p:txBody>
@@ -12789,7 +13616,7 @@
 </p:sld>
 </file>
 
-<file path=ppt/slides/slide7.xml><?xml version="1.0" encoding="utf-8"?>
+<file path=ppt/slides/slide8.xml><?xml version="1.0" encoding="utf-8"?>
 <p:sld xmlns:a="http://schemas.openxmlformats.org/drawingml/2006/main" xmlns:r="http://schemas.openxmlformats.org/officeDocument/2006/relationships" xmlns:p="http://schemas.openxmlformats.org/presentationml/2006/main">
   <p:cSld>
     <p:spTree>
@@ -12806,8 +13633,8 @@
           <a:chExt cx="0" cy="0"/>
         </a:xfrm>
       </p:grpSpPr>
-      <mc:AlternateContent xmlns:mc="http://schemas.openxmlformats.org/markup-compatibility/2006">
-        <mc:Choice xmlns:a14="http://schemas.microsoft.com/office/drawing/2010/main" Requires="a14">
+      <mc:AlternateContent xmlns:mc="http://schemas.openxmlformats.org/markup-compatibility/2006" xmlns:a14="http://schemas.microsoft.com/office/drawing/2010/main">
+        <mc:Choice Requires="a14">
           <p:sp>
             <p:nvSpPr>
               <p:cNvPr id="2" name="Inhaltsplatzhalter 1">
@@ -13223,13 +14050,7 @@
                                 <a:rPr lang="de-DE" b="0" i="1" smtClean="0">
                                   <a:latin typeface="Cambria Math" panose="02040503050406030204" pitchFamily="18" charset="0"/>
                                 </a:rPr>
-                                <m:t>                                                  </m:t>
-                              </m:r>
-                              <m:r>
-                                <a:rPr lang="de-DE" b="0" i="1" smtClean="0">
-                                  <a:latin typeface="Cambria Math" panose="02040503050406030204" pitchFamily="18" charset="0"/>
-                                </a:rPr>
-                                <m:t>        </m:t>
+                                <m:t>                                                          </m:t>
                               </m:r>
                             </m:e>
                           </m:eqArr>
@@ -13252,7 +14073,7 @@
             </p:txBody>
           </p:sp>
         </mc:Choice>
-        <mc:Fallback>
+        <mc:Fallback xmlns="">
           <p:sp>
             <p:nvSpPr>
               <p:cNvPr id="2" name="Inhaltsplatzhalter 1">
@@ -13353,7 +14174,7 @@
             <a:fld id="{CE58CB1E-F828-4F11-99E0-327109AF9DA4}" type="slidenum">
               <a:rPr lang="de-DE" smtClean="0"/>
               <a:pPr/>
-              <a:t>7</a:t>
+              <a:t>8</a:t>
             </a:fld>
             <a:endParaRPr lang="de-DE" dirty="0"/>
           </a:p>
@@ -13401,7 +14222,7 @@
 </p:sld>
 </file>
 
-<file path=ppt/slides/slide8.xml><?xml version="1.0" encoding="utf-8"?>
+<file path=ppt/slides/slide9.xml><?xml version="1.0" encoding="utf-8"?>
 <p:sld xmlns:a="http://schemas.openxmlformats.org/drawingml/2006/main" xmlns:r="http://schemas.openxmlformats.org/officeDocument/2006/relationships" xmlns:p="http://schemas.openxmlformats.org/presentationml/2006/main">
   <p:cSld>
     <p:spTree>
@@ -13435,7 +14256,7 @@
           <a:p>
             <a:r>
               <a:rPr lang="de-DE" dirty="0"/>
-              <a:t>(3) Die gemessenen Ergebnisse</a:t>
+              <a:t>(3) Messergebnisse</a:t>
             </a:r>
           </a:p>
         </p:txBody>
@@ -13541,389 +14362,6 @@
     <p:extLst>
       <p:ext uri="{BB962C8B-B14F-4D97-AF65-F5344CB8AC3E}">
         <p14:creationId xmlns:p14="http://schemas.microsoft.com/office/powerpoint/2010/main" val="4237379473"/>
-      </p:ext>
-    </p:extLst>
-  </p:cSld>
-  <p:clrMapOvr>
-    <a:masterClrMapping/>
-  </p:clrMapOvr>
-</p:sld>
-</file>
-
-<file path=ppt/slides/slide9.xml><?xml version="1.0" encoding="utf-8"?>
-<p:sld xmlns:a="http://schemas.openxmlformats.org/drawingml/2006/main" xmlns:r="http://schemas.openxmlformats.org/officeDocument/2006/relationships" xmlns:p="http://schemas.openxmlformats.org/presentationml/2006/main">
-  <p:cSld>
-    <p:spTree>
-      <p:nvGrpSpPr>
-        <p:cNvPr id="1" name=""/>
-        <p:cNvGrpSpPr/>
-        <p:nvPr/>
-      </p:nvGrpSpPr>
-      <p:grpSpPr>
-        <a:xfrm>
-          <a:off x="0" y="0"/>
-          <a:ext cx="0" cy="0"/>
-          <a:chOff x="0" y="0"/>
-          <a:chExt cx="0" cy="0"/>
-        </a:xfrm>
-      </p:grpSpPr>
-      <p:sp>
-        <p:nvSpPr>
-          <p:cNvPr id="2" name="Inhaltsplatzhalter 1">
-            <a:extLst>
-              <a:ext uri="{FF2B5EF4-FFF2-40B4-BE49-F238E27FC236}">
-                <a16:creationId xmlns:a16="http://schemas.microsoft.com/office/drawing/2014/main" id="{8D7E9E3F-D8C9-136F-056C-F90511BEAF66}"/>
-              </a:ext>
-            </a:extLst>
-          </p:cNvPr>
-          <p:cNvSpPr>
-            <a:spLocks noGrp="1"/>
-          </p:cNvSpPr>
-          <p:nvPr>
-            <p:ph idx="14"/>
-          </p:nvPr>
-        </p:nvSpPr>
-        <p:spPr>
-          <a:xfrm>
-            <a:off x="319091" y="1635760"/>
-            <a:ext cx="4180910" cy="3061866"/>
-          </a:xfrm>
-        </p:spPr>
-        <p:txBody>
-          <a:bodyPr/>
-          <a:lstStyle/>
-          <a:p>
-            <a:endParaRPr lang="de-DE"/>
-          </a:p>
-        </p:txBody>
-      </p:sp>
-      <p:sp>
-        <p:nvSpPr>
-          <p:cNvPr id="3" name="Inhaltsplatzhalter 2">
-            <a:extLst>
-              <a:ext uri="{FF2B5EF4-FFF2-40B4-BE49-F238E27FC236}">
-                <a16:creationId xmlns:a16="http://schemas.microsoft.com/office/drawing/2014/main" id="{881088A2-3C17-BDCC-D633-FDB02CEFF581}"/>
-              </a:ext>
-            </a:extLst>
-          </p:cNvPr>
-          <p:cNvSpPr>
-            <a:spLocks noGrp="1"/>
-          </p:cNvSpPr>
-          <p:nvPr>
-            <p:ph idx="15"/>
-          </p:nvPr>
-        </p:nvSpPr>
-        <p:spPr>
-          <a:xfrm>
-            <a:off x="4647179" y="1635760"/>
-            <a:ext cx="4180910" cy="3061866"/>
-          </a:xfrm>
-        </p:spPr>
-        <p:txBody>
-          <a:bodyPr/>
-          <a:lstStyle/>
-          <a:p>
-            <a:endParaRPr lang="de-DE"/>
-          </a:p>
-        </p:txBody>
-      </p:sp>
-      <p:sp>
-        <p:nvSpPr>
-          <p:cNvPr id="4" name="Titel 3">
-            <a:extLst>
-              <a:ext uri="{FF2B5EF4-FFF2-40B4-BE49-F238E27FC236}">
-                <a16:creationId xmlns:a16="http://schemas.microsoft.com/office/drawing/2014/main" id="{67F787CB-3960-0C01-F817-40FF3B97CB9D}"/>
-              </a:ext>
-            </a:extLst>
-          </p:cNvPr>
-          <p:cNvSpPr>
-            <a:spLocks noGrp="1"/>
-          </p:cNvSpPr>
-          <p:nvPr>
-            <p:ph type="title"/>
-          </p:nvPr>
-        </p:nvSpPr>
-        <p:spPr>
-          <a:xfrm>
-            <a:off x="319090" y="283507"/>
-            <a:ext cx="8508999" cy="380745"/>
-          </a:xfrm>
-        </p:spPr>
-        <p:txBody>
-          <a:bodyPr/>
-          <a:lstStyle/>
-          <a:p>
-            <a:r>
-              <a:rPr lang="de-DE" dirty="0"/>
-              <a:t>Genauigkeit</a:t>
-            </a:r>
-          </a:p>
-        </p:txBody>
-      </p:sp>
-      <p:sp>
-        <p:nvSpPr>
-          <p:cNvPr id="5" name="Foliennummernplatzhalter 4">
-            <a:extLst>
-              <a:ext uri="{FF2B5EF4-FFF2-40B4-BE49-F238E27FC236}">
-                <a16:creationId xmlns:a16="http://schemas.microsoft.com/office/drawing/2014/main" id="{C54877B7-CC28-BAC6-022A-50E4859EA347}"/>
-              </a:ext>
-            </a:extLst>
-          </p:cNvPr>
-          <p:cNvSpPr>
-            <a:spLocks noGrp="1"/>
-          </p:cNvSpPr>
-          <p:nvPr>
-            <p:ph type="sldNum" sz="quarter" idx="16"/>
-          </p:nvPr>
-        </p:nvSpPr>
-        <p:spPr/>
-        <p:txBody>
-          <a:bodyPr/>
-          <a:lstStyle/>
-          <a:p>
-            <a:fld id="{CE58CB1E-F828-4F11-99E0-327109AF9DA4}" type="slidenum">
-              <a:rPr lang="de-DE" smtClean="0"/>
-              <a:pPr/>
-              <a:t>9</a:t>
-            </a:fld>
-            <a:endParaRPr lang="de-DE" dirty="0"/>
-          </a:p>
-        </p:txBody>
-      </p:sp>
-      <p:sp>
-        <p:nvSpPr>
-          <p:cNvPr id="6" name="Fußzeilenplatzhalter 5">
-            <a:extLst>
-              <a:ext uri="{FF2B5EF4-FFF2-40B4-BE49-F238E27FC236}">
-                <a16:creationId xmlns:a16="http://schemas.microsoft.com/office/drawing/2014/main" id="{618F1D88-FB99-B288-A3D7-D98A68247902}"/>
-              </a:ext>
-            </a:extLst>
-          </p:cNvPr>
-          <p:cNvSpPr>
-            <a:spLocks noGrp="1"/>
-          </p:cNvSpPr>
-          <p:nvPr>
-            <p:ph type="ftr" sz="quarter" idx="17"/>
-          </p:nvPr>
-        </p:nvSpPr>
-        <p:spPr/>
-        <p:txBody>
-          <a:bodyPr/>
-          <a:lstStyle/>
-          <a:p>
-            <a:r>
-              <a:rPr lang="de-DE"/>
-              <a:t>Praktikum GRA | Gruppe 233 | Vortrag zu Aufgabe A316</a:t>
-            </a:r>
-            <a:endParaRPr lang="en-US" dirty="0"/>
-          </a:p>
-        </p:txBody>
-      </p:sp>
-      <p:sp>
-        <p:nvSpPr>
-          <p:cNvPr id="7" name="Textplatzhalter 1">
-            <a:extLst>
-              <a:ext uri="{FF2B5EF4-FFF2-40B4-BE49-F238E27FC236}">
-                <a16:creationId xmlns:a16="http://schemas.microsoft.com/office/drawing/2014/main" id="{F8562EE9-78A8-DD4A-0D45-3D70B066A3EA}"/>
-              </a:ext>
-            </a:extLst>
-          </p:cNvPr>
-          <p:cNvSpPr txBox="1">
-            <a:spLocks/>
-          </p:cNvSpPr>
-          <p:nvPr/>
-        </p:nvSpPr>
-        <p:spPr>
-          <a:xfrm>
-            <a:off x="319090" y="980440"/>
-            <a:ext cx="8508999" cy="495780"/>
-          </a:xfrm>
-          <a:prstGeom prst="rect">
-            <a:avLst/>
-          </a:prstGeom>
-        </p:spPr>
-        <p:txBody>
-          <a:bodyPr/>
-          <a:lstStyle>
-            <a:lvl1pPr algn="l" rtl="0" eaLnBrk="0" fontAlgn="base" hangingPunct="0">
-              <a:lnSpc>
-                <a:spcPct val="100000"/>
-              </a:lnSpc>
-              <a:spcBef>
-                <a:spcPct val="0"/>
-              </a:spcBef>
-              <a:spcAft>
-                <a:spcPct val="0"/>
-              </a:spcAft>
-              <a:defRPr sz="1600" kern="1200">
-                <a:solidFill>
-                  <a:schemeClr val="tx1"/>
-                </a:solidFill>
-                <a:latin typeface="+mn-lt"/>
-                <a:ea typeface="+mn-ea"/>
-                <a:cs typeface="+mn-cs"/>
-              </a:defRPr>
-            </a:lvl1pPr>
-            <a:lvl2pPr marL="176213" indent="-176213" algn="l" rtl="0" eaLnBrk="0" fontAlgn="base" hangingPunct="0">
-              <a:lnSpc>
-                <a:spcPct val="100000"/>
-              </a:lnSpc>
-              <a:spcBef>
-                <a:spcPct val="0"/>
-              </a:spcBef>
-              <a:spcAft>
-                <a:spcPct val="0"/>
-              </a:spcAft>
-              <a:buFont typeface="Arial" charset="0"/>
-              <a:buChar char="•"/>
-              <a:defRPr sz="1600" kern="1200">
-                <a:solidFill>
-                  <a:schemeClr val="tx1"/>
-                </a:solidFill>
-                <a:latin typeface="+mn-lt"/>
-                <a:ea typeface="+mn-ea"/>
-                <a:cs typeface="+mn-cs"/>
-              </a:defRPr>
-            </a:lvl2pPr>
-            <a:lvl3pPr marL="360363" indent="-184150" algn="l" rtl="0" eaLnBrk="0" fontAlgn="base" hangingPunct="0">
-              <a:lnSpc>
-                <a:spcPct val="125000"/>
-              </a:lnSpc>
-              <a:spcBef>
-                <a:spcPct val="0"/>
-              </a:spcBef>
-              <a:spcAft>
-                <a:spcPct val="0"/>
-              </a:spcAft>
-              <a:buFont typeface="Symbol" pitchFamily="18" charset="2"/>
-              <a:buChar char="-"/>
-              <a:defRPr sz="1400" kern="1200">
-                <a:solidFill>
-                  <a:schemeClr val="tx1"/>
-                </a:solidFill>
-                <a:latin typeface="+mn-lt"/>
-                <a:ea typeface="+mn-ea"/>
-                <a:cs typeface="+mn-cs"/>
-              </a:defRPr>
-            </a:lvl3pPr>
-            <a:lvl4pPr marL="538163" indent="-177800" algn="l" rtl="0" eaLnBrk="0" fontAlgn="base" hangingPunct="0">
-              <a:lnSpc>
-                <a:spcPct val="125000"/>
-              </a:lnSpc>
-              <a:spcBef>
-                <a:spcPct val="0"/>
-              </a:spcBef>
-              <a:spcAft>
-                <a:spcPct val="0"/>
-              </a:spcAft>
-              <a:buFont typeface="Symbol" pitchFamily="18" charset="2"/>
-              <a:buChar char="-"/>
-              <a:defRPr sz="1400" kern="1200">
-                <a:solidFill>
-                  <a:schemeClr val="tx1"/>
-                </a:solidFill>
-                <a:latin typeface="+mn-lt"/>
-                <a:ea typeface="+mn-ea"/>
-                <a:cs typeface="+mn-cs"/>
-              </a:defRPr>
-            </a:lvl4pPr>
-            <a:lvl5pPr marL="714375" indent="-176213" algn="l" rtl="0" eaLnBrk="0" fontAlgn="base" hangingPunct="0">
-              <a:lnSpc>
-                <a:spcPct val="125000"/>
-              </a:lnSpc>
-              <a:spcBef>
-                <a:spcPct val="0"/>
-              </a:spcBef>
-              <a:spcAft>
-                <a:spcPct val="0"/>
-              </a:spcAft>
-              <a:buFont typeface="Symbol" pitchFamily="18" charset="2"/>
-              <a:buChar char="-"/>
-              <a:defRPr sz="1400" kern="1200">
-                <a:solidFill>
-                  <a:schemeClr val="tx1"/>
-                </a:solidFill>
-                <a:latin typeface="+mn-lt"/>
-                <a:ea typeface="+mn-ea"/>
-                <a:cs typeface="+mn-cs"/>
-              </a:defRPr>
-            </a:lvl5pPr>
-            <a:lvl6pPr marL="2514600" indent="-228600" algn="l" defTabSz="914400" rtl="0" eaLnBrk="1" latinLnBrk="0" hangingPunct="1">
-              <a:spcBef>
-                <a:spcPct val="20000"/>
-              </a:spcBef>
-              <a:buFont typeface="Arial" pitchFamily="34" charset="0"/>
-              <a:buChar char="•"/>
-              <a:defRPr sz="2000" kern="1200">
-                <a:solidFill>
-                  <a:schemeClr val="tx1"/>
-                </a:solidFill>
-                <a:latin typeface="+mn-lt"/>
-                <a:ea typeface="+mn-ea"/>
-                <a:cs typeface="+mn-cs"/>
-              </a:defRPr>
-            </a:lvl6pPr>
-            <a:lvl7pPr marL="2971800" indent="-228600" algn="l" defTabSz="914400" rtl="0" eaLnBrk="1" latinLnBrk="0" hangingPunct="1">
-              <a:spcBef>
-                <a:spcPct val="20000"/>
-              </a:spcBef>
-              <a:buFont typeface="Arial" pitchFamily="34" charset="0"/>
-              <a:buChar char="•"/>
-              <a:defRPr sz="2000" kern="1200">
-                <a:solidFill>
-                  <a:schemeClr val="tx1"/>
-                </a:solidFill>
-                <a:latin typeface="+mn-lt"/>
-                <a:ea typeface="+mn-ea"/>
-                <a:cs typeface="+mn-cs"/>
-              </a:defRPr>
-            </a:lvl7pPr>
-            <a:lvl8pPr marL="3429000" indent="-228600" algn="l" defTabSz="914400" rtl="0" eaLnBrk="1" latinLnBrk="0" hangingPunct="1">
-              <a:spcBef>
-                <a:spcPct val="20000"/>
-              </a:spcBef>
-              <a:buFont typeface="Arial" pitchFamily="34" charset="0"/>
-              <a:buChar char="•"/>
-              <a:defRPr sz="2000" kern="1200">
-                <a:solidFill>
-                  <a:schemeClr val="tx1"/>
-                </a:solidFill>
-                <a:latin typeface="+mn-lt"/>
-                <a:ea typeface="+mn-ea"/>
-                <a:cs typeface="+mn-cs"/>
-              </a:defRPr>
-            </a:lvl8pPr>
-            <a:lvl9pPr marL="3886200" indent="-228600" algn="l" defTabSz="914400" rtl="0" eaLnBrk="1" latinLnBrk="0" hangingPunct="1">
-              <a:spcBef>
-                <a:spcPct val="20000"/>
-              </a:spcBef>
-              <a:buFont typeface="Arial" pitchFamily="34" charset="0"/>
-              <a:buChar char="•"/>
-              <a:defRPr sz="2000" kern="1200">
-                <a:solidFill>
-                  <a:schemeClr val="tx1"/>
-                </a:solidFill>
-                <a:latin typeface="+mn-lt"/>
-                <a:ea typeface="+mn-ea"/>
-                <a:cs typeface="+mn-cs"/>
-              </a:defRPr>
-            </a:lvl9pPr>
-          </a:lstStyle>
-          <a:p>
-            <a:r>
-              <a:rPr lang="de-DE">
-                <a:latin typeface="Arial" panose="020B0604020202020204" pitchFamily="34" charset="0"/>
-              </a:rPr>
-              <a:t>Die Genauigkeit der Lösung als die Abweichung der Implementierung (4) vom Funktionswert der mathematisch definierten Funktion (1) zu verstehen.</a:t>
-            </a:r>
-            <a:endParaRPr lang="de-DE" dirty="0"/>
-          </a:p>
-        </p:txBody>
-      </p:sp>
-    </p:spTree>
-    <p:extLst>
-      <p:ext uri="{BB962C8B-B14F-4D97-AF65-F5344CB8AC3E}">
-        <p14:creationId xmlns:p14="http://schemas.microsoft.com/office/powerpoint/2010/main" val="501065824"/>
       </p:ext>
     </p:extLst>
   </p:cSld>

</xml_diff>